<commit_message>
completion of presentation 10-Working-with-Sound-and-Video-Information
</commit_message>
<xml_diff>
--- a/Courses/Computer-Modeling-and-IT/Computer-Modeling-and-IT-5-Class/10-Working-With-Sound-and-Video-Information/10-Working-With-Sound-and-Video-Information.pptx
+++ b/Courses/Computer-Modeling-and-IT/Computer-Modeling-and-IT-5-Class/10-Working-With-Sound-and-Video-Information/10-Working-With-Sound-and-Video-Information.pptx
@@ -5,10 +5,10 @@
     <p:sldMasterId id="2147483675" r:id="rId1"/>
   </p:sldMasterIdLst>
   <p:notesMasterIdLst>
-    <p:notesMasterId r:id="rId16"/>
+    <p:notesMasterId r:id="rId21"/>
   </p:notesMasterIdLst>
   <p:handoutMasterIdLst>
-    <p:handoutMasterId r:id="rId17"/>
+    <p:handoutMasterId r:id="rId22"/>
   </p:handoutMasterIdLst>
   <p:sldIdLst>
     <p:sldId id="503" r:id="rId2"/>
@@ -22,9 +22,14 @@
     <p:sldId id="609" r:id="rId10"/>
     <p:sldId id="611" r:id="rId11"/>
     <p:sldId id="610" r:id="rId12"/>
-    <p:sldId id="602" r:id="rId13"/>
-    <p:sldId id="504" r:id="rId14"/>
-    <p:sldId id="505" r:id="rId15"/>
+    <p:sldId id="612" r:id="rId13"/>
+    <p:sldId id="615" r:id="rId14"/>
+    <p:sldId id="613" r:id="rId15"/>
+    <p:sldId id="614" r:id="rId16"/>
+    <p:sldId id="616" r:id="rId17"/>
+    <p:sldId id="602" r:id="rId18"/>
+    <p:sldId id="504" r:id="rId19"/>
+    <p:sldId id="505" r:id="rId20"/>
   </p:sldIdLst>
   <p:sldSz cx="12192000" cy="6858000"/>
   <p:notesSz cx="6858000" cy="9144000"/>
@@ -145,8 +150,17 @@
             <p14:sldId id="607"/>
             <p14:sldId id="608"/>
             <p14:sldId id="609"/>
+          </p14:sldIdLst>
+        </p14:section>
+        <p14:section name="Програми за възпроизвеждане на звукова и видеоинформация" id="{77E86665-8AF8-41E2-8F8A-B517B24EAEB1}">
+          <p14:sldIdLst>
             <p14:sldId id="611"/>
             <p14:sldId id="610"/>
+            <p14:sldId id="612"/>
+            <p14:sldId id="615"/>
+            <p14:sldId id="613"/>
+            <p14:sldId id="614"/>
+            <p14:sldId id="616"/>
           </p14:sldIdLst>
         </p14:section>
         <p14:section name="Заключение" id="{E19D07F1-86E2-47E9-B2AB-7ADC4F89DC12}">
@@ -273,7 +287,7 @@
           <a:p>
             <a:fld id="{4E087215-0C8F-4762-A664-737A353EC9A4}" type="datetimeFigureOut">
               <a:rPr lang="bg-BG" smtClean="0"/>
-              <a:t>21.10.2023 г.</a:t>
+              <a:t>22.10.2023 г.</a:t>
             </a:fld>
             <a:endParaRPr lang="bg-BG"/>
           </a:p>
@@ -469,7 +483,7 @@
           <a:p>
             <a:fld id="{72D84649-876A-46C9-8472-14CB09C070D8}" type="datetimeFigureOut">
               <a:rPr lang="en-US" smtClean="0"/>
-              <a:t>10/21/2023</a:t>
+              <a:t>10/22/2023</a:t>
             </a:fld>
             <a:endParaRPr lang="en-US"/>
           </a:p>
@@ -1254,7 +1268,7 @@
             <a:fld id="{3EBA5BD7-F043-4D1B-AA17-CD412FC534DE}" type="slidenum">
               <a:rPr lang="en-US" smtClean="0"/>
               <a:pPr/>
-              <a:t>12</a:t>
+              <a:t>17</a:t>
             </a:fld>
             <a:endParaRPr lang="en-US" dirty="0"/>
           </a:p>
@@ -1445,7 +1459,7 @@
             <a:fld id="{3EBA5BD7-F043-4D1B-AA17-CD412FC534DE}" type="slidenum">
               <a:rPr lang="en-US" smtClean="0"/>
               <a:pPr/>
-              <a:t>13</a:t>
+              <a:t>18</a:t>
             </a:fld>
             <a:endParaRPr lang="en-US" dirty="0"/>
           </a:p>
@@ -1675,7 +1689,7 @@
             <a:fld id="{3EBA5BD7-F043-4D1B-AA17-CD412FC534DE}" type="slidenum">
               <a:rPr lang="en-US" smtClean="0"/>
               <a:pPr/>
-              <a:t>14</a:t>
+              <a:t>19</a:t>
             </a:fld>
             <a:endParaRPr lang="en-US" dirty="0"/>
           </a:p>
@@ -4209,7 +4223,7 @@
             <a:fld id="{055373AC-9AA7-423B-BA00-BA1C74164DBD}" type="datetime1">
               <a:rPr lang="en-US" smtClean="0"/>
               <a:pPr/>
-              <a:t>10/21/2023</a:t>
+              <a:t>10/22/2023</a:t>
             </a:fld>
             <a:endParaRPr lang="en-US" dirty="0"/>
           </a:p>
@@ -7514,13 +7528,13 @@
         </p:spPr>
         <p:txBody>
           <a:bodyPr>
-            <a:normAutofit/>
+            <a:normAutofit fontScale="92500"/>
           </a:bodyPr>
           <a:lstStyle/>
           <a:p>
             <a:r>
-              <a:rPr lang="en-US" dirty="0" smtClean="0"/>
-              <a:t>TODO</a:t>
+              <a:rPr lang="bg-BG" dirty="0" smtClean="0"/>
+              <a:t>Основни компоненти за възпроизвеждане на звук и видео</a:t>
             </a:r>
             <a:endParaRPr lang="en-US" dirty="0"/>
           </a:p>
@@ -7796,6 +7810,43 @@
           </a:p>
         </p:txBody>
       </p:sp>
+      <p:pic>
+        <p:nvPicPr>
+          <p:cNvPr id="3" name="Picture 2"/>
+          <p:cNvPicPr>
+            <a:picLocks noChangeAspect="1"/>
+          </p:cNvPicPr>
+          <p:nvPr/>
+        </p:nvPicPr>
+        <p:blipFill>
+          <a:blip r:embed="rId2" cstate="hqprint">
+            <a:extLst>
+              <a:ext uri="{28A0092B-C50C-407E-A947-70E740481C1C}">
+                <a14:useLocalDpi xmlns:a14="http://schemas.microsoft.com/office/drawing/2010/main" val="0"/>
+              </a:ext>
+            </a:extLst>
+          </a:blip>
+          <a:stretch>
+            <a:fillRect/>
+          </a:stretch>
+        </p:blipFill>
+        <p:spPr>
+          <a:xfrm>
+            <a:off x="2856000" y="819000"/>
+            <a:ext cx="6481152" cy="3645000"/>
+          </a:xfrm>
+          <a:prstGeom prst="rect">
+            <a:avLst/>
+          </a:prstGeom>
+          <a:ln>
+            <a:solidFill>
+              <a:schemeClr val="bg2">
+                <a:lumMod val="75000"/>
+              </a:schemeClr>
+            </a:solidFill>
+          </a:ln>
+        </p:spPr>
+      </p:pic>
     </p:spTree>
     <p:extLst>
       <p:ext uri="{BB962C8B-B14F-4D97-AF65-F5344CB8AC3E}">
@@ -7885,12 +7936,48 @@
               <a:t>В системата </a:t>
             </a:r>
             <a:r>
+              <a:rPr lang="en-US" b="1" dirty="0" smtClean="0">
+                <a:solidFill>
+                  <a:schemeClr val="bg1"/>
+                </a:solidFill>
+              </a:rPr>
+              <a:t>Windows</a:t>
+            </a:r>
+            <a:r>
               <a:rPr lang="en-US" dirty="0" smtClean="0"/>
-              <a:t>Windows </a:t>
+              <a:t> </a:t>
             </a:r>
             <a:r>
               <a:rPr lang="bg-BG" dirty="0" smtClean="0"/>
-              <a:t>има различни програми за възпроизвеждане на звукова и видеоинформация</a:t>
+              <a:t>има различни </a:t>
+            </a:r>
+            <a:r>
+              <a:rPr lang="bg-BG" b="1" dirty="0" smtClean="0"/>
+              <a:t>програми</a:t>
+            </a:r>
+            <a:r>
+              <a:rPr lang="bg-BG" dirty="0" smtClean="0"/>
+              <a:t> за </a:t>
+            </a:r>
+            <a:r>
+              <a:rPr lang="bg-BG" b="1" dirty="0" smtClean="0"/>
+              <a:t>възпроизвеждане</a:t>
+            </a:r>
+            <a:r>
+              <a:rPr lang="bg-BG" dirty="0" smtClean="0"/>
+              <a:t> на </a:t>
+            </a:r>
+            <a:r>
+              <a:rPr lang="bg-BG" b="1" dirty="0" smtClean="0"/>
+              <a:t>звукова</a:t>
+            </a:r>
+            <a:r>
+              <a:rPr lang="bg-BG" dirty="0" smtClean="0"/>
+              <a:t> и </a:t>
+            </a:r>
+            <a:r>
+              <a:rPr lang="bg-BG" b="1" dirty="0" smtClean="0"/>
+              <a:t>видеоинформация</a:t>
             </a:r>
             <a:r>
               <a:rPr lang="en-US" dirty="0" smtClean="0"/>
@@ -7904,8 +7991,12 @@
           <a:p>
             <a:pPr lvl="1"/>
             <a:r>
+              <a:rPr lang="en-US" b="1" dirty="0" smtClean="0"/>
+              <a:t>Groove Music </a:t>
+            </a:r>
+            <a:r>
               <a:rPr lang="en-US" dirty="0" smtClean="0"/>
-              <a:t>Groove Music – </a:t>
+              <a:t>– </a:t>
             </a:r>
             <a:r>
               <a:rPr lang="bg-BG" dirty="0" smtClean="0"/>
@@ -7916,12 +8007,16 @@
           <a:p>
             <a:pPr lvl="1"/>
             <a:r>
-              <a:rPr lang="en-US" dirty="0"/>
+              <a:rPr lang="en-US" b="1" dirty="0"/>
               <a:t>Movies &amp; TV</a:t>
             </a:r>
             <a:r>
+              <a:rPr lang="bg-BG" b="1" dirty="0"/>
+              <a:t> </a:t>
+            </a:r>
+            <a:r>
               <a:rPr lang="bg-BG" dirty="0"/>
-              <a:t> – за </a:t>
+              <a:t>– за </a:t>
             </a:r>
             <a:r>
               <a:rPr lang="bg-BG" dirty="0" smtClean="0"/>
@@ -7932,7 +8027,7 @@
           <a:p>
             <a:pPr lvl="1"/>
             <a:r>
-              <a:rPr lang="en-US" dirty="0" smtClean="0"/>
+              <a:rPr lang="en-US" b="1" dirty="0" smtClean="0"/>
               <a:t>Windows Media Player</a:t>
             </a:r>
             <a:r>
@@ -8360,6 +8455,2723 @@
       </p:grpSpPr>
       <p:sp>
         <p:nvSpPr>
+          <p:cNvPr id="2" name="Slide Number Placeholder 1"/>
+          <p:cNvSpPr>
+            <a:spLocks noGrp="1"/>
+          </p:cNvSpPr>
+          <p:nvPr>
+            <p:ph type="sldNum" sz="quarter" idx="5"/>
+          </p:nvPr>
+        </p:nvSpPr>
+        <p:spPr/>
+        <p:txBody>
+          <a:bodyPr/>
+          <a:lstStyle/>
+          <a:p>
+            <a:fld id="{2BF067CD-8E6B-4360-9AA8-C5DF2A48A6D1}" type="slidenum">
+              <a:rPr lang="en-US" noProof="0" smtClean="0"/>
+              <a:pPr/>
+              <a:t>12</a:t>
+            </a:fld>
+            <a:endParaRPr lang="en-US" noProof="0" dirty="0"/>
+          </a:p>
+        </p:txBody>
+      </p:sp>
+      <p:sp>
+        <p:nvSpPr>
+          <p:cNvPr id="4" name="Title 3"/>
+          <p:cNvSpPr>
+            <a:spLocks noGrp="1"/>
+          </p:cNvSpPr>
+          <p:nvPr>
+            <p:ph type="title"/>
+          </p:nvPr>
+        </p:nvSpPr>
+        <p:spPr/>
+        <p:txBody>
+          <a:bodyPr/>
+          <a:lstStyle/>
+          <a:p>
+            <a:r>
+              <a:rPr lang="en-US" dirty="0"/>
+              <a:t>Groove Music</a:t>
+            </a:r>
+          </a:p>
+        </p:txBody>
+      </p:sp>
+      <p:pic>
+        <p:nvPicPr>
+          <p:cNvPr id="6" name="Picture 5"/>
+          <p:cNvPicPr>
+            <a:picLocks noChangeAspect="1"/>
+          </p:cNvPicPr>
+          <p:nvPr/>
+        </p:nvPicPr>
+        <p:blipFill>
+          <a:blip r:embed="rId2">
+            <a:extLst>
+              <a:ext uri="{28A0092B-C50C-407E-A947-70E740481C1C}">
+                <a14:useLocalDpi xmlns:a14="http://schemas.microsoft.com/office/drawing/2010/main" val="0"/>
+              </a:ext>
+            </a:extLst>
+          </a:blip>
+          <a:stretch>
+            <a:fillRect/>
+          </a:stretch>
+        </p:blipFill>
+        <p:spPr>
+          <a:xfrm>
+            <a:off x="1543700" y="1590690"/>
+            <a:ext cx="9104601" cy="4931659"/>
+          </a:xfrm>
+          <a:prstGeom prst="rect">
+            <a:avLst/>
+          </a:prstGeom>
+          <a:ln>
+            <a:solidFill>
+              <a:schemeClr val="bg2">
+                <a:lumMod val="75000"/>
+              </a:schemeClr>
+            </a:solidFill>
+          </a:ln>
+        </p:spPr>
+      </p:pic>
+      <p:sp>
+        <p:nvSpPr>
+          <p:cNvPr id="7" name="Rounded Rectangular Callout 6"/>
+          <p:cNvSpPr/>
+          <p:nvPr/>
+        </p:nvSpPr>
+        <p:spPr bwMode="auto">
+          <a:xfrm>
+            <a:off x="156000" y="3699000"/>
+            <a:ext cx="3105000" cy="1980000"/>
+          </a:xfrm>
+          <a:prstGeom prst="wedgeRoundRectCallout">
+            <a:avLst>
+              <a:gd name="adj1" fmla="val 45569"/>
+              <a:gd name="adj2" fmla="val -70588"/>
+              <a:gd name="adj3" fmla="val 16667"/>
+            </a:avLst>
+          </a:prstGeom>
+          <a:solidFill>
+            <a:schemeClr val="dk2">
+              <a:alpha val="80000"/>
+            </a:schemeClr>
+          </a:solidFill>
+          <a:ln w="19050">
+            <a:solidFill>
+              <a:schemeClr val="tx1">
+                <a:lumMod val="75000"/>
+                <a:alpha val="80000"/>
+              </a:schemeClr>
+            </a:solidFill>
+          </a:ln>
+          <a:effectLst/>
+        </p:spPr>
+        <p:style>
+          <a:lnRef idx="2">
+            <a:schemeClr val="accent1">
+              <a:shade val="50000"/>
+            </a:schemeClr>
+          </a:lnRef>
+          <a:fillRef idx="1001">
+            <a:schemeClr val="dk2"/>
+          </a:fillRef>
+          <a:effectRef idx="0">
+            <a:schemeClr val="accent1"/>
+          </a:effectRef>
+          <a:fontRef idx="minor">
+            <a:schemeClr val="lt1"/>
+          </a:fontRef>
+        </p:style>
+        <p:txBody>
+          <a:bodyPr rot="0" spcFirstLastPara="0" vertOverflow="overflow" horzOverflow="overflow" vert="horz" wrap="square" lIns="91440" tIns="45720" rIns="91440" bIns="45720" numCol="1" spcCol="0" rtlCol="0" fromWordArt="0" anchor="ctr" anchorCtr="0" forceAA="0" compatLnSpc="1">
+            <a:prstTxWarp prst="textNoShape">
+              <a:avLst/>
+            </a:prstTxWarp>
+            <a:noAutofit/>
+          </a:bodyPr>
+          <a:lstStyle/>
+          <a:p>
+            <a:pPr algn="ctr"/>
+            <a:r>
+              <a:rPr lang="bg-BG" sz="2800" b="1" dirty="0" smtClean="0">
+                <a:solidFill>
+                  <a:srgbClr val="FFFFFF"/>
+                </a:solidFill>
+                <a:effectLst>
+                  <a:outerShdw blurRad="38100" dist="38100" dir="2700000" algn="tl">
+                    <a:srgbClr val="000000">
+                      <a:alpha val="43137"/>
+                    </a:srgbClr>
+                  </a:outerShdw>
+                </a:effectLst>
+              </a:rPr>
+              <a:t>Това са всички аудио файлове, които се намират в папката </a:t>
+            </a:r>
+            <a:r>
+              <a:rPr lang="en-US" sz="2800" b="1" dirty="0" smtClean="0">
+                <a:solidFill>
+                  <a:schemeClr val="bg1">
+                    <a:lumMod val="60000"/>
+                    <a:lumOff val="40000"/>
+                  </a:schemeClr>
+                </a:solidFill>
+                <a:effectLst>
+                  <a:outerShdw blurRad="38100" dist="38100" dir="2700000" algn="tl">
+                    <a:srgbClr val="000000">
+                      <a:alpha val="43137"/>
+                    </a:srgbClr>
+                  </a:outerShdw>
+                </a:effectLst>
+              </a:rPr>
+              <a:t>Music</a:t>
+            </a:r>
+            <a:endParaRPr lang="en-US" sz="2800" b="1" dirty="0">
+              <a:solidFill>
+                <a:schemeClr val="bg1">
+                  <a:lumMod val="60000"/>
+                  <a:lumOff val="40000"/>
+                </a:schemeClr>
+              </a:solidFill>
+              <a:effectLst>
+                <a:outerShdw blurRad="38100" dist="38100" dir="2700000" algn="tl">
+                  <a:srgbClr val="000000">
+                    <a:alpha val="43137"/>
+                  </a:srgbClr>
+                </a:outerShdw>
+              </a:effectLst>
+            </a:endParaRPr>
+          </a:p>
+        </p:txBody>
+      </p:sp>
+      <p:sp>
+        <p:nvSpPr>
+          <p:cNvPr id="9" name="Rounded Rectangular Callout 8"/>
+          <p:cNvSpPr/>
+          <p:nvPr/>
+        </p:nvSpPr>
+        <p:spPr bwMode="auto">
+          <a:xfrm>
+            <a:off x="3486000" y="4690504"/>
+            <a:ext cx="1980000" cy="898495"/>
+          </a:xfrm>
+          <a:prstGeom prst="wedgeRoundRectCallout">
+            <a:avLst>
+              <a:gd name="adj1" fmla="val 63496"/>
+              <a:gd name="adj2" fmla="val 112904"/>
+              <a:gd name="adj3" fmla="val 16667"/>
+            </a:avLst>
+          </a:prstGeom>
+          <a:solidFill>
+            <a:schemeClr val="dk2">
+              <a:alpha val="80000"/>
+            </a:schemeClr>
+          </a:solidFill>
+          <a:ln w="19050">
+            <a:solidFill>
+              <a:schemeClr val="tx1">
+                <a:lumMod val="75000"/>
+                <a:alpha val="80000"/>
+              </a:schemeClr>
+            </a:solidFill>
+          </a:ln>
+          <a:effectLst/>
+        </p:spPr>
+        <p:style>
+          <a:lnRef idx="2">
+            <a:schemeClr val="accent1">
+              <a:shade val="50000"/>
+            </a:schemeClr>
+          </a:lnRef>
+          <a:fillRef idx="1001">
+            <a:schemeClr val="dk2"/>
+          </a:fillRef>
+          <a:effectRef idx="0">
+            <a:schemeClr val="accent1"/>
+          </a:effectRef>
+          <a:fontRef idx="minor">
+            <a:schemeClr val="lt1"/>
+          </a:fontRef>
+        </p:style>
+        <p:txBody>
+          <a:bodyPr rot="0" spcFirstLastPara="0" vertOverflow="overflow" horzOverflow="overflow" vert="horz" wrap="square" lIns="91440" tIns="45720" rIns="91440" bIns="45720" numCol="1" spcCol="0" rtlCol="0" fromWordArt="0" anchor="ctr" anchorCtr="0" forceAA="0" compatLnSpc="1">
+            <a:prstTxWarp prst="textNoShape">
+              <a:avLst/>
+            </a:prstTxWarp>
+            <a:noAutofit/>
+          </a:bodyPr>
+          <a:lstStyle/>
+          <a:p>
+            <a:pPr algn="ctr"/>
+            <a:r>
+              <a:rPr lang="bg-BG" sz="2800" b="1" dirty="0" smtClean="0">
+                <a:solidFill>
+                  <a:srgbClr val="FFFFFF"/>
+                </a:solidFill>
+                <a:effectLst>
+                  <a:outerShdw blurRad="38100" dist="38100" dir="2700000" algn="tl">
+                    <a:srgbClr val="000000">
+                      <a:alpha val="43137"/>
+                    </a:srgbClr>
+                  </a:outerShdw>
+                </a:effectLst>
+              </a:rPr>
+              <a:t>Предишен запис</a:t>
+            </a:r>
+            <a:endParaRPr lang="en-US" sz="2800" b="1" dirty="0">
+              <a:solidFill>
+                <a:schemeClr val="bg1">
+                  <a:lumMod val="60000"/>
+                  <a:lumOff val="40000"/>
+                </a:schemeClr>
+              </a:solidFill>
+              <a:effectLst>
+                <a:outerShdw blurRad="38100" dist="38100" dir="2700000" algn="tl">
+                  <a:srgbClr val="000000">
+                    <a:alpha val="43137"/>
+                  </a:srgbClr>
+                </a:outerShdw>
+              </a:effectLst>
+            </a:endParaRPr>
+          </a:p>
+        </p:txBody>
+      </p:sp>
+      <p:sp>
+        <p:nvSpPr>
+          <p:cNvPr id="10" name="Rounded Rectangular Callout 9"/>
+          <p:cNvSpPr/>
+          <p:nvPr/>
+        </p:nvSpPr>
+        <p:spPr bwMode="auto">
+          <a:xfrm>
+            <a:off x="5556000" y="4464000"/>
+            <a:ext cx="2007600" cy="881096"/>
+          </a:xfrm>
+          <a:prstGeom prst="wedgeRoundRectCallout">
+            <a:avLst>
+              <a:gd name="adj1" fmla="val -23463"/>
+              <a:gd name="adj2" fmla="val 134136"/>
+              <a:gd name="adj3" fmla="val 16667"/>
+            </a:avLst>
+          </a:prstGeom>
+          <a:solidFill>
+            <a:schemeClr val="dk2">
+              <a:alpha val="80000"/>
+            </a:schemeClr>
+          </a:solidFill>
+          <a:ln w="19050">
+            <a:solidFill>
+              <a:schemeClr val="tx1">
+                <a:lumMod val="75000"/>
+                <a:alpha val="80000"/>
+              </a:schemeClr>
+            </a:solidFill>
+          </a:ln>
+          <a:effectLst/>
+        </p:spPr>
+        <p:style>
+          <a:lnRef idx="2">
+            <a:schemeClr val="accent1">
+              <a:shade val="50000"/>
+            </a:schemeClr>
+          </a:lnRef>
+          <a:fillRef idx="1001">
+            <a:schemeClr val="dk2"/>
+          </a:fillRef>
+          <a:effectRef idx="0">
+            <a:schemeClr val="accent1"/>
+          </a:effectRef>
+          <a:fontRef idx="minor">
+            <a:schemeClr val="lt1"/>
+          </a:fontRef>
+        </p:style>
+        <p:txBody>
+          <a:bodyPr rot="0" spcFirstLastPara="0" vertOverflow="overflow" horzOverflow="overflow" vert="horz" wrap="square" lIns="91440" tIns="45720" rIns="91440" bIns="45720" numCol="1" spcCol="0" rtlCol="0" fromWordArt="0" anchor="ctr" anchorCtr="0" forceAA="0" compatLnSpc="1">
+            <a:prstTxWarp prst="textNoShape">
+              <a:avLst/>
+            </a:prstTxWarp>
+            <a:noAutofit/>
+          </a:bodyPr>
+          <a:lstStyle/>
+          <a:p>
+            <a:pPr algn="ctr"/>
+            <a:r>
+              <a:rPr lang="bg-BG" sz="2800" b="1" dirty="0" smtClean="0">
+                <a:solidFill>
+                  <a:srgbClr val="FFFFFF"/>
+                </a:solidFill>
+                <a:effectLst>
+                  <a:outerShdw blurRad="38100" dist="38100" dir="2700000" algn="tl">
+                    <a:srgbClr val="000000">
+                      <a:alpha val="43137"/>
+                    </a:srgbClr>
+                  </a:outerShdw>
+                </a:effectLst>
+              </a:rPr>
+              <a:t>Пускане / Спиране</a:t>
+            </a:r>
+            <a:endParaRPr lang="en-US" sz="2800" b="1" dirty="0">
+              <a:solidFill>
+                <a:schemeClr val="bg1">
+                  <a:lumMod val="60000"/>
+                  <a:lumOff val="40000"/>
+                </a:schemeClr>
+              </a:solidFill>
+              <a:effectLst>
+                <a:outerShdw blurRad="38100" dist="38100" dir="2700000" algn="tl">
+                  <a:srgbClr val="000000">
+                    <a:alpha val="43137"/>
+                  </a:srgbClr>
+                </a:outerShdw>
+              </a:effectLst>
+            </a:endParaRPr>
+          </a:p>
+        </p:txBody>
+      </p:sp>
+      <p:sp>
+        <p:nvSpPr>
+          <p:cNvPr id="11" name="Rounded Rectangular Callout 10"/>
+          <p:cNvSpPr/>
+          <p:nvPr/>
+        </p:nvSpPr>
+        <p:spPr bwMode="auto">
+          <a:xfrm>
+            <a:off x="7675377" y="4741166"/>
+            <a:ext cx="2007600" cy="881096"/>
+          </a:xfrm>
+          <a:prstGeom prst="wedgeRoundRectCallout">
+            <a:avLst>
+              <a:gd name="adj1" fmla="val -110002"/>
+              <a:gd name="adj2" fmla="val 108663"/>
+              <a:gd name="adj3" fmla="val 16667"/>
+            </a:avLst>
+          </a:prstGeom>
+          <a:solidFill>
+            <a:schemeClr val="dk2">
+              <a:alpha val="80000"/>
+            </a:schemeClr>
+          </a:solidFill>
+          <a:ln w="19050">
+            <a:solidFill>
+              <a:schemeClr val="tx1">
+                <a:lumMod val="75000"/>
+                <a:alpha val="80000"/>
+              </a:schemeClr>
+            </a:solidFill>
+          </a:ln>
+          <a:effectLst/>
+        </p:spPr>
+        <p:style>
+          <a:lnRef idx="2">
+            <a:schemeClr val="accent1">
+              <a:shade val="50000"/>
+            </a:schemeClr>
+          </a:lnRef>
+          <a:fillRef idx="1001">
+            <a:schemeClr val="dk2"/>
+          </a:fillRef>
+          <a:effectRef idx="0">
+            <a:schemeClr val="accent1"/>
+          </a:effectRef>
+          <a:fontRef idx="minor">
+            <a:schemeClr val="lt1"/>
+          </a:fontRef>
+        </p:style>
+        <p:txBody>
+          <a:bodyPr rot="0" spcFirstLastPara="0" vertOverflow="overflow" horzOverflow="overflow" vert="horz" wrap="square" lIns="91440" tIns="45720" rIns="91440" bIns="45720" numCol="1" spcCol="0" rtlCol="0" fromWordArt="0" anchor="ctr" anchorCtr="0" forceAA="0" compatLnSpc="1">
+            <a:prstTxWarp prst="textNoShape">
+              <a:avLst/>
+            </a:prstTxWarp>
+            <a:noAutofit/>
+          </a:bodyPr>
+          <a:lstStyle/>
+          <a:p>
+            <a:pPr algn="ctr"/>
+            <a:r>
+              <a:rPr lang="bg-BG" sz="2800" b="1" dirty="0" smtClean="0">
+                <a:solidFill>
+                  <a:srgbClr val="FFFFFF"/>
+                </a:solidFill>
+                <a:effectLst>
+                  <a:outerShdw blurRad="38100" dist="38100" dir="2700000" algn="tl">
+                    <a:srgbClr val="000000">
+                      <a:alpha val="43137"/>
+                    </a:srgbClr>
+                  </a:outerShdw>
+                </a:effectLst>
+              </a:rPr>
+              <a:t>Следващ запис</a:t>
+            </a:r>
+            <a:endParaRPr lang="en-US" sz="2800" b="1" dirty="0">
+              <a:solidFill>
+                <a:schemeClr val="bg1">
+                  <a:lumMod val="60000"/>
+                  <a:lumOff val="40000"/>
+                </a:schemeClr>
+              </a:solidFill>
+              <a:effectLst>
+                <a:outerShdw blurRad="38100" dist="38100" dir="2700000" algn="tl">
+                  <a:srgbClr val="000000">
+                    <a:alpha val="43137"/>
+                  </a:srgbClr>
+                </a:outerShdw>
+              </a:effectLst>
+            </a:endParaRPr>
+          </a:p>
+        </p:txBody>
+      </p:sp>
+      <p:sp>
+        <p:nvSpPr>
+          <p:cNvPr id="12" name="Rounded Rectangular Callout 11"/>
+          <p:cNvSpPr/>
+          <p:nvPr/>
+        </p:nvSpPr>
+        <p:spPr bwMode="auto">
+          <a:xfrm>
+            <a:off x="9238039" y="3573802"/>
+            <a:ext cx="2820524" cy="965434"/>
+          </a:xfrm>
+          <a:prstGeom prst="wedgeRoundRectCallout">
+            <a:avLst>
+              <a:gd name="adj1" fmla="val -24476"/>
+              <a:gd name="adj2" fmla="val 204769"/>
+              <a:gd name="adj3" fmla="val 16667"/>
+            </a:avLst>
+          </a:prstGeom>
+          <a:solidFill>
+            <a:schemeClr val="dk2">
+              <a:alpha val="80000"/>
+            </a:schemeClr>
+          </a:solidFill>
+          <a:ln w="19050">
+            <a:solidFill>
+              <a:schemeClr val="tx1">
+                <a:lumMod val="75000"/>
+                <a:alpha val="80000"/>
+              </a:schemeClr>
+            </a:solidFill>
+          </a:ln>
+          <a:effectLst/>
+        </p:spPr>
+        <p:style>
+          <a:lnRef idx="2">
+            <a:schemeClr val="accent1">
+              <a:shade val="50000"/>
+            </a:schemeClr>
+          </a:lnRef>
+          <a:fillRef idx="1001">
+            <a:schemeClr val="dk2"/>
+          </a:fillRef>
+          <a:effectRef idx="0">
+            <a:schemeClr val="accent1"/>
+          </a:effectRef>
+          <a:fontRef idx="minor">
+            <a:schemeClr val="lt1"/>
+          </a:fontRef>
+        </p:style>
+        <p:txBody>
+          <a:bodyPr rot="0" spcFirstLastPara="0" vertOverflow="overflow" horzOverflow="overflow" vert="horz" wrap="square" lIns="91440" tIns="45720" rIns="91440" bIns="45720" numCol="1" spcCol="0" rtlCol="0" fromWordArt="0" anchor="ctr" anchorCtr="0" forceAA="0" compatLnSpc="1">
+            <a:prstTxWarp prst="textNoShape">
+              <a:avLst/>
+            </a:prstTxWarp>
+            <a:noAutofit/>
+          </a:bodyPr>
+          <a:lstStyle/>
+          <a:p>
+            <a:pPr algn="ctr"/>
+            <a:r>
+              <a:rPr lang="bg-BG" sz="2800" b="1" dirty="0" smtClean="0">
+                <a:solidFill>
+                  <a:srgbClr val="FFFFFF"/>
+                </a:solidFill>
+                <a:effectLst>
+                  <a:outerShdw blurRad="38100" dist="38100" dir="2700000" algn="tl">
+                    <a:srgbClr val="000000">
+                      <a:alpha val="43137"/>
+                    </a:srgbClr>
+                  </a:outerShdw>
+                </a:effectLst>
+              </a:rPr>
+              <a:t>Регулация на силата на звука</a:t>
+            </a:r>
+            <a:endParaRPr lang="en-US" sz="2800" b="1" dirty="0">
+              <a:solidFill>
+                <a:schemeClr val="bg1">
+                  <a:lumMod val="60000"/>
+                  <a:lumOff val="40000"/>
+                </a:schemeClr>
+              </a:solidFill>
+              <a:effectLst>
+                <a:outerShdw blurRad="38100" dist="38100" dir="2700000" algn="tl">
+                  <a:srgbClr val="000000">
+                    <a:alpha val="43137"/>
+                  </a:srgbClr>
+                </a:outerShdw>
+              </a:effectLst>
+            </a:endParaRPr>
+          </a:p>
+        </p:txBody>
+      </p:sp>
+    </p:spTree>
+    <p:extLst>
+      <p:ext uri="{BB962C8B-B14F-4D97-AF65-F5344CB8AC3E}">
+        <p14:creationId xmlns:p14="http://schemas.microsoft.com/office/powerpoint/2010/main" val="2178815444"/>
+      </p:ext>
+    </p:extLst>
+  </p:cSld>
+  <p:clrMapOvr>
+    <a:masterClrMapping/>
+  </p:clrMapOvr>
+  <mc:AlternateContent xmlns:mc="http://schemas.openxmlformats.org/markup-compatibility/2006" xmlns:p14="http://schemas.microsoft.com/office/powerpoint/2010/main">
+    <mc:Choice Requires="p14">
+      <p:transition spd="slow" p14:dur="2000" advClick="0" advTm="5000"/>
+    </mc:Choice>
+    <mc:Fallback xmlns="">
+      <p:transition spd="slow" advClick="0" advTm="5000"/>
+    </mc:Fallback>
+  </mc:AlternateContent>
+  <p:timing>
+    <p:tnLst>
+      <p:par>
+        <p:cTn id="1" dur="indefinite" restart="never" nodeType="tmRoot">
+          <p:childTnLst>
+            <p:seq concurrent="1" nextAc="seek">
+              <p:cTn id="2" dur="indefinite" nodeType="mainSeq">
+                <p:childTnLst>
+                  <p:par>
+                    <p:cTn id="3" fill="hold">
+                      <p:stCondLst>
+                        <p:cond delay="indefinite"/>
+                      </p:stCondLst>
+                      <p:childTnLst>
+                        <p:par>
+                          <p:cTn id="4" fill="hold">
+                            <p:stCondLst>
+                              <p:cond delay="0"/>
+                            </p:stCondLst>
+                            <p:childTnLst>
+                              <p:par>
+                                <p:cTn id="5" presetID="1" presetClass="entr" presetSubtype="0" fill="hold" grpId="0" nodeType="clickEffect">
+                                  <p:stCondLst>
+                                    <p:cond delay="0"/>
+                                  </p:stCondLst>
+                                  <p:childTnLst>
+                                    <p:set>
+                                      <p:cBhvr>
+                                        <p:cTn id="6" dur="1" fill="hold">
+                                          <p:stCondLst>
+                                            <p:cond delay="0"/>
+                                          </p:stCondLst>
+                                        </p:cTn>
+                                        <p:tgtEl>
+                                          <p:spTgt spid="7"/>
+                                        </p:tgtEl>
+                                        <p:attrNameLst>
+                                          <p:attrName>style.visibility</p:attrName>
+                                        </p:attrNameLst>
+                                      </p:cBhvr>
+                                      <p:to>
+                                        <p:strVal val="visible"/>
+                                      </p:to>
+                                    </p:set>
+                                  </p:childTnLst>
+                                </p:cTn>
+                              </p:par>
+                            </p:childTnLst>
+                          </p:cTn>
+                        </p:par>
+                      </p:childTnLst>
+                    </p:cTn>
+                  </p:par>
+                  <p:par>
+                    <p:cTn id="7" fill="hold">
+                      <p:stCondLst>
+                        <p:cond delay="indefinite"/>
+                      </p:stCondLst>
+                      <p:childTnLst>
+                        <p:par>
+                          <p:cTn id="8" fill="hold">
+                            <p:stCondLst>
+                              <p:cond delay="0"/>
+                            </p:stCondLst>
+                            <p:childTnLst>
+                              <p:par>
+                                <p:cTn id="9" presetID="1" presetClass="entr" presetSubtype="0" fill="hold" grpId="0" nodeType="clickEffect">
+                                  <p:stCondLst>
+                                    <p:cond delay="0"/>
+                                  </p:stCondLst>
+                                  <p:childTnLst>
+                                    <p:set>
+                                      <p:cBhvr>
+                                        <p:cTn id="10" dur="1" fill="hold">
+                                          <p:stCondLst>
+                                            <p:cond delay="0"/>
+                                          </p:stCondLst>
+                                        </p:cTn>
+                                        <p:tgtEl>
+                                          <p:spTgt spid="9"/>
+                                        </p:tgtEl>
+                                        <p:attrNameLst>
+                                          <p:attrName>style.visibility</p:attrName>
+                                        </p:attrNameLst>
+                                      </p:cBhvr>
+                                      <p:to>
+                                        <p:strVal val="visible"/>
+                                      </p:to>
+                                    </p:set>
+                                  </p:childTnLst>
+                                </p:cTn>
+                              </p:par>
+                            </p:childTnLst>
+                          </p:cTn>
+                        </p:par>
+                      </p:childTnLst>
+                    </p:cTn>
+                  </p:par>
+                  <p:par>
+                    <p:cTn id="11" fill="hold">
+                      <p:stCondLst>
+                        <p:cond delay="indefinite"/>
+                      </p:stCondLst>
+                      <p:childTnLst>
+                        <p:par>
+                          <p:cTn id="12" fill="hold">
+                            <p:stCondLst>
+                              <p:cond delay="0"/>
+                            </p:stCondLst>
+                            <p:childTnLst>
+                              <p:par>
+                                <p:cTn id="13" presetID="1" presetClass="entr" presetSubtype="0" fill="hold" grpId="0" nodeType="clickEffect">
+                                  <p:stCondLst>
+                                    <p:cond delay="0"/>
+                                  </p:stCondLst>
+                                  <p:childTnLst>
+                                    <p:set>
+                                      <p:cBhvr>
+                                        <p:cTn id="14" dur="1" fill="hold">
+                                          <p:stCondLst>
+                                            <p:cond delay="0"/>
+                                          </p:stCondLst>
+                                        </p:cTn>
+                                        <p:tgtEl>
+                                          <p:spTgt spid="10"/>
+                                        </p:tgtEl>
+                                        <p:attrNameLst>
+                                          <p:attrName>style.visibility</p:attrName>
+                                        </p:attrNameLst>
+                                      </p:cBhvr>
+                                      <p:to>
+                                        <p:strVal val="visible"/>
+                                      </p:to>
+                                    </p:set>
+                                  </p:childTnLst>
+                                </p:cTn>
+                              </p:par>
+                            </p:childTnLst>
+                          </p:cTn>
+                        </p:par>
+                      </p:childTnLst>
+                    </p:cTn>
+                  </p:par>
+                  <p:par>
+                    <p:cTn id="15" fill="hold">
+                      <p:stCondLst>
+                        <p:cond delay="indefinite"/>
+                      </p:stCondLst>
+                      <p:childTnLst>
+                        <p:par>
+                          <p:cTn id="16" fill="hold">
+                            <p:stCondLst>
+                              <p:cond delay="0"/>
+                            </p:stCondLst>
+                            <p:childTnLst>
+                              <p:par>
+                                <p:cTn id="17" presetID="1" presetClass="entr" presetSubtype="0" fill="hold" grpId="0" nodeType="clickEffect">
+                                  <p:stCondLst>
+                                    <p:cond delay="0"/>
+                                  </p:stCondLst>
+                                  <p:childTnLst>
+                                    <p:set>
+                                      <p:cBhvr>
+                                        <p:cTn id="18" dur="1" fill="hold">
+                                          <p:stCondLst>
+                                            <p:cond delay="0"/>
+                                          </p:stCondLst>
+                                        </p:cTn>
+                                        <p:tgtEl>
+                                          <p:spTgt spid="11"/>
+                                        </p:tgtEl>
+                                        <p:attrNameLst>
+                                          <p:attrName>style.visibility</p:attrName>
+                                        </p:attrNameLst>
+                                      </p:cBhvr>
+                                      <p:to>
+                                        <p:strVal val="visible"/>
+                                      </p:to>
+                                    </p:set>
+                                  </p:childTnLst>
+                                </p:cTn>
+                              </p:par>
+                            </p:childTnLst>
+                          </p:cTn>
+                        </p:par>
+                      </p:childTnLst>
+                    </p:cTn>
+                  </p:par>
+                  <p:par>
+                    <p:cTn id="19" fill="hold">
+                      <p:stCondLst>
+                        <p:cond delay="indefinite"/>
+                      </p:stCondLst>
+                      <p:childTnLst>
+                        <p:par>
+                          <p:cTn id="20" fill="hold">
+                            <p:stCondLst>
+                              <p:cond delay="0"/>
+                            </p:stCondLst>
+                            <p:childTnLst>
+                              <p:par>
+                                <p:cTn id="21" presetID="1" presetClass="entr" presetSubtype="0" fill="hold" grpId="0" nodeType="clickEffect">
+                                  <p:stCondLst>
+                                    <p:cond delay="0"/>
+                                  </p:stCondLst>
+                                  <p:childTnLst>
+                                    <p:set>
+                                      <p:cBhvr>
+                                        <p:cTn id="22" dur="1" fill="hold">
+                                          <p:stCondLst>
+                                            <p:cond delay="0"/>
+                                          </p:stCondLst>
+                                        </p:cTn>
+                                        <p:tgtEl>
+                                          <p:spTgt spid="12"/>
+                                        </p:tgtEl>
+                                        <p:attrNameLst>
+                                          <p:attrName>style.visibility</p:attrName>
+                                        </p:attrNameLst>
+                                      </p:cBhvr>
+                                      <p:to>
+                                        <p:strVal val="visible"/>
+                                      </p:to>
+                                    </p:set>
+                                  </p:childTnLst>
+                                </p:cTn>
+                              </p:par>
+                            </p:childTnLst>
+                          </p:cTn>
+                        </p:par>
+                      </p:childTnLst>
+                    </p:cTn>
+                  </p:par>
+                </p:childTnLst>
+              </p:cTn>
+              <p:prevCondLst>
+                <p:cond evt="onPrev" delay="0">
+                  <p:tgtEl>
+                    <p:sldTgt/>
+                  </p:tgtEl>
+                </p:cond>
+              </p:prevCondLst>
+              <p:nextCondLst>
+                <p:cond evt="onNext" delay="0">
+                  <p:tgtEl>
+                    <p:sldTgt/>
+                  </p:tgtEl>
+                </p:cond>
+              </p:nextCondLst>
+            </p:seq>
+          </p:childTnLst>
+        </p:cTn>
+      </p:par>
+    </p:tnLst>
+    <p:bldLst>
+      <p:bldP spid="7" grpId="0" animBg="1"/>
+      <p:bldP spid="9" grpId="0" animBg="1"/>
+      <p:bldP spid="10" grpId="0" animBg="1"/>
+      <p:bldP spid="11" grpId="0" animBg="1"/>
+      <p:bldP spid="12" grpId="0" animBg="1"/>
+    </p:bldLst>
+  </p:timing>
+</p:sld>
+</file>
+
+<file path=ppt/slides/slide13.xml><?xml version="1.0" encoding="utf-8"?>
+<p:sld xmlns:a="http://schemas.openxmlformats.org/drawingml/2006/main" xmlns:r="http://schemas.openxmlformats.org/officeDocument/2006/relationships" xmlns:p="http://schemas.openxmlformats.org/presentationml/2006/main">
+  <p:cSld>
+    <p:spTree>
+      <p:nvGrpSpPr>
+        <p:cNvPr id="1" name=""/>
+        <p:cNvGrpSpPr/>
+        <p:nvPr/>
+      </p:nvGrpSpPr>
+      <p:grpSpPr>
+        <a:xfrm>
+          <a:off x="0" y="0"/>
+          <a:ext cx="0" cy="0"/>
+          <a:chOff x="0" y="0"/>
+          <a:chExt cx="0" cy="0"/>
+        </a:xfrm>
+      </p:grpSpPr>
+      <p:sp>
+        <p:nvSpPr>
+          <p:cNvPr id="2" name="Slide Number Placeholder 1"/>
+          <p:cNvSpPr>
+            <a:spLocks noGrp="1"/>
+          </p:cNvSpPr>
+          <p:nvPr>
+            <p:ph type="sldNum" sz="quarter" idx="5"/>
+          </p:nvPr>
+        </p:nvSpPr>
+        <p:spPr/>
+        <p:txBody>
+          <a:bodyPr/>
+          <a:lstStyle/>
+          <a:p>
+            <a:fld id="{2BF067CD-8E6B-4360-9AA8-C5DF2A48A6D1}" type="slidenum">
+              <a:rPr lang="en-US" noProof="0" smtClean="0"/>
+              <a:pPr/>
+              <a:t>13</a:t>
+            </a:fld>
+            <a:endParaRPr lang="en-US" noProof="0" dirty="0"/>
+          </a:p>
+        </p:txBody>
+      </p:sp>
+      <p:sp>
+        <p:nvSpPr>
+          <p:cNvPr id="3" name="Text Placeholder 2"/>
+          <p:cNvSpPr>
+            <a:spLocks noGrp="1"/>
+          </p:cNvSpPr>
+          <p:nvPr>
+            <p:ph type="body" sz="quarter" idx="10"/>
+          </p:nvPr>
+        </p:nvSpPr>
+        <p:spPr/>
+        <p:txBody>
+          <a:bodyPr/>
+          <a:lstStyle/>
+          <a:p>
+            <a:r>
+              <a:rPr lang="bg-BG" dirty="0" smtClean="0"/>
+              <a:t>Отворете файла </a:t>
+            </a:r>
+            <a:r>
+              <a:rPr lang="en-US" b="1" dirty="0" smtClean="0">
+                <a:solidFill>
+                  <a:schemeClr val="bg1"/>
+                </a:solidFill>
+              </a:rPr>
+              <a:t>Norwegian_Wood.mp3</a:t>
+            </a:r>
+            <a:r>
+              <a:rPr lang="bg-BG" b="1" dirty="0" smtClean="0">
+                <a:solidFill>
+                  <a:schemeClr val="bg1"/>
+                </a:solidFill>
+              </a:rPr>
+              <a:t> </a:t>
+            </a:r>
+            <a:r>
+              <a:rPr lang="bg-BG" dirty="0" smtClean="0"/>
+              <a:t>и изслушайте песента</a:t>
+            </a:r>
+            <a:r>
+              <a:rPr lang="en-US" dirty="0" smtClean="0"/>
+              <a:t>.</a:t>
+            </a:r>
+            <a:r>
+              <a:rPr lang="bg-BG" dirty="0"/>
+              <a:t> </a:t>
+            </a:r>
+            <a:r>
+              <a:rPr lang="bg-BG" dirty="0" smtClean="0"/>
+              <a:t>Споделете дали я харесвате.</a:t>
+            </a:r>
+            <a:r>
+              <a:rPr lang="en-US" dirty="0" smtClean="0"/>
+              <a:t> </a:t>
+            </a:r>
+            <a:r>
+              <a:rPr lang="bg-BG" dirty="0" smtClean="0"/>
+              <a:t>Чували ли сте песента и преди?</a:t>
+            </a:r>
+            <a:endParaRPr lang="en-US" b="1" dirty="0">
+              <a:solidFill>
+                <a:schemeClr val="bg1"/>
+              </a:solidFill>
+            </a:endParaRPr>
+          </a:p>
+        </p:txBody>
+      </p:sp>
+      <p:sp>
+        <p:nvSpPr>
+          <p:cNvPr id="4" name="Title 3"/>
+          <p:cNvSpPr>
+            <a:spLocks noGrp="1"/>
+          </p:cNvSpPr>
+          <p:nvPr>
+            <p:ph type="title"/>
+          </p:nvPr>
+        </p:nvSpPr>
+        <p:spPr/>
+        <p:txBody>
+          <a:bodyPr/>
+          <a:lstStyle/>
+          <a:p>
+            <a:r>
+              <a:rPr lang="bg-BG" dirty="0" smtClean="0"/>
+              <a:t>Задача: Слушане на музика</a:t>
+            </a:r>
+            <a:endParaRPr lang="en-US" dirty="0"/>
+          </a:p>
+        </p:txBody>
+      </p:sp>
+      <p:pic>
+        <p:nvPicPr>
+          <p:cNvPr id="5" name="Picture 4"/>
+          <p:cNvPicPr>
+            <a:picLocks noChangeAspect="1"/>
+          </p:cNvPicPr>
+          <p:nvPr/>
+        </p:nvPicPr>
+        <p:blipFill>
+          <a:blip r:embed="rId2" cstate="print">
+            <a:extLst>
+              <a:ext uri="{28A0092B-C50C-407E-A947-70E740481C1C}">
+                <a14:useLocalDpi xmlns:a14="http://schemas.microsoft.com/office/drawing/2010/main" val="0"/>
+              </a:ext>
+            </a:extLst>
+          </a:blip>
+          <a:stretch>
+            <a:fillRect/>
+          </a:stretch>
+        </p:blipFill>
+        <p:spPr>
+          <a:xfrm>
+            <a:off x="4140225" y="2709000"/>
+            <a:ext cx="3911550" cy="3872435"/>
+          </a:xfrm>
+          <a:prstGeom prst="rect">
+            <a:avLst/>
+          </a:prstGeom>
+          <a:ln>
+            <a:solidFill>
+              <a:schemeClr val="bg2">
+                <a:lumMod val="75000"/>
+              </a:schemeClr>
+            </a:solidFill>
+          </a:ln>
+        </p:spPr>
+      </p:pic>
+    </p:spTree>
+    <p:extLst>
+      <p:ext uri="{BB962C8B-B14F-4D97-AF65-F5344CB8AC3E}">
+        <p14:creationId xmlns:p14="http://schemas.microsoft.com/office/powerpoint/2010/main" val="1663855977"/>
+      </p:ext>
+    </p:extLst>
+  </p:cSld>
+  <p:clrMapOvr>
+    <a:masterClrMapping/>
+  </p:clrMapOvr>
+  <mc:AlternateContent xmlns:mc="http://schemas.openxmlformats.org/markup-compatibility/2006" xmlns:p14="http://schemas.microsoft.com/office/powerpoint/2010/main">
+    <mc:Choice Requires="p14">
+      <p:transition spd="slow" p14:dur="2000" advClick="0" advTm="5000"/>
+    </mc:Choice>
+    <mc:Fallback xmlns="">
+      <p:transition spd="slow" advClick="0" advTm="5000"/>
+    </mc:Fallback>
+  </mc:AlternateContent>
+  <p:timing>
+    <p:tnLst>
+      <p:par>
+        <p:cTn id="1" dur="indefinite" restart="never" nodeType="tmRoot"/>
+      </p:par>
+    </p:tnLst>
+  </p:timing>
+</p:sld>
+</file>
+
+<file path=ppt/slides/slide14.xml><?xml version="1.0" encoding="utf-8"?>
+<p:sld xmlns:a="http://schemas.openxmlformats.org/drawingml/2006/main" xmlns:r="http://schemas.openxmlformats.org/officeDocument/2006/relationships" xmlns:p="http://schemas.openxmlformats.org/presentationml/2006/main">
+  <p:cSld>
+    <p:spTree>
+      <p:nvGrpSpPr>
+        <p:cNvPr id="1" name=""/>
+        <p:cNvGrpSpPr/>
+        <p:nvPr/>
+      </p:nvGrpSpPr>
+      <p:grpSpPr>
+        <a:xfrm>
+          <a:off x="0" y="0"/>
+          <a:ext cx="0" cy="0"/>
+          <a:chOff x="0" y="0"/>
+          <a:chExt cx="0" cy="0"/>
+        </a:xfrm>
+      </p:grpSpPr>
+      <p:sp>
+        <p:nvSpPr>
+          <p:cNvPr id="2" name="Slide Number Placeholder 1"/>
+          <p:cNvSpPr>
+            <a:spLocks noGrp="1"/>
+          </p:cNvSpPr>
+          <p:nvPr>
+            <p:ph type="sldNum" sz="quarter" idx="5"/>
+          </p:nvPr>
+        </p:nvSpPr>
+        <p:spPr/>
+        <p:txBody>
+          <a:bodyPr/>
+          <a:lstStyle/>
+          <a:p>
+            <a:fld id="{2BF067CD-8E6B-4360-9AA8-C5DF2A48A6D1}" type="slidenum">
+              <a:rPr lang="en-US" noProof="0" smtClean="0"/>
+              <a:pPr/>
+              <a:t>14</a:t>
+            </a:fld>
+            <a:endParaRPr lang="en-US" noProof="0" dirty="0"/>
+          </a:p>
+        </p:txBody>
+      </p:sp>
+      <p:sp>
+        <p:nvSpPr>
+          <p:cNvPr id="4" name="Title 3"/>
+          <p:cNvSpPr>
+            <a:spLocks noGrp="1"/>
+          </p:cNvSpPr>
+          <p:nvPr>
+            <p:ph type="title"/>
+          </p:nvPr>
+        </p:nvSpPr>
+        <p:spPr/>
+        <p:txBody>
+          <a:bodyPr/>
+          <a:lstStyle/>
+          <a:p>
+            <a:r>
+              <a:rPr lang="en-US" dirty="0" smtClean="0"/>
+              <a:t>Movies &amp; TV</a:t>
+            </a:r>
+            <a:endParaRPr lang="en-US" dirty="0"/>
+          </a:p>
+        </p:txBody>
+      </p:sp>
+      <p:pic>
+        <p:nvPicPr>
+          <p:cNvPr id="5" name="Picture 4"/>
+          <p:cNvPicPr>
+            <a:picLocks noChangeAspect="1"/>
+          </p:cNvPicPr>
+          <p:nvPr/>
+        </p:nvPicPr>
+        <p:blipFill>
+          <a:blip r:embed="rId2">
+            <a:extLst>
+              <a:ext uri="{28A0092B-C50C-407E-A947-70E740481C1C}">
+                <a14:useLocalDpi xmlns:a14="http://schemas.microsoft.com/office/drawing/2010/main" val="0"/>
+              </a:ext>
+            </a:extLst>
+          </a:blip>
+          <a:stretch>
+            <a:fillRect/>
+          </a:stretch>
+        </p:blipFill>
+        <p:spPr>
+          <a:xfrm>
+            <a:off x="1056000" y="1198674"/>
+            <a:ext cx="10058400" cy="5456826"/>
+          </a:xfrm>
+          <a:prstGeom prst="rect">
+            <a:avLst/>
+          </a:prstGeom>
+          <a:ln>
+            <a:solidFill>
+              <a:schemeClr val="bg2">
+                <a:lumMod val="75000"/>
+              </a:schemeClr>
+            </a:solidFill>
+          </a:ln>
+        </p:spPr>
+      </p:pic>
+      <p:sp>
+        <p:nvSpPr>
+          <p:cNvPr id="6" name="Rounded Rectangular Callout 5"/>
+          <p:cNvSpPr/>
+          <p:nvPr/>
+        </p:nvSpPr>
+        <p:spPr bwMode="auto">
+          <a:xfrm>
+            <a:off x="6501000" y="2619000"/>
+            <a:ext cx="4095000" cy="1530000"/>
+          </a:xfrm>
+          <a:prstGeom prst="wedgeRoundRectCallout">
+            <a:avLst>
+              <a:gd name="adj1" fmla="val -24893"/>
+              <a:gd name="adj2" fmla="val 26641"/>
+              <a:gd name="adj3" fmla="val 16667"/>
+            </a:avLst>
+          </a:prstGeom>
+          <a:solidFill>
+            <a:schemeClr val="dk2">
+              <a:alpha val="80000"/>
+            </a:schemeClr>
+          </a:solidFill>
+          <a:ln w="19050">
+            <a:solidFill>
+              <a:schemeClr val="tx1">
+                <a:lumMod val="75000"/>
+                <a:alpha val="80000"/>
+              </a:schemeClr>
+            </a:solidFill>
+          </a:ln>
+          <a:effectLst/>
+        </p:spPr>
+        <p:style>
+          <a:lnRef idx="2">
+            <a:schemeClr val="accent1">
+              <a:shade val="50000"/>
+            </a:schemeClr>
+          </a:lnRef>
+          <a:fillRef idx="1001">
+            <a:schemeClr val="dk2"/>
+          </a:fillRef>
+          <a:effectRef idx="0">
+            <a:schemeClr val="accent1"/>
+          </a:effectRef>
+          <a:fontRef idx="minor">
+            <a:schemeClr val="lt1"/>
+          </a:fontRef>
+        </p:style>
+        <p:txBody>
+          <a:bodyPr rot="0" spcFirstLastPara="0" vertOverflow="overflow" horzOverflow="overflow" vert="horz" wrap="square" lIns="91440" tIns="45720" rIns="91440" bIns="45720" numCol="1" spcCol="0" rtlCol="0" fromWordArt="0" anchor="ctr" anchorCtr="0" forceAA="0" compatLnSpc="1">
+            <a:prstTxWarp prst="textNoShape">
+              <a:avLst/>
+            </a:prstTxWarp>
+            <a:noAutofit/>
+          </a:bodyPr>
+          <a:lstStyle/>
+          <a:p>
+            <a:pPr algn="ctr"/>
+            <a:r>
+              <a:rPr lang="bg-BG" sz="2800" b="1" dirty="0" smtClean="0">
+                <a:solidFill>
+                  <a:srgbClr val="FFFFFF"/>
+                </a:solidFill>
+                <a:effectLst>
+                  <a:outerShdw blurRad="38100" dist="38100" dir="2700000" algn="tl">
+                    <a:srgbClr val="000000">
+                      <a:alpha val="43137"/>
+                    </a:srgbClr>
+                  </a:outerShdw>
+                </a:effectLst>
+              </a:rPr>
+              <a:t>Тук се визуализират всички видео файлове в папката </a:t>
+            </a:r>
+            <a:r>
+              <a:rPr lang="en-US" sz="2800" b="1" dirty="0" smtClean="0">
+                <a:solidFill>
+                  <a:srgbClr val="FFFFFF"/>
+                </a:solidFill>
+                <a:effectLst>
+                  <a:outerShdw blurRad="38100" dist="38100" dir="2700000" algn="tl">
+                    <a:srgbClr val="000000">
+                      <a:alpha val="43137"/>
+                    </a:srgbClr>
+                  </a:outerShdw>
+                </a:effectLst>
+              </a:rPr>
+              <a:t>Videos</a:t>
+            </a:r>
+            <a:endParaRPr lang="en-US" sz="2800" b="1" dirty="0">
+              <a:solidFill>
+                <a:srgbClr val="FFFFFF"/>
+              </a:solidFill>
+              <a:effectLst>
+                <a:outerShdw blurRad="38100" dist="38100" dir="2700000" algn="tl">
+                  <a:srgbClr val="000000">
+                    <a:alpha val="43137"/>
+                  </a:srgbClr>
+                </a:outerShdw>
+              </a:effectLst>
+            </a:endParaRPr>
+          </a:p>
+        </p:txBody>
+      </p:sp>
+    </p:spTree>
+    <p:extLst>
+      <p:ext uri="{BB962C8B-B14F-4D97-AF65-F5344CB8AC3E}">
+        <p14:creationId xmlns:p14="http://schemas.microsoft.com/office/powerpoint/2010/main" val="1821279797"/>
+      </p:ext>
+    </p:extLst>
+  </p:cSld>
+  <p:clrMapOvr>
+    <a:masterClrMapping/>
+  </p:clrMapOvr>
+  <mc:AlternateContent xmlns:mc="http://schemas.openxmlformats.org/markup-compatibility/2006" xmlns:p14="http://schemas.microsoft.com/office/powerpoint/2010/main">
+    <mc:Choice Requires="p14">
+      <p:transition spd="slow" p14:dur="2000" advClick="0" advTm="5000"/>
+    </mc:Choice>
+    <mc:Fallback xmlns="">
+      <p:transition spd="slow" advClick="0" advTm="5000"/>
+    </mc:Fallback>
+  </mc:AlternateContent>
+  <p:timing>
+    <p:tnLst>
+      <p:par>
+        <p:cTn id="1" dur="indefinite" restart="never" nodeType="tmRoot">
+          <p:childTnLst>
+            <p:seq concurrent="1" nextAc="seek">
+              <p:cTn id="2" dur="indefinite" nodeType="mainSeq">
+                <p:childTnLst>
+                  <p:par>
+                    <p:cTn id="3" fill="hold">
+                      <p:stCondLst>
+                        <p:cond delay="indefinite"/>
+                      </p:stCondLst>
+                      <p:childTnLst>
+                        <p:par>
+                          <p:cTn id="4" fill="hold">
+                            <p:stCondLst>
+                              <p:cond delay="0"/>
+                            </p:stCondLst>
+                            <p:childTnLst>
+                              <p:par>
+                                <p:cTn id="5" presetID="1" presetClass="entr" presetSubtype="0" fill="hold" grpId="0" nodeType="clickEffect">
+                                  <p:stCondLst>
+                                    <p:cond delay="0"/>
+                                  </p:stCondLst>
+                                  <p:childTnLst>
+                                    <p:set>
+                                      <p:cBhvr>
+                                        <p:cTn id="6" dur="1" fill="hold">
+                                          <p:stCondLst>
+                                            <p:cond delay="0"/>
+                                          </p:stCondLst>
+                                        </p:cTn>
+                                        <p:tgtEl>
+                                          <p:spTgt spid="6"/>
+                                        </p:tgtEl>
+                                        <p:attrNameLst>
+                                          <p:attrName>style.visibility</p:attrName>
+                                        </p:attrNameLst>
+                                      </p:cBhvr>
+                                      <p:to>
+                                        <p:strVal val="visible"/>
+                                      </p:to>
+                                    </p:set>
+                                  </p:childTnLst>
+                                </p:cTn>
+                              </p:par>
+                            </p:childTnLst>
+                          </p:cTn>
+                        </p:par>
+                      </p:childTnLst>
+                    </p:cTn>
+                  </p:par>
+                </p:childTnLst>
+              </p:cTn>
+              <p:prevCondLst>
+                <p:cond evt="onPrev" delay="0">
+                  <p:tgtEl>
+                    <p:sldTgt/>
+                  </p:tgtEl>
+                </p:cond>
+              </p:prevCondLst>
+              <p:nextCondLst>
+                <p:cond evt="onNext" delay="0">
+                  <p:tgtEl>
+                    <p:sldTgt/>
+                  </p:tgtEl>
+                </p:cond>
+              </p:nextCondLst>
+            </p:seq>
+          </p:childTnLst>
+        </p:cTn>
+      </p:par>
+    </p:tnLst>
+    <p:bldLst>
+      <p:bldP spid="6" grpId="0" animBg="1"/>
+    </p:bldLst>
+  </p:timing>
+</p:sld>
+</file>
+
+<file path=ppt/slides/slide15.xml><?xml version="1.0" encoding="utf-8"?>
+<p:sld xmlns:a="http://schemas.openxmlformats.org/drawingml/2006/main" xmlns:r="http://schemas.openxmlformats.org/officeDocument/2006/relationships" xmlns:p="http://schemas.openxmlformats.org/presentationml/2006/main">
+  <p:cSld>
+    <p:spTree>
+      <p:nvGrpSpPr>
+        <p:cNvPr id="1" name=""/>
+        <p:cNvGrpSpPr/>
+        <p:nvPr/>
+      </p:nvGrpSpPr>
+      <p:grpSpPr>
+        <a:xfrm>
+          <a:off x="0" y="0"/>
+          <a:ext cx="0" cy="0"/>
+          <a:chOff x="0" y="0"/>
+          <a:chExt cx="0" cy="0"/>
+        </a:xfrm>
+      </p:grpSpPr>
+      <p:sp>
+        <p:nvSpPr>
+          <p:cNvPr id="2" name="Slide Number Placeholder 1"/>
+          <p:cNvSpPr>
+            <a:spLocks noGrp="1"/>
+          </p:cNvSpPr>
+          <p:nvPr>
+            <p:ph type="sldNum" sz="quarter" idx="5"/>
+          </p:nvPr>
+        </p:nvSpPr>
+        <p:spPr/>
+        <p:txBody>
+          <a:bodyPr/>
+          <a:lstStyle/>
+          <a:p>
+            <a:fld id="{2BF067CD-8E6B-4360-9AA8-C5DF2A48A6D1}" type="slidenum">
+              <a:rPr lang="en-US" noProof="0" smtClean="0"/>
+              <a:pPr/>
+              <a:t>15</a:t>
+            </a:fld>
+            <a:endParaRPr lang="en-US" noProof="0" dirty="0"/>
+          </a:p>
+        </p:txBody>
+      </p:sp>
+      <p:sp>
+        <p:nvSpPr>
+          <p:cNvPr id="4" name="Title 3"/>
+          <p:cNvSpPr>
+            <a:spLocks noGrp="1"/>
+          </p:cNvSpPr>
+          <p:nvPr>
+            <p:ph type="title"/>
+          </p:nvPr>
+        </p:nvSpPr>
+        <p:spPr/>
+        <p:txBody>
+          <a:bodyPr/>
+          <a:lstStyle/>
+          <a:p>
+            <a:r>
+              <a:rPr lang="en-US" dirty="0" smtClean="0"/>
+              <a:t>Movies &amp; TV</a:t>
+            </a:r>
+            <a:endParaRPr lang="en-US" dirty="0"/>
+          </a:p>
+        </p:txBody>
+      </p:sp>
+      <p:pic>
+        <p:nvPicPr>
+          <p:cNvPr id="5" name="Picture 4"/>
+          <p:cNvPicPr>
+            <a:picLocks noChangeAspect="1"/>
+          </p:cNvPicPr>
+          <p:nvPr/>
+        </p:nvPicPr>
+        <p:blipFill>
+          <a:blip r:embed="rId2">
+            <a:extLst>
+              <a:ext uri="{28A0092B-C50C-407E-A947-70E740481C1C}">
+                <a14:useLocalDpi xmlns:a14="http://schemas.microsoft.com/office/drawing/2010/main" val="0"/>
+              </a:ext>
+            </a:extLst>
+          </a:blip>
+          <a:stretch>
+            <a:fillRect/>
+          </a:stretch>
+        </p:blipFill>
+        <p:spPr>
+          <a:xfrm>
+            <a:off x="1234688" y="1198674"/>
+            <a:ext cx="9701024" cy="5456826"/>
+          </a:xfrm>
+          <a:prstGeom prst="rect">
+            <a:avLst/>
+          </a:prstGeom>
+          <a:ln>
+            <a:solidFill>
+              <a:schemeClr val="bg2">
+                <a:lumMod val="75000"/>
+              </a:schemeClr>
+            </a:solidFill>
+          </a:ln>
+        </p:spPr>
+      </p:pic>
+      <p:sp>
+        <p:nvSpPr>
+          <p:cNvPr id="6" name="Rounded Rectangular Callout 5"/>
+          <p:cNvSpPr/>
+          <p:nvPr/>
+        </p:nvSpPr>
+        <p:spPr bwMode="auto">
+          <a:xfrm>
+            <a:off x="111000" y="2393999"/>
+            <a:ext cx="3105000" cy="1500365"/>
+          </a:xfrm>
+          <a:prstGeom prst="wedgeRoundRectCallout">
+            <a:avLst>
+              <a:gd name="adj1" fmla="val -3340"/>
+              <a:gd name="adj2" fmla="val 180616"/>
+              <a:gd name="adj3" fmla="val 16667"/>
+            </a:avLst>
+          </a:prstGeom>
+          <a:solidFill>
+            <a:schemeClr val="dk2">
+              <a:alpha val="80000"/>
+            </a:schemeClr>
+          </a:solidFill>
+          <a:ln w="19050">
+            <a:solidFill>
+              <a:schemeClr val="tx1">
+                <a:lumMod val="75000"/>
+                <a:alpha val="80000"/>
+              </a:schemeClr>
+            </a:solidFill>
+          </a:ln>
+          <a:effectLst/>
+        </p:spPr>
+        <p:style>
+          <a:lnRef idx="2">
+            <a:schemeClr val="accent1">
+              <a:shade val="50000"/>
+            </a:schemeClr>
+          </a:lnRef>
+          <a:fillRef idx="1001">
+            <a:schemeClr val="dk2"/>
+          </a:fillRef>
+          <a:effectRef idx="0">
+            <a:schemeClr val="accent1"/>
+          </a:effectRef>
+          <a:fontRef idx="minor">
+            <a:schemeClr val="lt1"/>
+          </a:fontRef>
+        </p:style>
+        <p:txBody>
+          <a:bodyPr rot="0" spcFirstLastPara="0" vertOverflow="overflow" horzOverflow="overflow" vert="horz" wrap="square" lIns="91440" tIns="45720" rIns="91440" bIns="45720" numCol="1" spcCol="0" rtlCol="0" fromWordArt="0" anchor="ctr" anchorCtr="0" forceAA="0" compatLnSpc="1">
+            <a:prstTxWarp prst="textNoShape">
+              <a:avLst/>
+            </a:prstTxWarp>
+            <a:noAutofit/>
+          </a:bodyPr>
+          <a:lstStyle/>
+          <a:p>
+            <a:pPr algn="ctr"/>
+            <a:r>
+              <a:rPr lang="bg-BG" sz="2800" b="1" dirty="0" smtClean="0">
+                <a:solidFill>
+                  <a:srgbClr val="FFFFFF"/>
+                </a:solidFill>
+                <a:effectLst>
+                  <a:outerShdw blurRad="38100" dist="38100" dir="2700000" algn="tl">
+                    <a:srgbClr val="000000">
+                      <a:alpha val="43137"/>
+                    </a:srgbClr>
+                  </a:outerShdw>
+                </a:effectLst>
+              </a:rPr>
+              <a:t>Лента за позициониране на записа</a:t>
+            </a:r>
+            <a:endParaRPr lang="en-US" sz="2800" b="1" dirty="0">
+              <a:solidFill>
+                <a:srgbClr val="FFFFFF"/>
+              </a:solidFill>
+              <a:effectLst>
+                <a:outerShdw blurRad="38100" dist="38100" dir="2700000" algn="tl">
+                  <a:srgbClr val="000000">
+                    <a:alpha val="43137"/>
+                  </a:srgbClr>
+                </a:outerShdw>
+              </a:effectLst>
+            </a:endParaRPr>
+          </a:p>
+        </p:txBody>
+      </p:sp>
+      <p:sp>
+        <p:nvSpPr>
+          <p:cNvPr id="3" name="Rectangle 2"/>
+          <p:cNvSpPr/>
+          <p:nvPr/>
+        </p:nvSpPr>
+        <p:spPr bwMode="auto">
+          <a:xfrm>
+            <a:off x="1269544" y="5994000"/>
+            <a:ext cx="9631312" cy="270000"/>
+          </a:xfrm>
+          <a:prstGeom prst="rect">
+            <a:avLst/>
+          </a:prstGeom>
+          <a:noFill/>
+          <a:ln w="38100">
+            <a:solidFill>
+              <a:schemeClr val="tx1">
+                <a:alpha val="80000"/>
+              </a:schemeClr>
+            </a:solidFill>
+          </a:ln>
+          <a:effectLst/>
+        </p:spPr>
+        <p:style>
+          <a:lnRef idx="2">
+            <a:schemeClr val="accent1">
+              <a:shade val="50000"/>
+            </a:schemeClr>
+          </a:lnRef>
+          <a:fillRef idx="1001">
+            <a:schemeClr val="dk2"/>
+          </a:fillRef>
+          <a:effectRef idx="0">
+            <a:schemeClr val="accent1"/>
+          </a:effectRef>
+          <a:fontRef idx="minor">
+            <a:schemeClr val="lt1"/>
+          </a:fontRef>
+        </p:style>
+        <p:txBody>
+          <a:bodyPr rot="0" spcFirstLastPara="0" vertOverflow="overflow" horzOverflow="overflow" vert="horz" wrap="square" lIns="91440" tIns="45720" rIns="91440" bIns="45720" numCol="1" spcCol="0" rtlCol="0" fromWordArt="0" anchor="ctr" anchorCtr="0" forceAA="0" compatLnSpc="1">
+            <a:prstTxWarp prst="textNoShape">
+              <a:avLst/>
+            </a:prstTxWarp>
+            <a:noAutofit/>
+          </a:bodyPr>
+          <a:lstStyle/>
+          <a:p>
+            <a:pPr algn="ctr"/>
+            <a:endParaRPr lang="en-US" sz="2800" b="1" dirty="0">
+              <a:solidFill>
+                <a:srgbClr val="FFFFFF"/>
+              </a:solidFill>
+              <a:effectLst>
+                <a:outerShdw blurRad="38100" dist="38100" dir="2700000" algn="tl">
+                  <a:srgbClr val="000000">
+                    <a:alpha val="43137"/>
+                  </a:srgbClr>
+                </a:outerShdw>
+              </a:effectLst>
+            </a:endParaRPr>
+          </a:p>
+        </p:txBody>
+      </p:sp>
+      <p:sp>
+        <p:nvSpPr>
+          <p:cNvPr id="7" name="Rectangle 6"/>
+          <p:cNvSpPr/>
+          <p:nvPr/>
+        </p:nvSpPr>
+        <p:spPr bwMode="auto">
+          <a:xfrm>
+            <a:off x="5601000" y="6264000"/>
+            <a:ext cx="394856" cy="360000"/>
+          </a:xfrm>
+          <a:prstGeom prst="rect">
+            <a:avLst/>
+          </a:prstGeom>
+          <a:noFill/>
+          <a:ln w="38100">
+            <a:solidFill>
+              <a:schemeClr val="tx1">
+                <a:alpha val="80000"/>
+              </a:schemeClr>
+            </a:solidFill>
+          </a:ln>
+          <a:effectLst/>
+        </p:spPr>
+        <p:style>
+          <a:lnRef idx="2">
+            <a:schemeClr val="accent1">
+              <a:shade val="50000"/>
+            </a:schemeClr>
+          </a:lnRef>
+          <a:fillRef idx="1001">
+            <a:schemeClr val="dk2"/>
+          </a:fillRef>
+          <a:effectRef idx="0">
+            <a:schemeClr val="accent1"/>
+          </a:effectRef>
+          <a:fontRef idx="minor">
+            <a:schemeClr val="lt1"/>
+          </a:fontRef>
+        </p:style>
+        <p:txBody>
+          <a:bodyPr rot="0" spcFirstLastPara="0" vertOverflow="overflow" horzOverflow="overflow" vert="horz" wrap="square" lIns="91440" tIns="45720" rIns="91440" bIns="45720" numCol="1" spcCol="0" rtlCol="0" fromWordArt="0" anchor="ctr" anchorCtr="0" forceAA="0" compatLnSpc="1">
+            <a:prstTxWarp prst="textNoShape">
+              <a:avLst/>
+            </a:prstTxWarp>
+            <a:noAutofit/>
+          </a:bodyPr>
+          <a:lstStyle/>
+          <a:p>
+            <a:pPr algn="ctr"/>
+            <a:endParaRPr lang="en-US" sz="2800" b="1" dirty="0">
+              <a:solidFill>
+                <a:srgbClr val="FFFFFF"/>
+              </a:solidFill>
+              <a:effectLst>
+                <a:outerShdw blurRad="38100" dist="38100" dir="2700000" algn="tl">
+                  <a:srgbClr val="000000">
+                    <a:alpha val="43137"/>
+                  </a:srgbClr>
+                </a:outerShdw>
+              </a:effectLst>
+            </a:endParaRPr>
+          </a:p>
+        </p:txBody>
+      </p:sp>
+      <p:sp>
+        <p:nvSpPr>
+          <p:cNvPr id="8" name="Rectangle 7"/>
+          <p:cNvSpPr/>
+          <p:nvPr/>
+        </p:nvSpPr>
+        <p:spPr bwMode="auto">
+          <a:xfrm>
+            <a:off x="5995856" y="6264000"/>
+            <a:ext cx="190144" cy="360000"/>
+          </a:xfrm>
+          <a:prstGeom prst="rect">
+            <a:avLst/>
+          </a:prstGeom>
+          <a:noFill/>
+          <a:ln w="38100">
+            <a:solidFill>
+              <a:schemeClr val="tx1">
+                <a:alpha val="80000"/>
+              </a:schemeClr>
+            </a:solidFill>
+          </a:ln>
+          <a:effectLst/>
+        </p:spPr>
+        <p:style>
+          <a:lnRef idx="2">
+            <a:schemeClr val="accent1">
+              <a:shade val="50000"/>
+            </a:schemeClr>
+          </a:lnRef>
+          <a:fillRef idx="1001">
+            <a:schemeClr val="dk2"/>
+          </a:fillRef>
+          <a:effectRef idx="0">
+            <a:schemeClr val="accent1"/>
+          </a:effectRef>
+          <a:fontRef idx="minor">
+            <a:schemeClr val="lt1"/>
+          </a:fontRef>
+        </p:style>
+        <p:txBody>
+          <a:bodyPr rot="0" spcFirstLastPara="0" vertOverflow="overflow" horzOverflow="overflow" vert="horz" wrap="square" lIns="91440" tIns="45720" rIns="91440" bIns="45720" numCol="1" spcCol="0" rtlCol="0" fromWordArt="0" anchor="ctr" anchorCtr="0" forceAA="0" compatLnSpc="1">
+            <a:prstTxWarp prst="textNoShape">
+              <a:avLst/>
+            </a:prstTxWarp>
+            <a:noAutofit/>
+          </a:bodyPr>
+          <a:lstStyle/>
+          <a:p>
+            <a:pPr algn="ctr"/>
+            <a:endParaRPr lang="en-US" sz="2800" b="1" dirty="0">
+              <a:solidFill>
+                <a:srgbClr val="FFFFFF"/>
+              </a:solidFill>
+              <a:effectLst>
+                <a:outerShdw blurRad="38100" dist="38100" dir="2700000" algn="tl">
+                  <a:srgbClr val="000000">
+                    <a:alpha val="43137"/>
+                  </a:srgbClr>
+                </a:outerShdw>
+              </a:effectLst>
+            </a:endParaRPr>
+          </a:p>
+        </p:txBody>
+      </p:sp>
+      <p:sp>
+        <p:nvSpPr>
+          <p:cNvPr id="9" name="Rectangle 8"/>
+          <p:cNvSpPr/>
+          <p:nvPr/>
+        </p:nvSpPr>
+        <p:spPr bwMode="auto">
+          <a:xfrm>
+            <a:off x="6186000" y="6265375"/>
+            <a:ext cx="360000" cy="360000"/>
+          </a:xfrm>
+          <a:prstGeom prst="rect">
+            <a:avLst/>
+          </a:prstGeom>
+          <a:noFill/>
+          <a:ln w="38100">
+            <a:solidFill>
+              <a:schemeClr val="tx1">
+                <a:alpha val="80000"/>
+              </a:schemeClr>
+            </a:solidFill>
+          </a:ln>
+          <a:effectLst/>
+        </p:spPr>
+        <p:style>
+          <a:lnRef idx="2">
+            <a:schemeClr val="accent1">
+              <a:shade val="50000"/>
+            </a:schemeClr>
+          </a:lnRef>
+          <a:fillRef idx="1001">
+            <a:schemeClr val="dk2"/>
+          </a:fillRef>
+          <a:effectRef idx="0">
+            <a:schemeClr val="accent1"/>
+          </a:effectRef>
+          <a:fontRef idx="minor">
+            <a:schemeClr val="lt1"/>
+          </a:fontRef>
+        </p:style>
+        <p:txBody>
+          <a:bodyPr rot="0" spcFirstLastPara="0" vertOverflow="overflow" horzOverflow="overflow" vert="horz" wrap="square" lIns="91440" tIns="45720" rIns="91440" bIns="45720" numCol="1" spcCol="0" rtlCol="0" fromWordArt="0" anchor="ctr" anchorCtr="0" forceAA="0" compatLnSpc="1">
+            <a:prstTxWarp prst="textNoShape">
+              <a:avLst/>
+            </a:prstTxWarp>
+            <a:noAutofit/>
+          </a:bodyPr>
+          <a:lstStyle/>
+          <a:p>
+            <a:pPr algn="ctr"/>
+            <a:endParaRPr lang="en-US" sz="2800" b="1" dirty="0">
+              <a:solidFill>
+                <a:srgbClr val="FFFFFF"/>
+              </a:solidFill>
+              <a:effectLst>
+                <a:outerShdw blurRad="38100" dist="38100" dir="2700000" algn="tl">
+                  <a:srgbClr val="000000">
+                    <a:alpha val="43137"/>
+                  </a:srgbClr>
+                </a:outerShdw>
+              </a:effectLst>
+            </a:endParaRPr>
+          </a:p>
+        </p:txBody>
+      </p:sp>
+      <p:sp>
+        <p:nvSpPr>
+          <p:cNvPr id="10" name="Rounded Rectangular Callout 9"/>
+          <p:cNvSpPr/>
+          <p:nvPr/>
+        </p:nvSpPr>
+        <p:spPr bwMode="auto">
+          <a:xfrm>
+            <a:off x="1866000" y="4254365"/>
+            <a:ext cx="3418227" cy="974635"/>
+          </a:xfrm>
+          <a:prstGeom prst="wedgeRoundRectCallout">
+            <a:avLst>
+              <a:gd name="adj1" fmla="val 57569"/>
+              <a:gd name="adj2" fmla="val 167387"/>
+              <a:gd name="adj3" fmla="val 16667"/>
+            </a:avLst>
+          </a:prstGeom>
+          <a:solidFill>
+            <a:schemeClr val="dk2">
+              <a:alpha val="80000"/>
+            </a:schemeClr>
+          </a:solidFill>
+          <a:ln w="19050">
+            <a:solidFill>
+              <a:schemeClr val="tx1">
+                <a:lumMod val="75000"/>
+                <a:alpha val="80000"/>
+              </a:schemeClr>
+            </a:solidFill>
+          </a:ln>
+          <a:effectLst/>
+        </p:spPr>
+        <p:style>
+          <a:lnRef idx="2">
+            <a:schemeClr val="accent1">
+              <a:shade val="50000"/>
+            </a:schemeClr>
+          </a:lnRef>
+          <a:fillRef idx="1001">
+            <a:schemeClr val="dk2"/>
+          </a:fillRef>
+          <a:effectRef idx="0">
+            <a:schemeClr val="accent1"/>
+          </a:effectRef>
+          <a:fontRef idx="minor">
+            <a:schemeClr val="lt1"/>
+          </a:fontRef>
+        </p:style>
+        <p:txBody>
+          <a:bodyPr rot="0" spcFirstLastPara="0" vertOverflow="overflow" horzOverflow="overflow" vert="horz" wrap="square" lIns="91440" tIns="45720" rIns="91440" bIns="45720" numCol="1" spcCol="0" rtlCol="0" fromWordArt="0" anchor="ctr" anchorCtr="0" forceAA="0" compatLnSpc="1">
+            <a:prstTxWarp prst="textNoShape">
+              <a:avLst/>
+            </a:prstTxWarp>
+            <a:noAutofit/>
+          </a:bodyPr>
+          <a:lstStyle/>
+          <a:p>
+            <a:pPr algn="ctr"/>
+            <a:r>
+              <a:rPr lang="bg-BG" sz="2800" b="1" dirty="0" smtClean="0">
+                <a:solidFill>
+                  <a:srgbClr val="FFFFFF"/>
+                </a:solidFill>
+                <a:effectLst>
+                  <a:outerShdw blurRad="38100" dist="38100" dir="2700000" algn="tl">
+                    <a:srgbClr val="000000">
+                      <a:alpha val="43137"/>
+                    </a:srgbClr>
+                  </a:outerShdw>
+                </a:effectLst>
+              </a:rPr>
+              <a:t>Връщане на записа назад с 10 сек.</a:t>
+            </a:r>
+            <a:endParaRPr lang="en-US" sz="2800" b="1" dirty="0">
+              <a:solidFill>
+                <a:srgbClr val="FFFFFF"/>
+              </a:solidFill>
+              <a:effectLst>
+                <a:outerShdw blurRad="38100" dist="38100" dir="2700000" algn="tl">
+                  <a:srgbClr val="000000">
+                    <a:alpha val="43137"/>
+                  </a:srgbClr>
+                </a:outerShdw>
+              </a:effectLst>
+            </a:endParaRPr>
+          </a:p>
+        </p:txBody>
+      </p:sp>
+      <p:sp>
+        <p:nvSpPr>
+          <p:cNvPr id="11" name="Rounded Rectangular Callout 10"/>
+          <p:cNvSpPr/>
+          <p:nvPr/>
+        </p:nvSpPr>
+        <p:spPr bwMode="auto">
+          <a:xfrm>
+            <a:off x="4903500" y="3336730"/>
+            <a:ext cx="3285000" cy="702365"/>
+          </a:xfrm>
+          <a:prstGeom prst="wedgeRoundRectCallout">
+            <a:avLst>
+              <a:gd name="adj1" fmla="val -13866"/>
+              <a:gd name="adj2" fmla="val 354446"/>
+              <a:gd name="adj3" fmla="val 16667"/>
+            </a:avLst>
+          </a:prstGeom>
+          <a:solidFill>
+            <a:schemeClr val="dk2">
+              <a:alpha val="80000"/>
+            </a:schemeClr>
+          </a:solidFill>
+          <a:ln w="19050">
+            <a:solidFill>
+              <a:schemeClr val="tx1">
+                <a:lumMod val="75000"/>
+                <a:alpha val="80000"/>
+              </a:schemeClr>
+            </a:solidFill>
+          </a:ln>
+          <a:effectLst/>
+        </p:spPr>
+        <p:style>
+          <a:lnRef idx="2">
+            <a:schemeClr val="accent1">
+              <a:shade val="50000"/>
+            </a:schemeClr>
+          </a:lnRef>
+          <a:fillRef idx="1001">
+            <a:schemeClr val="dk2"/>
+          </a:fillRef>
+          <a:effectRef idx="0">
+            <a:schemeClr val="accent1"/>
+          </a:effectRef>
+          <a:fontRef idx="minor">
+            <a:schemeClr val="lt1"/>
+          </a:fontRef>
+        </p:style>
+        <p:txBody>
+          <a:bodyPr rot="0" spcFirstLastPara="0" vertOverflow="overflow" horzOverflow="overflow" vert="horz" wrap="square" lIns="91440" tIns="45720" rIns="91440" bIns="45720" numCol="1" spcCol="0" rtlCol="0" fromWordArt="0" anchor="ctr" anchorCtr="0" forceAA="0" compatLnSpc="1">
+            <a:prstTxWarp prst="textNoShape">
+              <a:avLst/>
+            </a:prstTxWarp>
+            <a:noAutofit/>
+          </a:bodyPr>
+          <a:lstStyle/>
+          <a:p>
+            <a:pPr algn="ctr"/>
+            <a:r>
+              <a:rPr lang="bg-BG" sz="2800" b="1" dirty="0" smtClean="0">
+                <a:solidFill>
+                  <a:srgbClr val="FFFFFF"/>
+                </a:solidFill>
+                <a:effectLst>
+                  <a:outerShdw blurRad="38100" dist="38100" dir="2700000" algn="tl">
+                    <a:srgbClr val="000000">
+                      <a:alpha val="43137"/>
+                    </a:srgbClr>
+                  </a:outerShdw>
+                </a:effectLst>
+              </a:rPr>
+              <a:t>Пускане / Спиране</a:t>
+            </a:r>
+            <a:endParaRPr lang="en-US" sz="2800" b="1" dirty="0">
+              <a:solidFill>
+                <a:srgbClr val="FFFFFF"/>
+              </a:solidFill>
+              <a:effectLst>
+                <a:outerShdw blurRad="38100" dist="38100" dir="2700000" algn="tl">
+                  <a:srgbClr val="000000">
+                    <a:alpha val="43137"/>
+                  </a:srgbClr>
+                </a:outerShdw>
+              </a:effectLst>
+            </a:endParaRPr>
+          </a:p>
+        </p:txBody>
+      </p:sp>
+      <p:sp>
+        <p:nvSpPr>
+          <p:cNvPr id="12" name="Rounded Rectangular Callout 11"/>
+          <p:cNvSpPr/>
+          <p:nvPr/>
+        </p:nvSpPr>
+        <p:spPr bwMode="auto">
+          <a:xfrm>
+            <a:off x="7176000" y="4254365"/>
+            <a:ext cx="3759712" cy="1080000"/>
+          </a:xfrm>
+          <a:prstGeom prst="wedgeRoundRectCallout">
+            <a:avLst>
+              <a:gd name="adj1" fmla="val -64169"/>
+              <a:gd name="adj2" fmla="val 155634"/>
+              <a:gd name="adj3" fmla="val 16667"/>
+            </a:avLst>
+          </a:prstGeom>
+          <a:solidFill>
+            <a:schemeClr val="dk2">
+              <a:alpha val="80000"/>
+            </a:schemeClr>
+          </a:solidFill>
+          <a:ln w="19050">
+            <a:solidFill>
+              <a:schemeClr val="tx1">
+                <a:lumMod val="75000"/>
+                <a:alpha val="80000"/>
+              </a:schemeClr>
+            </a:solidFill>
+          </a:ln>
+          <a:effectLst/>
+        </p:spPr>
+        <p:style>
+          <a:lnRef idx="2">
+            <a:schemeClr val="accent1">
+              <a:shade val="50000"/>
+            </a:schemeClr>
+          </a:lnRef>
+          <a:fillRef idx="1001">
+            <a:schemeClr val="dk2"/>
+          </a:fillRef>
+          <a:effectRef idx="0">
+            <a:schemeClr val="accent1"/>
+          </a:effectRef>
+          <a:fontRef idx="minor">
+            <a:schemeClr val="lt1"/>
+          </a:fontRef>
+        </p:style>
+        <p:txBody>
+          <a:bodyPr rot="0" spcFirstLastPara="0" vertOverflow="overflow" horzOverflow="overflow" vert="horz" wrap="square" lIns="91440" tIns="45720" rIns="91440" bIns="45720" numCol="1" spcCol="0" rtlCol="0" fromWordArt="0" anchor="ctr" anchorCtr="0" forceAA="0" compatLnSpc="1">
+            <a:prstTxWarp prst="textNoShape">
+              <a:avLst/>
+            </a:prstTxWarp>
+            <a:noAutofit/>
+          </a:bodyPr>
+          <a:lstStyle/>
+          <a:p>
+            <a:pPr algn="ctr"/>
+            <a:r>
+              <a:rPr lang="bg-BG" sz="2800" b="1" dirty="0" smtClean="0">
+                <a:solidFill>
+                  <a:srgbClr val="FFFFFF"/>
+                </a:solidFill>
+                <a:effectLst>
+                  <a:outerShdw blurRad="38100" dist="38100" dir="2700000" algn="tl">
+                    <a:srgbClr val="000000">
+                      <a:alpha val="43137"/>
+                    </a:srgbClr>
+                  </a:outerShdw>
+                </a:effectLst>
+              </a:rPr>
+              <a:t>Превъртане </a:t>
+            </a:r>
+            <a:r>
+              <a:rPr lang="bg-BG" sz="2800" b="1" dirty="0">
+                <a:solidFill>
+                  <a:srgbClr val="FFFFFF"/>
+                </a:solidFill>
+                <a:effectLst>
+                  <a:outerShdw blurRad="38100" dist="38100" dir="2700000" algn="tl">
+                    <a:srgbClr val="000000">
+                      <a:alpha val="43137"/>
+                    </a:srgbClr>
+                  </a:outerShdw>
+                </a:effectLst>
+              </a:rPr>
+              <a:t>на записа напред </a:t>
+            </a:r>
+            <a:r>
+              <a:rPr lang="bg-BG" sz="2800" b="1" dirty="0" smtClean="0">
+                <a:solidFill>
+                  <a:srgbClr val="FFFFFF"/>
+                </a:solidFill>
+                <a:effectLst>
+                  <a:outerShdw blurRad="38100" dist="38100" dir="2700000" algn="tl">
+                    <a:srgbClr val="000000">
+                      <a:alpha val="43137"/>
+                    </a:srgbClr>
+                  </a:outerShdw>
+                </a:effectLst>
+              </a:rPr>
+              <a:t>с 30 сек. </a:t>
+            </a:r>
+            <a:endParaRPr lang="en-US" sz="2800" b="1" dirty="0">
+              <a:solidFill>
+                <a:srgbClr val="FFFFFF"/>
+              </a:solidFill>
+              <a:effectLst>
+                <a:outerShdw blurRad="38100" dist="38100" dir="2700000" algn="tl">
+                  <a:srgbClr val="000000">
+                    <a:alpha val="43137"/>
+                  </a:srgbClr>
+                </a:outerShdw>
+              </a:effectLst>
+            </a:endParaRPr>
+          </a:p>
+        </p:txBody>
+      </p:sp>
+    </p:spTree>
+    <p:extLst>
+      <p:ext uri="{BB962C8B-B14F-4D97-AF65-F5344CB8AC3E}">
+        <p14:creationId xmlns:p14="http://schemas.microsoft.com/office/powerpoint/2010/main" val="1004363207"/>
+      </p:ext>
+    </p:extLst>
+  </p:cSld>
+  <p:clrMapOvr>
+    <a:masterClrMapping/>
+  </p:clrMapOvr>
+  <mc:AlternateContent xmlns:mc="http://schemas.openxmlformats.org/markup-compatibility/2006" xmlns:p14="http://schemas.microsoft.com/office/powerpoint/2010/main">
+    <mc:Choice Requires="p14">
+      <p:transition spd="slow" p14:dur="2000" advClick="0" advTm="5000"/>
+    </mc:Choice>
+    <mc:Fallback xmlns="">
+      <p:transition spd="slow" advClick="0" advTm="5000"/>
+    </mc:Fallback>
+  </mc:AlternateContent>
+  <p:timing>
+    <p:tnLst>
+      <p:par>
+        <p:cTn id="1" dur="indefinite" restart="never" nodeType="tmRoot">
+          <p:childTnLst>
+            <p:seq concurrent="1" nextAc="seek">
+              <p:cTn id="2" dur="indefinite" nodeType="mainSeq">
+                <p:childTnLst>
+                  <p:par>
+                    <p:cTn id="3" fill="hold">
+                      <p:stCondLst>
+                        <p:cond delay="indefinite"/>
+                      </p:stCondLst>
+                      <p:childTnLst>
+                        <p:par>
+                          <p:cTn id="4" fill="hold">
+                            <p:stCondLst>
+                              <p:cond delay="0"/>
+                            </p:stCondLst>
+                            <p:childTnLst>
+                              <p:par>
+                                <p:cTn id="5" presetID="1" presetClass="entr" presetSubtype="0" fill="hold" grpId="0" nodeType="clickEffect">
+                                  <p:stCondLst>
+                                    <p:cond delay="0"/>
+                                  </p:stCondLst>
+                                  <p:childTnLst>
+                                    <p:set>
+                                      <p:cBhvr>
+                                        <p:cTn id="6" dur="1" fill="hold">
+                                          <p:stCondLst>
+                                            <p:cond delay="0"/>
+                                          </p:stCondLst>
+                                        </p:cTn>
+                                        <p:tgtEl>
+                                          <p:spTgt spid="3"/>
+                                        </p:tgtEl>
+                                        <p:attrNameLst>
+                                          <p:attrName>style.visibility</p:attrName>
+                                        </p:attrNameLst>
+                                      </p:cBhvr>
+                                      <p:to>
+                                        <p:strVal val="visible"/>
+                                      </p:to>
+                                    </p:set>
+                                  </p:childTnLst>
+                                </p:cTn>
+                              </p:par>
+                            </p:childTnLst>
+                          </p:cTn>
+                        </p:par>
+                      </p:childTnLst>
+                    </p:cTn>
+                  </p:par>
+                  <p:par>
+                    <p:cTn id="7" fill="hold">
+                      <p:stCondLst>
+                        <p:cond delay="indefinite"/>
+                      </p:stCondLst>
+                      <p:childTnLst>
+                        <p:par>
+                          <p:cTn id="8" fill="hold">
+                            <p:stCondLst>
+                              <p:cond delay="0"/>
+                            </p:stCondLst>
+                            <p:childTnLst>
+                              <p:par>
+                                <p:cTn id="9" presetID="1" presetClass="entr" presetSubtype="0" fill="hold" grpId="0" nodeType="clickEffect">
+                                  <p:stCondLst>
+                                    <p:cond delay="0"/>
+                                  </p:stCondLst>
+                                  <p:childTnLst>
+                                    <p:set>
+                                      <p:cBhvr>
+                                        <p:cTn id="10" dur="1" fill="hold">
+                                          <p:stCondLst>
+                                            <p:cond delay="0"/>
+                                          </p:stCondLst>
+                                        </p:cTn>
+                                        <p:tgtEl>
+                                          <p:spTgt spid="6"/>
+                                        </p:tgtEl>
+                                        <p:attrNameLst>
+                                          <p:attrName>style.visibility</p:attrName>
+                                        </p:attrNameLst>
+                                      </p:cBhvr>
+                                      <p:to>
+                                        <p:strVal val="visible"/>
+                                      </p:to>
+                                    </p:set>
+                                  </p:childTnLst>
+                                </p:cTn>
+                              </p:par>
+                            </p:childTnLst>
+                          </p:cTn>
+                        </p:par>
+                      </p:childTnLst>
+                    </p:cTn>
+                  </p:par>
+                  <p:par>
+                    <p:cTn id="11" fill="hold">
+                      <p:stCondLst>
+                        <p:cond delay="indefinite"/>
+                      </p:stCondLst>
+                      <p:childTnLst>
+                        <p:par>
+                          <p:cTn id="12" fill="hold">
+                            <p:stCondLst>
+                              <p:cond delay="0"/>
+                            </p:stCondLst>
+                            <p:childTnLst>
+                              <p:par>
+                                <p:cTn id="13" presetID="1" presetClass="entr" presetSubtype="0" fill="hold" grpId="0" nodeType="clickEffect">
+                                  <p:stCondLst>
+                                    <p:cond delay="0"/>
+                                  </p:stCondLst>
+                                  <p:childTnLst>
+                                    <p:set>
+                                      <p:cBhvr>
+                                        <p:cTn id="14" dur="1" fill="hold">
+                                          <p:stCondLst>
+                                            <p:cond delay="0"/>
+                                          </p:stCondLst>
+                                        </p:cTn>
+                                        <p:tgtEl>
+                                          <p:spTgt spid="7"/>
+                                        </p:tgtEl>
+                                        <p:attrNameLst>
+                                          <p:attrName>style.visibility</p:attrName>
+                                        </p:attrNameLst>
+                                      </p:cBhvr>
+                                      <p:to>
+                                        <p:strVal val="visible"/>
+                                      </p:to>
+                                    </p:set>
+                                  </p:childTnLst>
+                                </p:cTn>
+                              </p:par>
+                            </p:childTnLst>
+                          </p:cTn>
+                        </p:par>
+                      </p:childTnLst>
+                    </p:cTn>
+                  </p:par>
+                  <p:par>
+                    <p:cTn id="15" fill="hold">
+                      <p:stCondLst>
+                        <p:cond delay="indefinite"/>
+                      </p:stCondLst>
+                      <p:childTnLst>
+                        <p:par>
+                          <p:cTn id="16" fill="hold">
+                            <p:stCondLst>
+                              <p:cond delay="0"/>
+                            </p:stCondLst>
+                            <p:childTnLst>
+                              <p:par>
+                                <p:cTn id="17" presetID="1" presetClass="entr" presetSubtype="0" fill="hold" grpId="0" nodeType="clickEffect">
+                                  <p:stCondLst>
+                                    <p:cond delay="0"/>
+                                  </p:stCondLst>
+                                  <p:childTnLst>
+                                    <p:set>
+                                      <p:cBhvr>
+                                        <p:cTn id="18" dur="1" fill="hold">
+                                          <p:stCondLst>
+                                            <p:cond delay="0"/>
+                                          </p:stCondLst>
+                                        </p:cTn>
+                                        <p:tgtEl>
+                                          <p:spTgt spid="10"/>
+                                        </p:tgtEl>
+                                        <p:attrNameLst>
+                                          <p:attrName>style.visibility</p:attrName>
+                                        </p:attrNameLst>
+                                      </p:cBhvr>
+                                      <p:to>
+                                        <p:strVal val="visible"/>
+                                      </p:to>
+                                    </p:set>
+                                  </p:childTnLst>
+                                </p:cTn>
+                              </p:par>
+                            </p:childTnLst>
+                          </p:cTn>
+                        </p:par>
+                      </p:childTnLst>
+                    </p:cTn>
+                  </p:par>
+                  <p:par>
+                    <p:cTn id="19" fill="hold">
+                      <p:stCondLst>
+                        <p:cond delay="indefinite"/>
+                      </p:stCondLst>
+                      <p:childTnLst>
+                        <p:par>
+                          <p:cTn id="20" fill="hold">
+                            <p:stCondLst>
+                              <p:cond delay="0"/>
+                            </p:stCondLst>
+                            <p:childTnLst>
+                              <p:par>
+                                <p:cTn id="21" presetID="1" presetClass="entr" presetSubtype="0" fill="hold" grpId="0" nodeType="clickEffect">
+                                  <p:stCondLst>
+                                    <p:cond delay="0"/>
+                                  </p:stCondLst>
+                                  <p:childTnLst>
+                                    <p:set>
+                                      <p:cBhvr>
+                                        <p:cTn id="22" dur="1" fill="hold">
+                                          <p:stCondLst>
+                                            <p:cond delay="0"/>
+                                          </p:stCondLst>
+                                        </p:cTn>
+                                        <p:tgtEl>
+                                          <p:spTgt spid="8"/>
+                                        </p:tgtEl>
+                                        <p:attrNameLst>
+                                          <p:attrName>style.visibility</p:attrName>
+                                        </p:attrNameLst>
+                                      </p:cBhvr>
+                                      <p:to>
+                                        <p:strVal val="visible"/>
+                                      </p:to>
+                                    </p:set>
+                                  </p:childTnLst>
+                                </p:cTn>
+                              </p:par>
+                            </p:childTnLst>
+                          </p:cTn>
+                        </p:par>
+                      </p:childTnLst>
+                    </p:cTn>
+                  </p:par>
+                  <p:par>
+                    <p:cTn id="23" fill="hold">
+                      <p:stCondLst>
+                        <p:cond delay="indefinite"/>
+                      </p:stCondLst>
+                      <p:childTnLst>
+                        <p:par>
+                          <p:cTn id="24" fill="hold">
+                            <p:stCondLst>
+                              <p:cond delay="0"/>
+                            </p:stCondLst>
+                            <p:childTnLst>
+                              <p:par>
+                                <p:cTn id="25" presetID="1" presetClass="entr" presetSubtype="0" fill="hold" grpId="0" nodeType="clickEffect">
+                                  <p:stCondLst>
+                                    <p:cond delay="0"/>
+                                  </p:stCondLst>
+                                  <p:childTnLst>
+                                    <p:set>
+                                      <p:cBhvr>
+                                        <p:cTn id="26" dur="1" fill="hold">
+                                          <p:stCondLst>
+                                            <p:cond delay="0"/>
+                                          </p:stCondLst>
+                                        </p:cTn>
+                                        <p:tgtEl>
+                                          <p:spTgt spid="11"/>
+                                        </p:tgtEl>
+                                        <p:attrNameLst>
+                                          <p:attrName>style.visibility</p:attrName>
+                                        </p:attrNameLst>
+                                      </p:cBhvr>
+                                      <p:to>
+                                        <p:strVal val="visible"/>
+                                      </p:to>
+                                    </p:set>
+                                  </p:childTnLst>
+                                </p:cTn>
+                              </p:par>
+                            </p:childTnLst>
+                          </p:cTn>
+                        </p:par>
+                      </p:childTnLst>
+                    </p:cTn>
+                  </p:par>
+                  <p:par>
+                    <p:cTn id="27" fill="hold">
+                      <p:stCondLst>
+                        <p:cond delay="indefinite"/>
+                      </p:stCondLst>
+                      <p:childTnLst>
+                        <p:par>
+                          <p:cTn id="28" fill="hold">
+                            <p:stCondLst>
+                              <p:cond delay="0"/>
+                            </p:stCondLst>
+                            <p:childTnLst>
+                              <p:par>
+                                <p:cTn id="29" presetID="1" presetClass="entr" presetSubtype="0" fill="hold" grpId="0" nodeType="clickEffect">
+                                  <p:stCondLst>
+                                    <p:cond delay="0"/>
+                                  </p:stCondLst>
+                                  <p:childTnLst>
+                                    <p:set>
+                                      <p:cBhvr>
+                                        <p:cTn id="30" dur="1" fill="hold">
+                                          <p:stCondLst>
+                                            <p:cond delay="0"/>
+                                          </p:stCondLst>
+                                        </p:cTn>
+                                        <p:tgtEl>
+                                          <p:spTgt spid="9"/>
+                                        </p:tgtEl>
+                                        <p:attrNameLst>
+                                          <p:attrName>style.visibility</p:attrName>
+                                        </p:attrNameLst>
+                                      </p:cBhvr>
+                                      <p:to>
+                                        <p:strVal val="visible"/>
+                                      </p:to>
+                                    </p:set>
+                                  </p:childTnLst>
+                                </p:cTn>
+                              </p:par>
+                            </p:childTnLst>
+                          </p:cTn>
+                        </p:par>
+                      </p:childTnLst>
+                    </p:cTn>
+                  </p:par>
+                  <p:par>
+                    <p:cTn id="31" fill="hold">
+                      <p:stCondLst>
+                        <p:cond delay="indefinite"/>
+                      </p:stCondLst>
+                      <p:childTnLst>
+                        <p:par>
+                          <p:cTn id="32" fill="hold">
+                            <p:stCondLst>
+                              <p:cond delay="0"/>
+                            </p:stCondLst>
+                            <p:childTnLst>
+                              <p:par>
+                                <p:cTn id="33" presetID="1" presetClass="entr" presetSubtype="0" fill="hold" grpId="0" nodeType="clickEffect">
+                                  <p:stCondLst>
+                                    <p:cond delay="0"/>
+                                  </p:stCondLst>
+                                  <p:childTnLst>
+                                    <p:set>
+                                      <p:cBhvr>
+                                        <p:cTn id="34" dur="1" fill="hold">
+                                          <p:stCondLst>
+                                            <p:cond delay="0"/>
+                                          </p:stCondLst>
+                                        </p:cTn>
+                                        <p:tgtEl>
+                                          <p:spTgt spid="12"/>
+                                        </p:tgtEl>
+                                        <p:attrNameLst>
+                                          <p:attrName>style.visibility</p:attrName>
+                                        </p:attrNameLst>
+                                      </p:cBhvr>
+                                      <p:to>
+                                        <p:strVal val="visible"/>
+                                      </p:to>
+                                    </p:set>
+                                  </p:childTnLst>
+                                </p:cTn>
+                              </p:par>
+                            </p:childTnLst>
+                          </p:cTn>
+                        </p:par>
+                      </p:childTnLst>
+                    </p:cTn>
+                  </p:par>
+                </p:childTnLst>
+              </p:cTn>
+              <p:prevCondLst>
+                <p:cond evt="onPrev" delay="0">
+                  <p:tgtEl>
+                    <p:sldTgt/>
+                  </p:tgtEl>
+                </p:cond>
+              </p:prevCondLst>
+              <p:nextCondLst>
+                <p:cond evt="onNext" delay="0">
+                  <p:tgtEl>
+                    <p:sldTgt/>
+                  </p:tgtEl>
+                </p:cond>
+              </p:nextCondLst>
+            </p:seq>
+          </p:childTnLst>
+        </p:cTn>
+      </p:par>
+    </p:tnLst>
+    <p:bldLst>
+      <p:bldP spid="6" grpId="0" animBg="1"/>
+      <p:bldP spid="3" grpId="0" animBg="1"/>
+      <p:bldP spid="7" grpId="0" animBg="1"/>
+      <p:bldP spid="8" grpId="0" animBg="1"/>
+      <p:bldP spid="9" grpId="0" animBg="1"/>
+      <p:bldP spid="10" grpId="0" animBg="1"/>
+      <p:bldP spid="11" grpId="0" animBg="1"/>
+      <p:bldP spid="12" grpId="0" animBg="1"/>
+    </p:bldLst>
+  </p:timing>
+</p:sld>
+</file>
+
+<file path=ppt/slides/slide16.xml><?xml version="1.0" encoding="utf-8"?>
+<p:sld xmlns:a="http://schemas.openxmlformats.org/drawingml/2006/main" xmlns:r="http://schemas.openxmlformats.org/officeDocument/2006/relationships" xmlns:p="http://schemas.openxmlformats.org/presentationml/2006/main">
+  <p:cSld>
+    <p:spTree>
+      <p:nvGrpSpPr>
+        <p:cNvPr id="1" name=""/>
+        <p:cNvGrpSpPr/>
+        <p:nvPr/>
+      </p:nvGrpSpPr>
+      <p:grpSpPr>
+        <a:xfrm>
+          <a:off x="0" y="0"/>
+          <a:ext cx="0" cy="0"/>
+          <a:chOff x="0" y="0"/>
+          <a:chExt cx="0" cy="0"/>
+        </a:xfrm>
+      </p:grpSpPr>
+      <p:sp>
+        <p:nvSpPr>
+          <p:cNvPr id="2" name="Slide Number Placeholder 1"/>
+          <p:cNvSpPr>
+            <a:spLocks noGrp="1"/>
+          </p:cNvSpPr>
+          <p:nvPr>
+            <p:ph type="sldNum" sz="quarter" idx="5"/>
+          </p:nvPr>
+        </p:nvSpPr>
+        <p:spPr/>
+        <p:txBody>
+          <a:bodyPr/>
+          <a:lstStyle/>
+          <a:p>
+            <a:fld id="{2BF067CD-8E6B-4360-9AA8-C5DF2A48A6D1}" type="slidenum">
+              <a:rPr lang="en-US" noProof="0" smtClean="0"/>
+              <a:pPr/>
+              <a:t>16</a:t>
+            </a:fld>
+            <a:endParaRPr lang="en-US" noProof="0" dirty="0"/>
+          </a:p>
+        </p:txBody>
+      </p:sp>
+      <p:sp>
+        <p:nvSpPr>
+          <p:cNvPr id="3" name="Text Placeholder 2"/>
+          <p:cNvSpPr>
+            <a:spLocks noGrp="1"/>
+          </p:cNvSpPr>
+          <p:nvPr>
+            <p:ph type="body" sz="quarter" idx="10"/>
+          </p:nvPr>
+        </p:nvSpPr>
+        <p:spPr/>
+        <p:txBody>
+          <a:bodyPr/>
+          <a:lstStyle/>
+          <a:p>
+            <a:r>
+              <a:rPr lang="bg-BG" dirty="0"/>
+              <a:t>Отворете файла </a:t>
+            </a:r>
+            <a:r>
+              <a:rPr lang="bg-BG" b="1" dirty="0" smtClean="0">
+                <a:solidFill>
+                  <a:schemeClr val="bg1"/>
+                </a:solidFill>
+              </a:rPr>
+              <a:t>Шипченската_епопея.</a:t>
+            </a:r>
+            <a:r>
+              <a:rPr lang="en-US" b="1" dirty="0" smtClean="0">
+                <a:solidFill>
+                  <a:schemeClr val="bg1"/>
+                </a:solidFill>
+              </a:rPr>
+              <a:t>mp4 </a:t>
+            </a:r>
+            <a:r>
+              <a:rPr lang="bg-BG" dirty="0" smtClean="0"/>
+              <a:t>и изгледайте видеото на </a:t>
+            </a:r>
+            <a:r>
+              <a:rPr lang="bg-BG" b="1" dirty="0" smtClean="0">
+                <a:solidFill>
+                  <a:schemeClr val="bg1"/>
+                </a:solidFill>
+              </a:rPr>
+              <a:t>Българска история</a:t>
+            </a:r>
+            <a:r>
+              <a:rPr lang="bg-BG" dirty="0" smtClean="0"/>
+              <a:t>. </a:t>
+            </a:r>
+            <a:endParaRPr lang="en-US" dirty="0">
+              <a:solidFill>
+                <a:schemeClr val="bg1"/>
+              </a:solidFill>
+            </a:endParaRPr>
+          </a:p>
+        </p:txBody>
+      </p:sp>
+      <p:sp>
+        <p:nvSpPr>
+          <p:cNvPr id="4" name="Title 3"/>
+          <p:cNvSpPr>
+            <a:spLocks noGrp="1"/>
+          </p:cNvSpPr>
+          <p:nvPr>
+            <p:ph type="title"/>
+          </p:nvPr>
+        </p:nvSpPr>
+        <p:spPr/>
+        <p:txBody>
+          <a:bodyPr/>
+          <a:lstStyle/>
+          <a:p>
+            <a:r>
+              <a:rPr lang="bg-BG" dirty="0" smtClean="0"/>
+              <a:t>Задача: Гледане на видео</a:t>
+            </a:r>
+            <a:endParaRPr lang="en-US" dirty="0"/>
+          </a:p>
+        </p:txBody>
+      </p:sp>
+      <p:pic>
+        <p:nvPicPr>
+          <p:cNvPr id="5" name="Picture 4"/>
+          <p:cNvPicPr>
+            <a:picLocks noChangeAspect="1"/>
+          </p:cNvPicPr>
+          <p:nvPr/>
+        </p:nvPicPr>
+        <p:blipFill>
+          <a:blip r:embed="rId2">
+            <a:extLst>
+              <a:ext uri="{28A0092B-C50C-407E-A947-70E740481C1C}">
+                <a14:useLocalDpi xmlns:a14="http://schemas.microsoft.com/office/drawing/2010/main" val="0"/>
+              </a:ext>
+            </a:extLst>
+          </a:blip>
+          <a:stretch>
+            <a:fillRect/>
+          </a:stretch>
+        </p:blipFill>
+        <p:spPr>
+          <a:xfrm>
+            <a:off x="3576000" y="2727000"/>
+            <a:ext cx="5040000" cy="3780000"/>
+          </a:xfrm>
+          <a:prstGeom prst="rect">
+            <a:avLst/>
+          </a:prstGeom>
+          <a:ln>
+            <a:solidFill>
+              <a:schemeClr val="bg2">
+                <a:lumMod val="75000"/>
+              </a:schemeClr>
+            </a:solidFill>
+          </a:ln>
+        </p:spPr>
+      </p:pic>
+    </p:spTree>
+    <p:extLst>
+      <p:ext uri="{BB962C8B-B14F-4D97-AF65-F5344CB8AC3E}">
+        <p14:creationId xmlns:p14="http://schemas.microsoft.com/office/powerpoint/2010/main" val="4088823"/>
+      </p:ext>
+    </p:extLst>
+  </p:cSld>
+  <p:clrMapOvr>
+    <a:masterClrMapping/>
+  </p:clrMapOvr>
+  <mc:AlternateContent xmlns:mc="http://schemas.openxmlformats.org/markup-compatibility/2006" xmlns:p14="http://schemas.microsoft.com/office/powerpoint/2010/main">
+    <mc:Choice Requires="p14">
+      <p:transition spd="slow" p14:dur="2000" advClick="0" advTm="5000"/>
+    </mc:Choice>
+    <mc:Fallback xmlns="">
+      <p:transition spd="slow" advClick="0" advTm="5000"/>
+    </mc:Fallback>
+  </mc:AlternateContent>
+  <p:timing>
+    <p:tnLst>
+      <p:par>
+        <p:cTn id="1" dur="indefinite" restart="never" nodeType="tmRoot"/>
+      </p:par>
+    </p:tnLst>
+  </p:timing>
+</p:sld>
+</file>
+
+<file path=ppt/slides/slide17.xml><?xml version="1.0" encoding="utf-8"?>
+<p:sld xmlns:a="http://schemas.openxmlformats.org/drawingml/2006/main" xmlns:r="http://schemas.openxmlformats.org/officeDocument/2006/relationships" xmlns:p="http://schemas.openxmlformats.org/presentationml/2006/main">
+  <p:cSld>
+    <p:spTree>
+      <p:nvGrpSpPr>
+        <p:cNvPr id="1" name=""/>
+        <p:cNvGrpSpPr/>
+        <p:nvPr/>
+      </p:nvGrpSpPr>
+      <p:grpSpPr>
+        <a:xfrm>
+          <a:off x="0" y="0"/>
+          <a:ext cx="0" cy="0"/>
+          <a:chOff x="0" y="0"/>
+          <a:chExt cx="0" cy="0"/>
+        </a:xfrm>
+      </p:grpSpPr>
+      <p:sp>
+        <p:nvSpPr>
           <p:cNvPr id="14" name="Text Placeholder 4">
             <a:extLst>
               <a:ext uri="{FF2B5EF4-FFF2-40B4-BE49-F238E27FC236}">
@@ -8603,7 +11415,7 @@
             <a:fld id="{C014DD1E-5D91-48A3-AD6D-45FBA980D106}" type="slidenum">
               <a:rPr lang="en-US" smtClean="0"/>
               <a:pPr/>
-              <a:t>12</a:t>
+              <a:t>17</a:t>
             </a:fld>
             <a:endParaRPr lang="en-US" dirty="0"/>
           </a:p>
@@ -9009,7 +11821,7 @@
               </a:buClr>
             </a:pPr>
             <a:r>
-              <a:rPr lang="en-US" sz="2800" b="1" dirty="0" smtClean="0">
+              <a:rPr lang="bg-BG" sz="2800" b="1" dirty="0" smtClean="0">
                 <a:solidFill>
                   <a:schemeClr val="bg1">
                     <a:lumMod val="60000"/>
@@ -9017,9 +11829,254 @@
                   </a:schemeClr>
                 </a:solidFill>
               </a:rPr>
-              <a:t>TODO</a:t>
-            </a:r>
-            <a:endParaRPr lang="en-US" sz="2800" dirty="0">
+              <a:t>Звукова карта </a:t>
+            </a:r>
+            <a:r>
+              <a:rPr lang="bg-BG" sz="2800" dirty="0" smtClean="0">
+                <a:solidFill>
+                  <a:schemeClr val="bg2"/>
+                </a:solidFill>
+              </a:rPr>
+              <a:t>– част от компютърната система, която </a:t>
+            </a:r>
+            <a:r>
+              <a:rPr lang="bg-BG" sz="2800" b="1" dirty="0" smtClean="0">
+                <a:solidFill>
+                  <a:schemeClr val="bg2"/>
+                </a:solidFill>
+              </a:rPr>
+              <a:t>създава</a:t>
+            </a:r>
+            <a:r>
+              <a:rPr lang="bg-BG" sz="2800" dirty="0" smtClean="0">
+                <a:solidFill>
+                  <a:schemeClr val="bg2"/>
+                </a:solidFill>
+              </a:rPr>
+              <a:t>, </a:t>
+            </a:r>
+            <a:r>
+              <a:rPr lang="bg-BG" sz="2800" b="1" dirty="0" smtClean="0">
+                <a:solidFill>
+                  <a:schemeClr val="bg2"/>
+                </a:solidFill>
+              </a:rPr>
+              <a:t>обработва</a:t>
+            </a:r>
+            <a:r>
+              <a:rPr lang="bg-BG" sz="2800" dirty="0" smtClean="0">
+                <a:solidFill>
+                  <a:schemeClr val="bg2"/>
+                </a:solidFill>
+              </a:rPr>
+              <a:t> и </a:t>
+            </a:r>
+            <a:r>
+              <a:rPr lang="bg-BG" sz="2800" b="1" dirty="0" smtClean="0">
+                <a:solidFill>
+                  <a:schemeClr val="bg2"/>
+                </a:solidFill>
+              </a:rPr>
+              <a:t>записва звук</a:t>
+            </a:r>
+          </a:p>
+          <a:p>
+            <a:pPr marL="381049">
+              <a:spcAft>
+                <a:spcPts val="1200"/>
+              </a:spcAft>
+              <a:buClr>
+                <a:schemeClr val="bg2"/>
+              </a:buClr>
+            </a:pPr>
+            <a:r>
+              <a:rPr lang="bg-BG" sz="2800" b="1" dirty="0" smtClean="0">
+                <a:solidFill>
+                  <a:schemeClr val="bg1">
+                    <a:lumMod val="60000"/>
+                    <a:lumOff val="40000"/>
+                  </a:schemeClr>
+                </a:solidFill>
+              </a:rPr>
+              <a:t>Видеокарта</a:t>
+            </a:r>
+            <a:r>
+              <a:rPr lang="bg-BG" sz="2800" dirty="0" smtClean="0">
+                <a:solidFill>
+                  <a:schemeClr val="bg2"/>
+                </a:solidFill>
+              </a:rPr>
+              <a:t> </a:t>
+            </a:r>
+            <a:r>
+              <a:rPr lang="bg-BG" sz="2800" dirty="0">
+                <a:solidFill>
+                  <a:schemeClr val="bg2"/>
+                </a:solidFill>
+              </a:rPr>
+              <a:t>– част от компютърната система, </a:t>
+            </a:r>
+            <a:r>
+              <a:rPr lang="bg-BG" sz="2800" dirty="0" smtClean="0">
+                <a:solidFill>
+                  <a:schemeClr val="bg2"/>
+                </a:solidFill>
+              </a:rPr>
+              <a:t>чрез която се </a:t>
+            </a:r>
+            <a:r>
+              <a:rPr lang="bg-BG" sz="2800" b="1" dirty="0" smtClean="0">
+                <a:solidFill>
+                  <a:schemeClr val="bg2"/>
+                </a:solidFill>
+              </a:rPr>
+              <a:t>получава</a:t>
+            </a:r>
+            <a:r>
+              <a:rPr lang="bg-BG" sz="2800" dirty="0" smtClean="0">
+                <a:solidFill>
+                  <a:schemeClr val="bg2"/>
+                </a:solidFill>
+              </a:rPr>
+              <a:t> и </a:t>
+            </a:r>
+            <a:r>
+              <a:rPr lang="bg-BG" sz="2800" b="1" dirty="0" smtClean="0">
+                <a:solidFill>
+                  <a:schemeClr val="bg2"/>
+                </a:solidFill>
+              </a:rPr>
+              <a:t>възпроизвежда</a:t>
+            </a:r>
+            <a:r>
+              <a:rPr lang="bg-BG" sz="2800" dirty="0" smtClean="0">
+                <a:solidFill>
+                  <a:schemeClr val="bg2"/>
+                </a:solidFill>
+              </a:rPr>
+              <a:t> </a:t>
+            </a:r>
+            <a:r>
+              <a:rPr lang="bg-BG" sz="2800" b="1" dirty="0" smtClean="0">
+                <a:solidFill>
+                  <a:schemeClr val="bg2"/>
+                </a:solidFill>
+              </a:rPr>
+              <a:t>видеоизображение</a:t>
+            </a:r>
+          </a:p>
+          <a:p>
+            <a:pPr marL="381049">
+              <a:spcAft>
+                <a:spcPts val="1200"/>
+              </a:spcAft>
+              <a:buClr>
+                <a:schemeClr val="bg2"/>
+              </a:buClr>
+            </a:pPr>
+            <a:r>
+              <a:rPr lang="bg-BG" sz="2800" b="1" dirty="0" smtClean="0">
+                <a:solidFill>
+                  <a:schemeClr val="bg2"/>
+                </a:solidFill>
+              </a:rPr>
+              <a:t>Програми</a:t>
+            </a:r>
+            <a:r>
+              <a:rPr lang="bg-BG" sz="2800" dirty="0" smtClean="0">
+                <a:solidFill>
+                  <a:schemeClr val="bg2"/>
+                </a:solidFill>
+              </a:rPr>
+              <a:t> за възпроизвеждане на </a:t>
+            </a:r>
+            <a:r>
+              <a:rPr lang="bg-BG" sz="2800" b="1" dirty="0" smtClean="0">
+                <a:solidFill>
+                  <a:schemeClr val="bg2"/>
+                </a:solidFill>
+              </a:rPr>
+              <a:t>звукова</a:t>
+            </a:r>
+            <a:r>
+              <a:rPr lang="bg-BG" sz="2800" dirty="0" smtClean="0">
+                <a:solidFill>
+                  <a:schemeClr val="bg2"/>
+                </a:solidFill>
+              </a:rPr>
+              <a:t> и </a:t>
+            </a:r>
+            <a:r>
+              <a:rPr lang="bg-BG" sz="2800" b="1" dirty="0" smtClean="0">
+                <a:solidFill>
+                  <a:schemeClr val="bg2"/>
+                </a:solidFill>
+              </a:rPr>
+              <a:t>видеоинформация</a:t>
+            </a:r>
+            <a:r>
+              <a:rPr lang="bg-BG" sz="2800" dirty="0" smtClean="0">
+                <a:solidFill>
+                  <a:schemeClr val="bg2"/>
+                </a:solidFill>
+              </a:rPr>
+              <a:t>:</a:t>
+            </a:r>
+          </a:p>
+          <a:p>
+            <a:pPr marL="914115" lvl="1">
+              <a:spcAft>
+                <a:spcPts val="1200"/>
+              </a:spcAft>
+              <a:buClr>
+                <a:schemeClr val="bg2"/>
+              </a:buClr>
+            </a:pPr>
+            <a:r>
+              <a:rPr lang="en-US" sz="2600" b="1" dirty="0" smtClean="0">
+                <a:solidFill>
+                  <a:schemeClr val="bg2"/>
+                </a:solidFill>
+              </a:rPr>
+              <a:t>Groove Music</a:t>
+            </a:r>
+          </a:p>
+          <a:p>
+            <a:pPr marL="914115" lvl="1">
+              <a:spcAft>
+                <a:spcPts val="1200"/>
+              </a:spcAft>
+              <a:buClr>
+                <a:schemeClr val="bg2"/>
+              </a:buClr>
+            </a:pPr>
+            <a:r>
+              <a:rPr lang="en-US" sz="2600" b="1" dirty="0" smtClean="0">
+                <a:solidFill>
+                  <a:schemeClr val="bg2"/>
+                </a:solidFill>
+              </a:rPr>
+              <a:t>Movies &amp; TV</a:t>
+            </a:r>
+          </a:p>
+          <a:p>
+            <a:pPr marL="914115" lvl="1">
+              <a:spcAft>
+                <a:spcPts val="1200"/>
+              </a:spcAft>
+              <a:buClr>
+                <a:schemeClr val="bg2"/>
+              </a:buClr>
+            </a:pPr>
+            <a:r>
+              <a:rPr lang="en-US" sz="2600" b="1" dirty="0" smtClean="0">
+                <a:solidFill>
+                  <a:schemeClr val="bg2"/>
+                </a:solidFill>
+              </a:rPr>
+              <a:t>Windows Media Player</a:t>
+            </a:r>
+            <a:endParaRPr lang="en-US" sz="2600" b="1" dirty="0">
               <a:solidFill>
                 <a:schemeClr val="bg2"/>
               </a:solidFill>
@@ -9096,7 +12153,203 @@
                                         <p:tgtEl>
                                           <p:spTgt spid="15">
                                             <p:txEl>
-                                              <p:pRg st="0" end="0"/>
+                                              <p:pRg st="1" end="1"/>
+                                            </p:txEl>
+                                          </p:spTgt>
+                                        </p:tgtEl>
+                                        <p:attrNameLst>
+                                          <p:attrName>style.visibility</p:attrName>
+                                        </p:attrNameLst>
+                                      </p:cBhvr>
+                                      <p:to>
+                                        <p:strVal val="visible"/>
+                                      </p:to>
+                                    </p:set>
+                                  </p:childTnLst>
+                                </p:cTn>
+                              </p:par>
+                            </p:childTnLst>
+                          </p:cTn>
+                        </p:par>
+                      </p:childTnLst>
+                    </p:cTn>
+                  </p:par>
+                  <p:par>
+                    <p:cTn id="7" fill="hold">
+                      <p:stCondLst>
+                        <p:cond delay="indefinite"/>
+                      </p:stCondLst>
+                      <p:childTnLst>
+                        <p:par>
+                          <p:cTn id="8" fill="hold">
+                            <p:stCondLst>
+                              <p:cond delay="0"/>
+                            </p:stCondLst>
+                            <p:childTnLst>
+                              <p:par>
+                                <p:cTn id="9" presetID="1" presetClass="entr" presetSubtype="0" fill="hold" nodeType="clickEffect">
+                                  <p:stCondLst>
+                                    <p:cond delay="0"/>
+                                  </p:stCondLst>
+                                  <p:childTnLst>
+                                    <p:set>
+                                      <p:cBhvr>
+                                        <p:cTn id="10" dur="1" fill="hold">
+                                          <p:stCondLst>
+                                            <p:cond delay="0"/>
+                                          </p:stCondLst>
+                                        </p:cTn>
+                                        <p:tgtEl>
+                                          <p:spTgt spid="15">
+                                            <p:txEl>
+                                              <p:pRg st="2" end="2"/>
+                                            </p:txEl>
+                                          </p:spTgt>
+                                        </p:tgtEl>
+                                        <p:attrNameLst>
+                                          <p:attrName>style.visibility</p:attrName>
+                                        </p:attrNameLst>
+                                      </p:cBhvr>
+                                      <p:to>
+                                        <p:strVal val="visible"/>
+                                      </p:to>
+                                    </p:set>
+                                  </p:childTnLst>
+                                </p:cTn>
+                              </p:par>
+                            </p:childTnLst>
+                          </p:cTn>
+                        </p:par>
+                      </p:childTnLst>
+                    </p:cTn>
+                  </p:par>
+                  <p:par>
+                    <p:cTn id="11" fill="hold">
+                      <p:stCondLst>
+                        <p:cond delay="indefinite"/>
+                      </p:stCondLst>
+                      <p:childTnLst>
+                        <p:par>
+                          <p:cTn id="12" fill="hold">
+                            <p:stCondLst>
+                              <p:cond delay="0"/>
+                            </p:stCondLst>
+                            <p:childTnLst>
+                              <p:par>
+                                <p:cTn id="13" presetID="1" presetClass="entr" presetSubtype="0" fill="hold" nodeType="clickEffect">
+                                  <p:stCondLst>
+                                    <p:cond delay="0"/>
+                                  </p:stCondLst>
+                                  <p:childTnLst>
+                                    <p:set>
+                                      <p:cBhvr>
+                                        <p:cTn id="14" dur="1" fill="hold">
+                                          <p:stCondLst>
+                                            <p:cond delay="0"/>
+                                          </p:stCondLst>
+                                        </p:cTn>
+                                        <p:tgtEl>
+                                          <p:spTgt spid="15">
+                                            <p:txEl>
+                                              <p:pRg st="3" end="3"/>
+                                            </p:txEl>
+                                          </p:spTgt>
+                                        </p:tgtEl>
+                                        <p:attrNameLst>
+                                          <p:attrName>style.visibility</p:attrName>
+                                        </p:attrNameLst>
+                                      </p:cBhvr>
+                                      <p:to>
+                                        <p:strVal val="visible"/>
+                                      </p:to>
+                                    </p:set>
+                                  </p:childTnLst>
+                                </p:cTn>
+                              </p:par>
+                            </p:childTnLst>
+                          </p:cTn>
+                        </p:par>
+                      </p:childTnLst>
+                    </p:cTn>
+                  </p:par>
+                  <p:par>
+                    <p:cTn id="15" fill="hold">
+                      <p:stCondLst>
+                        <p:cond delay="indefinite"/>
+                      </p:stCondLst>
+                      <p:childTnLst>
+                        <p:par>
+                          <p:cTn id="16" fill="hold">
+                            <p:stCondLst>
+                              <p:cond delay="0"/>
+                            </p:stCondLst>
+                            <p:childTnLst>
+                              <p:par>
+                                <p:cTn id="17" presetID="1" presetClass="entr" presetSubtype="0" fill="hold" nodeType="clickEffect">
+                                  <p:stCondLst>
+                                    <p:cond delay="0"/>
+                                  </p:stCondLst>
+                                  <p:childTnLst>
+                                    <p:set>
+                                      <p:cBhvr>
+                                        <p:cTn id="18" dur="1" fill="hold">
+                                          <p:stCondLst>
+                                            <p:cond delay="0"/>
+                                          </p:stCondLst>
+                                        </p:cTn>
+                                        <p:tgtEl>
+                                          <p:spTgt spid="15">
+                                            <p:txEl>
+                                              <p:pRg st="4" end="4"/>
+                                            </p:txEl>
+                                          </p:spTgt>
+                                        </p:tgtEl>
+                                        <p:attrNameLst>
+                                          <p:attrName>style.visibility</p:attrName>
+                                        </p:attrNameLst>
+                                      </p:cBhvr>
+                                      <p:to>
+                                        <p:strVal val="visible"/>
+                                      </p:to>
+                                    </p:set>
+                                  </p:childTnLst>
+                                </p:cTn>
+                              </p:par>
+                            </p:childTnLst>
+                          </p:cTn>
+                        </p:par>
+                      </p:childTnLst>
+                    </p:cTn>
+                  </p:par>
+                  <p:par>
+                    <p:cTn id="19" fill="hold">
+                      <p:stCondLst>
+                        <p:cond delay="indefinite"/>
+                      </p:stCondLst>
+                      <p:childTnLst>
+                        <p:par>
+                          <p:cTn id="20" fill="hold">
+                            <p:stCondLst>
+                              <p:cond delay="0"/>
+                            </p:stCondLst>
+                            <p:childTnLst>
+                              <p:par>
+                                <p:cTn id="21" presetID="1" presetClass="entr" presetSubtype="0" fill="hold" nodeType="clickEffect">
+                                  <p:stCondLst>
+                                    <p:cond delay="0"/>
+                                  </p:stCondLst>
+                                  <p:childTnLst>
+                                    <p:set>
+                                      <p:cBhvr>
+                                        <p:cTn id="22" dur="1" fill="hold">
+                                          <p:stCondLst>
+                                            <p:cond delay="0"/>
+                                          </p:stCondLst>
+                                        </p:cTn>
+                                        <p:tgtEl>
+                                          <p:spTgt spid="15">
+                                            <p:txEl>
+                                              <p:pRg st="5" end="5"/>
                                             </p:txEl>
                                           </p:spTgt>
                                         </p:tgtEl>
@@ -9142,7 +12395,7 @@
 </p:sld>
 </file>
 
-<file path=ppt/slides/slide13.xml><?xml version="1.0" encoding="utf-8"?>
+<file path=ppt/slides/slide18.xml><?xml version="1.0" encoding="utf-8"?>
 <p:sld xmlns:a="http://schemas.openxmlformats.org/drawingml/2006/main" xmlns:r="http://schemas.openxmlformats.org/officeDocument/2006/relationships" xmlns:p="http://schemas.openxmlformats.org/presentationml/2006/main">
   <p:cSld>
     <p:spTree>
@@ -9339,7 +12592,7 @@
 </p:sld>
 </file>
 
-<file path=ppt/slides/slide14.xml><?xml version="1.0" encoding="utf-8"?>
+<file path=ppt/slides/slide19.xml><?xml version="1.0" encoding="utf-8"?>
 <p:sld xmlns:a="http://schemas.openxmlformats.org/drawingml/2006/main" xmlns:r="http://schemas.openxmlformats.org/officeDocument/2006/relationships" xmlns:p="http://schemas.openxmlformats.org/presentationml/2006/main">
   <p:cSld>
     <p:spTree>
@@ -9392,7 +12645,7 @@
             <a:fld id="{2BF067CD-8E6B-4360-9AA8-C5DF2A48A6D1}" type="slidenum">
               <a:rPr lang="en-US" smtClean="0"/>
               <a:pPr/>
-              <a:t>14</a:t>
+              <a:t>19</a:t>
             </a:fld>
             <a:endParaRPr lang="en-US" dirty="0"/>
           </a:p>
@@ -9976,33 +13229,34 @@
               <a:buAutoNum type="arabicPeriod" startAt="2"/>
             </a:pPr>
             <a:r>
+              <a:rPr lang="bg-BG" dirty="0"/>
+              <a:t>Програми за </a:t>
+            </a:r>
+            <a:r>
+              <a:rPr lang="bg-BG" b="1" dirty="0"/>
+              <a:t>възпроизвеждане</a:t>
+            </a:r>
+            <a:r>
+              <a:rPr lang="bg-BG" dirty="0"/>
+              <a:t> на </a:t>
+            </a:r>
+            <a:r>
+              <a:rPr lang="bg-BG" b="1" dirty="0"/>
+              <a:t>звукова</a:t>
+            </a:r>
+            <a:r>
+              <a:rPr lang="bg-BG" dirty="0"/>
+              <a:t> </a:t>
+            </a:r>
+            <a:r>
               <a:rPr lang="bg-BG" dirty="0" smtClean="0"/>
-              <a:t>Компютърни </a:t>
+              <a:t>и </a:t>
             </a:r>
             <a:r>
               <a:rPr lang="bg-BG" b="1" dirty="0" smtClean="0"/>
-              <a:t>програми за възпроизвеждане </a:t>
-            </a:r>
-            <a:r>
-              <a:rPr lang="bg-BG" dirty="0" smtClean="0"/>
-              <a:t>на </a:t>
-            </a:r>
-          </a:p>
-          <a:p>
-            <a:pPr marL="0" indent="0">
-              <a:buNone/>
-            </a:pPr>
-            <a:r>
-              <a:rPr lang="bg-BG" b="1" dirty="0" smtClean="0"/>
-              <a:t>звукова информация</a:t>
-            </a:r>
-          </a:p>
-          <a:p>
-            <a:pPr>
-              <a:buFont typeface="+mj-lt"/>
-              <a:buAutoNum type="arabicPeriod" startAt="2"/>
-            </a:pPr>
-            <a:endParaRPr lang="en-US" dirty="0"/>
+              <a:t>видеоинформация</a:t>
+            </a:r>
+            <a:endParaRPr lang="en-US" b="1" dirty="0"/>
           </a:p>
         </p:txBody>
       </p:sp>
@@ -10187,86 +13441,6 @@
                                           <p:spTgt spid="444419">
                                             <p:txEl>
                                               <p:pRg st="3" end="3"/>
-                                            </p:txEl>
-                                          </p:spTgt>
-                                        </p:tgtEl>
-                                        <p:attrNameLst>
-                                          <p:attrName>style.visibility</p:attrName>
-                                        </p:attrNameLst>
-                                      </p:cBhvr>
-                                      <p:to>
-                                        <p:strVal val="visible"/>
-                                      </p:to>
-                                    </p:set>
-                                  </p:childTnLst>
-                                </p:cTn>
-                              </p:par>
-                            </p:childTnLst>
-                          </p:cTn>
-                        </p:par>
-                      </p:childTnLst>
-                    </p:cTn>
-                  </p:par>
-                  <p:par>
-                    <p:cTn id="11" fill="hold">
-                      <p:stCondLst>
-                        <p:cond delay="indefinite"/>
-                      </p:stCondLst>
-                      <p:childTnLst>
-                        <p:par>
-                          <p:cTn id="12" fill="hold">
-                            <p:stCondLst>
-                              <p:cond delay="0"/>
-                            </p:stCondLst>
-                            <p:childTnLst>
-                              <p:par>
-                                <p:cTn id="13" presetID="1" presetClass="entr" presetSubtype="0" fill="hold" nodeType="clickEffect">
-                                  <p:stCondLst>
-                                    <p:cond delay="0"/>
-                                  </p:stCondLst>
-                                  <p:childTnLst>
-                                    <p:set>
-                                      <p:cBhvr>
-                                        <p:cTn id="14" dur="1" fill="hold">
-                                          <p:stCondLst>
-                                            <p:cond delay="0"/>
-                                          </p:stCondLst>
-                                        </p:cTn>
-                                        <p:tgtEl>
-                                          <p:spTgt spid="444419">
-                                            <p:txEl>
-                                              <p:pRg st="4" end="4"/>
-                                            </p:txEl>
-                                          </p:spTgt>
-                                        </p:tgtEl>
-                                        <p:attrNameLst>
-                                          <p:attrName>style.visibility</p:attrName>
-                                        </p:attrNameLst>
-                                      </p:cBhvr>
-                                      <p:to>
-                                        <p:strVal val="visible"/>
-                                      </p:to>
-                                    </p:set>
-                                  </p:childTnLst>
-                                </p:cTn>
-                              </p:par>
-                              <p:par>
-                                <p:cTn id="15" presetID="1" presetClass="entr" presetSubtype="0" fill="hold" nodeType="withEffect">
-                                  <p:stCondLst>
-                                    <p:cond delay="0"/>
-                                  </p:stCondLst>
-                                  <p:childTnLst>
-                                    <p:set>
-                                      <p:cBhvr>
-                                        <p:cTn id="16" dur="1" fill="hold">
-                                          <p:stCondLst>
-                                            <p:cond delay="0"/>
-                                          </p:stCondLst>
-                                        </p:cTn>
-                                        <p:tgtEl>
-                                          <p:spTgt spid="444419">
-                                            <p:txEl>
-                                              <p:pRg st="5" end="5"/>
                                             </p:txEl>
                                           </p:spTgt>
                                         </p:tgtEl>

</xml_diff>

<commit_message>
Minor fixes for sound and video slides
</commit_message>
<xml_diff>
--- a/Courses/Computer-Modeling-and-IT/Computer-Modeling-and-IT-5-Class/10-Working-With-Sound-and-Video-Information/10-Working-With-Sound-and-Video-Information.pptx
+++ b/Courses/Computer-Modeling-and-IT/Computer-Modeling-and-IT-5-Class/10-Working-With-Sound-and-Video-Information/10-Working-With-Sound-and-Video-Information.pptx
@@ -5,10 +5,10 @@
     <p:sldMasterId id="2147483675" r:id="rId1"/>
   </p:sldMasterIdLst>
   <p:notesMasterIdLst>
-    <p:notesMasterId r:id="rId21"/>
+    <p:notesMasterId r:id="rId23"/>
   </p:notesMasterIdLst>
   <p:handoutMasterIdLst>
-    <p:handoutMasterId r:id="rId22"/>
+    <p:handoutMasterId r:id="rId24"/>
   </p:handoutMasterIdLst>
   <p:sldIdLst>
     <p:sldId id="503" r:id="rId2"/>
@@ -22,14 +22,16 @@
     <p:sldId id="609" r:id="rId10"/>
     <p:sldId id="611" r:id="rId11"/>
     <p:sldId id="610" r:id="rId12"/>
-    <p:sldId id="612" r:id="rId13"/>
-    <p:sldId id="615" r:id="rId14"/>
-    <p:sldId id="613" r:id="rId15"/>
-    <p:sldId id="614" r:id="rId16"/>
-    <p:sldId id="616" r:id="rId17"/>
-    <p:sldId id="602" r:id="rId18"/>
-    <p:sldId id="504" r:id="rId19"/>
-    <p:sldId id="505" r:id="rId20"/>
+    <p:sldId id="617" r:id="rId13"/>
+    <p:sldId id="612" r:id="rId14"/>
+    <p:sldId id="615" r:id="rId15"/>
+    <p:sldId id="618" r:id="rId16"/>
+    <p:sldId id="613" r:id="rId17"/>
+    <p:sldId id="614" r:id="rId18"/>
+    <p:sldId id="616" r:id="rId19"/>
+    <p:sldId id="602" r:id="rId20"/>
+    <p:sldId id="504" r:id="rId21"/>
+    <p:sldId id="505" r:id="rId22"/>
   </p:sldIdLst>
   <p:sldSz cx="12192000" cy="6858000"/>
   <p:notesSz cx="6858000" cy="9144000"/>
@@ -156,8 +158,10 @@
           <p14:sldIdLst>
             <p14:sldId id="611"/>
             <p14:sldId id="610"/>
+            <p14:sldId id="617"/>
             <p14:sldId id="612"/>
             <p14:sldId id="615"/>
+            <p14:sldId id="618"/>
             <p14:sldId id="613"/>
             <p14:sldId id="614"/>
             <p14:sldId id="616"/>
@@ -287,7 +291,7 @@
           <a:p>
             <a:fld id="{4E087215-0C8F-4762-A664-737A353EC9A4}" type="datetimeFigureOut">
               <a:rPr lang="bg-BG" smtClean="0"/>
-              <a:t>22.10.2023 г.</a:t>
+              <a:t>31.10.23 г.</a:t>
             </a:fld>
             <a:endParaRPr lang="bg-BG"/>
           </a:p>
@@ -483,7 +487,7 @@
           <a:p>
             <a:fld id="{72D84649-876A-46C9-8472-14CB09C070D8}" type="datetimeFigureOut">
               <a:rPr lang="en-US" smtClean="0"/>
-              <a:t>10/22/2023</a:t>
+              <a:t>10/31/23</a:t>
             </a:fld>
             <a:endParaRPr lang="en-US"/>
           </a:p>
@@ -1268,7 +1272,7 @@
             <a:fld id="{3EBA5BD7-F043-4D1B-AA17-CD412FC534DE}" type="slidenum">
               <a:rPr lang="en-US" smtClean="0"/>
               <a:pPr/>
-              <a:t>17</a:t>
+              <a:t>19</a:t>
             </a:fld>
             <a:endParaRPr lang="en-US" dirty="0"/>
           </a:p>
@@ -1459,7 +1463,7 @@
             <a:fld id="{3EBA5BD7-F043-4D1B-AA17-CD412FC534DE}" type="slidenum">
               <a:rPr lang="en-US" smtClean="0"/>
               <a:pPr/>
-              <a:t>18</a:t>
+              <a:t>20</a:t>
             </a:fld>
             <a:endParaRPr lang="en-US" dirty="0"/>
           </a:p>
@@ -1689,7 +1693,7 @@
             <a:fld id="{3EBA5BD7-F043-4D1B-AA17-CD412FC534DE}" type="slidenum">
               <a:rPr lang="en-US" smtClean="0"/>
               <a:pPr/>
-              <a:t>19</a:t>
+              <a:t>21</a:t>
             </a:fld>
             <a:endParaRPr lang="en-US" dirty="0"/>
           </a:p>
@@ -4223,7 +4227,7 @@
             <a:fld id="{055373AC-9AA7-423B-BA00-BA1C74164DBD}" type="datetime1">
               <a:rPr lang="en-US" smtClean="0"/>
               <a:pPr/>
-              <a:t>10/22/2023</a:t>
+              <a:t>10/31/23</a:t>
             </a:fld>
             <a:endParaRPr lang="en-US" dirty="0"/>
           </a:p>
@@ -7533,7 +7537,7 @@
           <a:lstStyle/>
           <a:p>
             <a:r>
-              <a:rPr lang="bg-BG" dirty="0" smtClean="0"/>
+              <a:rPr lang="bg-BG" dirty="0"/>
               <a:t>Основни компоненти за възпроизвеждане на звук и видео</a:t>
             </a:r>
             <a:endParaRPr lang="en-US" dirty="0"/>
@@ -7592,14 +7596,13 @@
               </a:ext>
             </a:extLst>
           </a:blip>
-          <a:stretch>
-            <a:fillRect/>
-          </a:stretch>
+          <a:srcRect/>
+          <a:stretch/>
         </p:blipFill>
         <p:spPr>
           <a:xfrm>
-            <a:off x="554746" y="3024977"/>
-            <a:ext cx="1769683" cy="825597"/>
+            <a:off x="554746" y="3040926"/>
+            <a:ext cx="1769683" cy="793699"/>
           </a:xfrm>
           <a:prstGeom prst="rect">
             <a:avLst/>
@@ -7723,13 +7726,6 @@
       <p:transition spd="slow" advClick="0" advTm="5000"/>
     </mc:Fallback>
   </mc:AlternateContent>
-  <p:timing>
-    <p:tnLst>
-      <p:par>
-        <p:cTn id="1" dur="indefinite" restart="never" nodeType="tmRoot"/>
-      </p:par>
-    </p:tnLst>
-  </p:timing>
 </p:sld>
 </file>
 
@@ -7771,7 +7767,7 @@
           <a:lstStyle/>
           <a:p>
             <a:r>
-              <a:rPr lang="bg-BG" dirty="0" smtClean="0"/>
+              <a:rPr lang="bg-BG" dirty="0"/>
               <a:t>Програми за възпроизвеждане на звукова и видеоинформация</a:t>
             </a:r>
             <a:endParaRPr lang="en-US" dirty="0"/>
@@ -7865,13 +7861,6 @@
       <p:transition spd="slow" advClick="0" advTm="5000"/>
     </mc:Fallback>
   </mc:AlternateContent>
-  <p:timing>
-    <p:tnLst>
-      <p:par>
-        <p:cTn id="1" dur="indefinite" restart="never" nodeType="tmRoot"/>
-      </p:par>
-    </p:tnLst>
-  </p:timing>
 </p:sld>
 </file>
 
@@ -7926,17 +7915,22 @@
             <p:ph type="body" sz="quarter" idx="10"/>
           </p:nvPr>
         </p:nvSpPr>
-        <p:spPr/>
+        <p:spPr>
+          <a:xfrm>
+            <a:off x="-24000" y="1196125"/>
+            <a:ext cx="12216000" cy="5528766"/>
+          </a:xfrm>
+        </p:spPr>
         <p:txBody>
           <a:bodyPr/>
           <a:lstStyle/>
           <a:p>
             <a:r>
-              <a:rPr lang="bg-BG" dirty="0" smtClean="0"/>
+              <a:rPr lang="bg-BG" sz="3200" dirty="0"/>
               <a:t>В системата </a:t>
             </a:r>
             <a:r>
-              <a:rPr lang="en-US" b="1" dirty="0" smtClean="0">
+              <a:rPr lang="en-US" sz="3200" b="1" dirty="0">
                 <a:solidFill>
                   <a:schemeClr val="bg1"/>
                 </a:solidFill>
@@ -7944,95 +7938,102 @@
               <a:t>Windows</a:t>
             </a:r>
             <a:r>
-              <a:rPr lang="en-US" dirty="0" smtClean="0"/>
+              <a:rPr lang="en-US" sz="3200" dirty="0"/>
               <a:t> </a:t>
             </a:r>
             <a:r>
-              <a:rPr lang="bg-BG" dirty="0" smtClean="0"/>
+              <a:rPr lang="bg-BG" sz="3200" dirty="0"/>
               <a:t>има различни </a:t>
             </a:r>
             <a:r>
-              <a:rPr lang="bg-BG" b="1" dirty="0" smtClean="0"/>
+              <a:rPr lang="bg-BG" sz="3200" b="1" dirty="0"/>
               <a:t>програми</a:t>
             </a:r>
             <a:r>
-              <a:rPr lang="bg-BG" dirty="0" smtClean="0"/>
+              <a:rPr lang="bg-BG" sz="3200" dirty="0"/>
               <a:t> за </a:t>
             </a:r>
             <a:r>
-              <a:rPr lang="bg-BG" b="1" dirty="0" smtClean="0"/>
+              <a:rPr lang="bg-BG" sz="3200" b="1" dirty="0"/>
               <a:t>възпроизвеждане</a:t>
             </a:r>
             <a:r>
-              <a:rPr lang="bg-BG" dirty="0" smtClean="0"/>
+              <a:rPr lang="bg-BG" sz="3200" dirty="0"/>
               <a:t> на </a:t>
             </a:r>
             <a:r>
-              <a:rPr lang="bg-BG" b="1" dirty="0" smtClean="0"/>
+              <a:rPr lang="bg-BG" sz="3200" b="1" dirty="0"/>
               <a:t>звукова</a:t>
             </a:r>
             <a:r>
-              <a:rPr lang="bg-BG" dirty="0" smtClean="0"/>
+              <a:rPr lang="bg-BG" sz="3200" dirty="0"/>
               <a:t> и </a:t>
             </a:r>
             <a:r>
-              <a:rPr lang="bg-BG" b="1" dirty="0" smtClean="0"/>
+              <a:rPr lang="bg-BG" sz="3200" b="1" dirty="0"/>
               <a:t>видеоинформация</a:t>
             </a:r>
             <a:r>
-              <a:rPr lang="en-US" dirty="0" smtClean="0"/>
+              <a:rPr lang="en-US" sz="3200" dirty="0"/>
               <a:t>, </a:t>
             </a:r>
             <a:r>
-              <a:rPr lang="bg-BG" dirty="0" smtClean="0"/>
-              <a:t>като:</a:t>
+              <a:rPr lang="bg-BG" sz="3200" dirty="0"/>
+              <a:t>като</a:t>
+            </a:r>
+            <a:r>
+              <a:rPr lang="bg-BG" dirty="0"/>
+              <a:t>:</a:t>
             </a:r>
           </a:p>
           <a:p>
             <a:pPr lvl="1"/>
             <a:r>
-              <a:rPr lang="en-US" b="1" dirty="0" smtClean="0"/>
+              <a:rPr lang="en-US" sz="3000" b="1" dirty="0"/>
               <a:t>Groove Music </a:t>
             </a:r>
             <a:r>
-              <a:rPr lang="en-US" dirty="0" smtClean="0"/>
+              <a:rPr lang="en-US" sz="3000" dirty="0"/>
               <a:t>– </a:t>
             </a:r>
             <a:r>
-              <a:rPr lang="bg-BG" dirty="0" smtClean="0"/>
+              <a:rPr lang="bg-BG" sz="3000" dirty="0"/>
               <a:t>за звук</a:t>
             </a:r>
-            <a:endParaRPr lang="en-US" dirty="0" smtClean="0"/>
+            <a:endParaRPr lang="en-US" sz="3000" dirty="0"/>
           </a:p>
           <a:p>
             <a:pPr lvl="1"/>
             <a:r>
-              <a:rPr lang="en-US" b="1" dirty="0"/>
+              <a:rPr lang="en-US" sz="3000" b="1" dirty="0"/>
               <a:t>Movies &amp; TV</a:t>
             </a:r>
             <a:r>
-              <a:rPr lang="bg-BG" b="1" dirty="0"/>
+              <a:rPr lang="bg-BG" sz="3000" b="1" dirty="0"/>
               <a:t> </a:t>
             </a:r>
             <a:r>
-              <a:rPr lang="bg-BG" dirty="0"/>
-              <a:t>– за </a:t>
-            </a:r>
-            <a:r>
-              <a:rPr lang="bg-BG" dirty="0" smtClean="0"/>
-              <a:t>видео</a:t>
-            </a:r>
-            <a:endParaRPr lang="bg-BG" dirty="0"/>
+              <a:rPr lang="bg-BG" sz="3000" dirty="0"/>
+              <a:t>– за видео</a:t>
+            </a:r>
           </a:p>
           <a:p>
             <a:pPr lvl="1"/>
             <a:r>
-              <a:rPr lang="en-US" b="1" dirty="0" smtClean="0"/>
+              <a:rPr lang="en-US" sz="3000" b="1" dirty="0"/>
               <a:t>Windows Media Player</a:t>
             </a:r>
             <a:r>
-              <a:rPr lang="bg-BG" dirty="0" smtClean="0"/>
+              <a:rPr lang="bg-BG" sz="3000" dirty="0"/>
               <a:t> – за звук и видео</a:t>
+            </a:r>
+            <a:r>
+              <a:rPr lang="en-US" sz="3000" dirty="0"/>
+              <a:t> (</a:t>
+            </a:r>
+            <a:r>
+              <a:rPr lang="bg-BG" sz="3000" dirty="0"/>
+              <a:t>вече почти не се използва)</a:t>
             </a:r>
           </a:p>
         </p:txBody>
@@ -8060,7 +8061,7 @@
           <a:lstStyle/>
           <a:p>
             <a:r>
-              <a:rPr lang="bg-BG" sz="4000" dirty="0" smtClean="0"/>
+              <a:rPr lang="bg-BG" sz="4000" dirty="0"/>
               <a:t>Програми</a:t>
             </a:r>
             <a:endParaRPr lang="en-US" sz="4000" dirty="0"/>
@@ -8455,6 +8456,259 @@
       </p:grpSpPr>
       <p:sp>
         <p:nvSpPr>
+          <p:cNvPr id="6" name="Subtitle 5">
+            <a:extLst>
+              <a:ext uri="{FF2B5EF4-FFF2-40B4-BE49-F238E27FC236}">
+                <a16:creationId xmlns:a16="http://schemas.microsoft.com/office/drawing/2014/main" id="{19307869-ED62-AC23-DDA5-9AFC77E565B7}"/>
+              </a:ext>
+            </a:extLst>
+          </p:cNvPr>
+          <p:cNvSpPr>
+            <a:spLocks noGrp="1"/>
+          </p:cNvSpPr>
+          <p:nvPr>
+            <p:ph type="subTitle" sz="quarter" idx="11"/>
+          </p:nvPr>
+        </p:nvSpPr>
+        <p:spPr/>
+        <p:txBody>
+          <a:bodyPr/>
+          <a:lstStyle/>
+          <a:p>
+            <a:r>
+              <a:rPr lang="en-US" dirty="0"/>
+              <a:t>Audio player</a:t>
+            </a:r>
+            <a:endParaRPr lang="bg-BG" dirty="0"/>
+          </a:p>
+        </p:txBody>
+      </p:sp>
+      <p:sp>
+        <p:nvSpPr>
+          <p:cNvPr id="5" name="Title 4">
+            <a:extLst>
+              <a:ext uri="{FF2B5EF4-FFF2-40B4-BE49-F238E27FC236}">
+                <a16:creationId xmlns:a16="http://schemas.microsoft.com/office/drawing/2014/main" id="{6B8DC037-2280-A382-6448-78ACA93DDA08}"/>
+              </a:ext>
+            </a:extLst>
+          </p:cNvPr>
+          <p:cNvSpPr>
+            <a:spLocks noGrp="1"/>
+          </p:cNvSpPr>
+          <p:nvPr>
+            <p:ph type="title" sz="quarter" idx="10"/>
+          </p:nvPr>
+        </p:nvSpPr>
+        <p:spPr>
+          <a:xfrm>
+            <a:off x="5241000" y="1786047"/>
+            <a:ext cx="6065892" cy="1462953"/>
+          </a:xfrm>
+        </p:spPr>
+        <p:txBody>
+          <a:bodyPr/>
+          <a:lstStyle/>
+          <a:p>
+            <a:r>
+              <a:rPr lang="en-US" sz="6000" dirty="0"/>
+              <a:t>Groove Music</a:t>
+            </a:r>
+            <a:endParaRPr lang="bg-BG" sz="6000" dirty="0"/>
+          </a:p>
+        </p:txBody>
+      </p:sp>
+      <p:sp>
+        <p:nvSpPr>
+          <p:cNvPr id="2" name="Slide Number Placeholder 1">
+            <a:extLst>
+              <a:ext uri="{FF2B5EF4-FFF2-40B4-BE49-F238E27FC236}">
+                <a16:creationId xmlns:a16="http://schemas.microsoft.com/office/drawing/2014/main" id="{1583C823-3714-C5CF-ED69-AE14E8AA150C}"/>
+              </a:ext>
+            </a:extLst>
+          </p:cNvPr>
+          <p:cNvSpPr>
+            <a:spLocks noGrp="1"/>
+          </p:cNvSpPr>
+          <p:nvPr>
+            <p:ph type="sldNum" sz="quarter" idx="4294967295"/>
+          </p:nvPr>
+        </p:nvSpPr>
+        <p:spPr>
+          <a:xfrm>
+            <a:off x="11823700" y="6507163"/>
+            <a:ext cx="368300" cy="296862"/>
+          </a:xfrm>
+          <a:prstGeom prst="rect">
+            <a:avLst/>
+          </a:prstGeom>
+        </p:spPr>
+        <p:txBody>
+          <a:bodyPr/>
+          <a:lstStyle/>
+          <a:p>
+            <a:fld id="{2BF067CD-8E6B-4360-9AA8-C5DF2A48A6D1}" type="slidenum">
+              <a:rPr lang="en-US" noProof="0" smtClean="0"/>
+              <a:pPr/>
+              <a:t>12</a:t>
+            </a:fld>
+            <a:endParaRPr lang="en-US" noProof="0" dirty="0"/>
+          </a:p>
+        </p:txBody>
+      </p:sp>
+      <p:pic>
+        <p:nvPicPr>
+          <p:cNvPr id="8" name="Picture 7">
+            <a:extLst>
+              <a:ext uri="{FF2B5EF4-FFF2-40B4-BE49-F238E27FC236}">
+                <a16:creationId xmlns:a16="http://schemas.microsoft.com/office/drawing/2014/main" id="{67425F4C-4DA4-0250-E535-8BD25D8A4DD7}"/>
+              </a:ext>
+            </a:extLst>
+          </p:cNvPr>
+          <p:cNvPicPr>
+            <a:picLocks noChangeAspect="1"/>
+          </p:cNvPicPr>
+          <p:nvPr/>
+        </p:nvPicPr>
+        <p:blipFill>
+          <a:blip r:embed="rId2">
+            <a:extLst>
+              <a:ext uri="{28A0092B-C50C-407E-A947-70E740481C1C}">
+                <a14:useLocalDpi xmlns:a14="http://schemas.microsoft.com/office/drawing/2010/main" val="0"/>
+              </a:ext>
+            </a:extLst>
+          </a:blip>
+          <a:stretch>
+            <a:fillRect/>
+          </a:stretch>
+        </p:blipFill>
+        <p:spPr>
+          <a:xfrm>
+            <a:off x="1596000" y="1854000"/>
+            <a:ext cx="2079000" cy="2079000"/>
+          </a:xfrm>
+          <a:prstGeom prst="rect">
+            <a:avLst/>
+          </a:prstGeom>
+        </p:spPr>
+      </p:pic>
+    </p:spTree>
+    <p:extLst>
+      <p:ext uri="{BB962C8B-B14F-4D97-AF65-F5344CB8AC3E}">
+        <p14:creationId xmlns:p14="http://schemas.microsoft.com/office/powerpoint/2010/main" val="2728390521"/>
+      </p:ext>
+    </p:extLst>
+  </p:cSld>
+  <p:clrMapOvr>
+    <a:masterClrMapping/>
+  </p:clrMapOvr>
+  <mc:AlternateContent xmlns:mc="http://schemas.openxmlformats.org/markup-compatibility/2006" xmlns:p14="http://schemas.microsoft.com/office/powerpoint/2010/main">
+    <mc:Choice Requires="p14">
+      <p:transition spd="slow" p14:dur="2000" advClick="0" advTm="5000"/>
+    </mc:Choice>
+    <mc:Fallback xmlns="">
+      <p:transition spd="slow" advClick="0" advTm="5000"/>
+    </mc:Fallback>
+  </mc:AlternateContent>
+  <p:timing>
+    <p:tnLst>
+      <p:par>
+        <p:cTn id="1" dur="indefinite" restart="never" nodeType="tmRoot">
+          <p:childTnLst>
+            <p:seq concurrent="1" nextAc="seek">
+              <p:cTn id="2" dur="indefinite" nodeType="mainSeq">
+                <p:childTnLst>
+                  <p:par>
+                    <p:cTn id="3" fill="hold">
+                      <p:stCondLst>
+                        <p:cond delay="indefinite"/>
+                        <p:cond evt="onBegin" delay="0">
+                          <p:tn val="2"/>
+                        </p:cond>
+                      </p:stCondLst>
+                      <p:childTnLst>
+                        <p:par>
+                          <p:cTn id="4" fill="hold">
+                            <p:stCondLst>
+                              <p:cond delay="0"/>
+                            </p:stCondLst>
+                            <p:childTnLst>
+                              <p:par>
+                                <p:cTn id="5" presetID="1" presetClass="entr" presetSubtype="0" fill="hold" nodeType="withEffect">
+                                  <p:stCondLst>
+                                    <p:cond delay="0"/>
+                                  </p:stCondLst>
+                                  <p:childTnLst>
+                                    <p:set>
+                                      <p:cBhvr>
+                                        <p:cTn id="6" dur="1" fill="hold">
+                                          <p:stCondLst>
+                                            <p:cond delay="0"/>
+                                          </p:stCondLst>
+                                        </p:cTn>
+                                        <p:tgtEl>
+                                          <p:spTgt spid="8"/>
+                                        </p:tgtEl>
+                                        <p:attrNameLst>
+                                          <p:attrName>style.visibility</p:attrName>
+                                        </p:attrNameLst>
+                                      </p:cBhvr>
+                                      <p:to>
+                                        <p:strVal val="visible"/>
+                                      </p:to>
+                                    </p:set>
+                                  </p:childTnLst>
+                                </p:cTn>
+                              </p:par>
+                            </p:childTnLst>
+                          </p:cTn>
+                        </p:par>
+                      </p:childTnLst>
+                    </p:cTn>
+                  </p:par>
+                </p:childTnLst>
+              </p:cTn>
+              <p:prevCondLst>
+                <p:cond evt="onPrev" delay="0">
+                  <p:tgtEl>
+                    <p:sldTgt/>
+                  </p:tgtEl>
+                </p:cond>
+              </p:prevCondLst>
+              <p:nextCondLst>
+                <p:cond evt="onNext" delay="0">
+                  <p:tgtEl>
+                    <p:sldTgt/>
+                  </p:tgtEl>
+                </p:cond>
+              </p:nextCondLst>
+            </p:seq>
+          </p:childTnLst>
+        </p:cTn>
+      </p:par>
+    </p:tnLst>
+  </p:timing>
+</p:sld>
+</file>
+
+<file path=ppt/slides/slide13.xml><?xml version="1.0" encoding="utf-8"?>
+<p:sld xmlns:a="http://schemas.openxmlformats.org/drawingml/2006/main" xmlns:r="http://schemas.openxmlformats.org/officeDocument/2006/relationships" xmlns:p="http://schemas.openxmlformats.org/presentationml/2006/main">
+  <p:cSld>
+    <p:spTree>
+      <p:nvGrpSpPr>
+        <p:cNvPr id="1" name=""/>
+        <p:cNvGrpSpPr/>
+        <p:nvPr/>
+      </p:nvGrpSpPr>
+      <p:grpSpPr>
+        <a:xfrm>
+          <a:off x="0" y="0"/>
+          <a:ext cx="0" cy="0"/>
+          <a:chOff x="0" y="0"/>
+          <a:chExt cx="0" cy="0"/>
+        </a:xfrm>
+      </p:grpSpPr>
+      <p:sp>
+        <p:nvSpPr>
           <p:cNvPr id="2" name="Slide Number Placeholder 1"/>
           <p:cNvSpPr>
             <a:spLocks noGrp="1"/>
@@ -8471,7 +8725,7 @@
             <a:fld id="{2BF067CD-8E6B-4360-9AA8-C5DF2A48A6D1}" type="slidenum">
               <a:rPr lang="en-US" noProof="0" smtClean="0"/>
               <a:pPr/>
-              <a:t>12</a:t>
+              <a:t>13</a:t>
             </a:fld>
             <a:endParaRPr lang="en-US" noProof="0" dirty="0"/>
           </a:p>
@@ -8596,7 +8850,7 @@
           <a:p>
             <a:pPr algn="ctr"/>
             <a:r>
-              <a:rPr lang="bg-BG" sz="2800" b="1" dirty="0" smtClean="0">
+              <a:rPr lang="bg-BG" sz="2800" b="1" dirty="0">
                 <a:solidFill>
                   <a:srgbClr val="FFFFFF"/>
                 </a:solidFill>
@@ -8611,7 +8865,7 @@
               <a:t>Това са всички аудио файлове, които се намират в папката </a:t>
             </a:r>
             <a:r>
-              <a:rPr lang="en-US" sz="2800" b="1" dirty="0" smtClean="0">
+              <a:rPr lang="en-US" sz="2800" b="1" dirty="0">
                 <a:solidFill>
                   <a:schemeClr val="bg1">
                     <a:lumMod val="60000"/>
@@ -8628,21 +8882,6 @@
               </a:rPr>
               <a:t>Music</a:t>
             </a:r>
-            <a:endParaRPr lang="en-US" sz="2800" b="1" dirty="0">
-              <a:solidFill>
-                <a:schemeClr val="bg1">
-                  <a:lumMod val="60000"/>
-                  <a:lumOff val="40000"/>
-                </a:schemeClr>
-              </a:solidFill>
-              <a:effectLst>
-                <a:outerShdw blurRad="38100" dist="38100" dir="2700000" algn="tl">
-                  <a:srgbClr val="000000">
-                    <a:alpha val="43137"/>
-                  </a:srgbClr>
-                </a:outerShdw>
-              </a:effectLst>
-            </a:endParaRPr>
           </a:p>
         </p:txBody>
       </p:sp>
@@ -8654,13 +8893,13 @@
         </p:nvSpPr>
         <p:spPr bwMode="auto">
           <a:xfrm>
-            <a:off x="3486000" y="4690504"/>
-            <a:ext cx="1980000" cy="898495"/>
+            <a:off x="3486000" y="4539236"/>
+            <a:ext cx="1980000" cy="1049763"/>
           </a:xfrm>
           <a:prstGeom prst="wedgeRoundRectCallout">
             <a:avLst>
-              <a:gd name="adj1" fmla="val 63496"/>
-              <a:gd name="adj2" fmla="val 112904"/>
+              <a:gd name="adj1" fmla="val 64622"/>
+              <a:gd name="adj2" fmla="val 106530"/>
               <a:gd name="adj3" fmla="val 16667"/>
             </a:avLst>
           </a:prstGeom>
@@ -8706,7 +8945,7 @@
           <a:p>
             <a:pPr algn="ctr"/>
             <a:r>
-              <a:rPr lang="bg-BG" sz="2800" b="1" dirty="0" smtClean="0">
+              <a:rPr lang="bg-BG" sz="2800" b="1" dirty="0">
                 <a:solidFill>
                   <a:srgbClr val="FFFFFF"/>
                 </a:solidFill>
@@ -8746,8 +8985,8 @@
         </p:nvSpPr>
         <p:spPr bwMode="auto">
           <a:xfrm>
-            <a:off x="5556000" y="4464000"/>
-            <a:ext cx="2007600" cy="881096"/>
+            <a:off x="5556000" y="4379662"/>
+            <a:ext cx="2007600" cy="965434"/>
           </a:xfrm>
           <a:prstGeom prst="wedgeRoundRectCallout">
             <a:avLst>
@@ -8798,7 +9037,7 @@
           <a:p>
             <a:pPr algn="ctr"/>
             <a:r>
-              <a:rPr lang="bg-BG" sz="2800" b="1" dirty="0" smtClean="0">
+              <a:rPr lang="bg-BG" sz="2800" b="1" dirty="0">
                 <a:solidFill>
                   <a:srgbClr val="FFFFFF"/>
                 </a:solidFill>
@@ -8838,13 +9077,13 @@
         </p:nvSpPr>
         <p:spPr bwMode="auto">
           <a:xfrm>
-            <a:off x="7675377" y="4741166"/>
-            <a:ext cx="2007600" cy="881096"/>
+            <a:off x="7675377" y="4572499"/>
+            <a:ext cx="2007600" cy="1049763"/>
           </a:xfrm>
           <a:prstGeom prst="wedgeRoundRectCallout">
             <a:avLst>
-              <a:gd name="adj1" fmla="val -110002"/>
-              <a:gd name="adj2" fmla="val 108663"/>
+              <a:gd name="adj1" fmla="val -113890"/>
+              <a:gd name="adj2" fmla="val 96978"/>
               <a:gd name="adj3" fmla="val 16667"/>
             </a:avLst>
           </a:prstGeom>
@@ -8890,7 +9129,7 @@
           <a:p>
             <a:pPr algn="ctr"/>
             <a:r>
-              <a:rPr lang="bg-BG" sz="2800" b="1" dirty="0" smtClean="0">
+              <a:rPr lang="bg-BG" sz="2800" b="1" dirty="0">
                 <a:solidFill>
                   <a:srgbClr val="FFFFFF"/>
                 </a:solidFill>
@@ -8982,7 +9221,7 @@
           <a:p>
             <a:pPr algn="ctr"/>
             <a:r>
-              <a:rPr lang="bg-BG" sz="2800" b="1" dirty="0" smtClean="0">
+              <a:rPr lang="bg-BG" sz="2800" b="1" dirty="0">
                 <a:solidFill>
                   <a:srgbClr val="FFFFFF"/>
                 </a:solidFill>
@@ -9297,7 +9536,7 @@
 </p:sld>
 </file>
 
-<file path=ppt/slides/slide13.xml><?xml version="1.0" encoding="utf-8"?>
+<file path=ppt/slides/slide14.xml><?xml version="1.0" encoding="utf-8"?>
 <p:sld xmlns:a="http://schemas.openxmlformats.org/drawingml/2006/main" xmlns:r="http://schemas.openxmlformats.org/officeDocument/2006/relationships" xmlns:p="http://schemas.openxmlformats.org/presentationml/2006/main">
   <p:cSld>
     <p:spTree>
@@ -9332,7 +9571,7 @@
             <a:fld id="{2BF067CD-8E6B-4360-9AA8-C5DF2A48A6D1}" type="slidenum">
               <a:rPr lang="en-US" noProof="0" smtClean="0"/>
               <a:pPr/>
-              <a:t>13</a:t>
+              <a:t>14</a:t>
             </a:fld>
             <a:endParaRPr lang="en-US" noProof="0" dirty="0"/>
           </a:p>
@@ -9354,11 +9593,11 @@
           <a:lstStyle/>
           <a:p>
             <a:r>
-              <a:rPr lang="bg-BG" dirty="0" smtClean="0"/>
+              <a:rPr lang="bg-BG" dirty="0"/>
               <a:t>Отворете файла </a:t>
             </a:r>
             <a:r>
-              <a:rPr lang="en-US" b="1" dirty="0" smtClean="0">
+              <a:rPr lang="en-US" b="1" dirty="0">
                 <a:solidFill>
                   <a:schemeClr val="bg1"/>
                 </a:solidFill>
@@ -9366,7 +9605,7 @@
               <a:t>Norwegian_Wood.mp3</a:t>
             </a:r>
             <a:r>
-              <a:rPr lang="bg-BG" b="1" dirty="0" smtClean="0">
+              <a:rPr lang="bg-BG" b="1" dirty="0">
                 <a:solidFill>
                   <a:schemeClr val="bg1"/>
                 </a:solidFill>
@@ -9374,27 +9613,23 @@
               <a:t> </a:t>
             </a:r>
             <a:r>
-              <a:rPr lang="bg-BG" dirty="0" smtClean="0"/>
+              <a:rPr lang="bg-BG" dirty="0"/>
               <a:t>и изслушайте песента</a:t>
             </a:r>
             <a:r>
-              <a:rPr lang="en-US" dirty="0" smtClean="0"/>
+              <a:rPr lang="en-US" dirty="0"/>
               <a:t>.</a:t>
             </a:r>
             <a:r>
               <a:rPr lang="bg-BG" dirty="0"/>
+              <a:t> Споделете дали я харесвате.</a:t>
+            </a:r>
+            <a:r>
+              <a:rPr lang="en-US" dirty="0"/>
               <a:t> </a:t>
             </a:r>
             <a:r>
-              <a:rPr lang="bg-BG" dirty="0" smtClean="0"/>
-              <a:t>Споделете дали я харесвате.</a:t>
-            </a:r>
-            <a:r>
-              <a:rPr lang="en-US" dirty="0" smtClean="0"/>
-              <a:t> </a:t>
-            </a:r>
-            <a:r>
-              <a:rPr lang="bg-BG" dirty="0" smtClean="0"/>
+              <a:rPr lang="bg-BG" dirty="0"/>
               <a:t>Чували ли сте песента и преди?</a:t>
             </a:r>
             <a:endParaRPr lang="en-US" b="1" dirty="0">
@@ -9421,7 +9656,7 @@
           <a:lstStyle/>
           <a:p>
             <a:r>
-              <a:rPr lang="bg-BG" dirty="0" smtClean="0"/>
+              <a:rPr lang="bg-BG" dirty="0"/>
               <a:t>Задача: Слушане на музика</a:t>
             </a:r>
             <a:endParaRPr lang="en-US" dirty="0"/>
@@ -9483,17 +9718,185 @@
       <p:transition spd="slow" advClick="0" advTm="5000"/>
     </mc:Fallback>
   </mc:AlternateContent>
-  <p:timing>
-    <p:tnLst>
-      <p:par>
-        <p:cTn id="1" dur="indefinite" restart="never" nodeType="tmRoot"/>
-      </p:par>
-    </p:tnLst>
-  </p:timing>
 </p:sld>
 </file>
 
-<file path=ppt/slides/slide14.xml><?xml version="1.0" encoding="utf-8"?>
+<file path=ppt/slides/slide15.xml><?xml version="1.0" encoding="utf-8"?>
+<p:sld xmlns:a="http://schemas.openxmlformats.org/drawingml/2006/main" xmlns:r="http://schemas.openxmlformats.org/officeDocument/2006/relationships" xmlns:p="http://schemas.openxmlformats.org/presentationml/2006/main">
+  <p:cSld>
+    <p:spTree>
+      <p:nvGrpSpPr>
+        <p:cNvPr id="1" name=""/>
+        <p:cNvGrpSpPr/>
+        <p:nvPr/>
+      </p:nvGrpSpPr>
+      <p:grpSpPr>
+        <a:xfrm>
+          <a:off x="0" y="0"/>
+          <a:ext cx="0" cy="0"/>
+          <a:chOff x="0" y="0"/>
+          <a:chExt cx="0" cy="0"/>
+        </a:xfrm>
+      </p:grpSpPr>
+      <p:sp>
+        <p:nvSpPr>
+          <p:cNvPr id="6" name="Subtitle 5">
+            <a:extLst>
+              <a:ext uri="{FF2B5EF4-FFF2-40B4-BE49-F238E27FC236}">
+                <a16:creationId xmlns:a16="http://schemas.microsoft.com/office/drawing/2014/main" id="{19307869-ED62-AC23-DDA5-9AFC77E565B7}"/>
+              </a:ext>
+            </a:extLst>
+          </p:cNvPr>
+          <p:cNvSpPr>
+            <a:spLocks noGrp="1"/>
+          </p:cNvSpPr>
+          <p:nvPr>
+            <p:ph type="subTitle" sz="quarter" idx="11"/>
+          </p:nvPr>
+        </p:nvSpPr>
+        <p:spPr/>
+        <p:txBody>
+          <a:bodyPr/>
+          <a:lstStyle/>
+          <a:p>
+            <a:r>
+              <a:rPr lang="en-US" dirty="0"/>
+              <a:t>Video player</a:t>
+            </a:r>
+            <a:endParaRPr lang="bg-BG" dirty="0"/>
+          </a:p>
+        </p:txBody>
+      </p:sp>
+      <p:sp>
+        <p:nvSpPr>
+          <p:cNvPr id="5" name="Title 4">
+            <a:extLst>
+              <a:ext uri="{FF2B5EF4-FFF2-40B4-BE49-F238E27FC236}">
+                <a16:creationId xmlns:a16="http://schemas.microsoft.com/office/drawing/2014/main" id="{6B8DC037-2280-A382-6448-78ACA93DDA08}"/>
+              </a:ext>
+            </a:extLst>
+          </p:cNvPr>
+          <p:cNvSpPr>
+            <a:spLocks noGrp="1"/>
+          </p:cNvSpPr>
+          <p:nvPr>
+            <p:ph type="title" sz="quarter" idx="10"/>
+          </p:nvPr>
+        </p:nvSpPr>
+        <p:spPr>
+          <a:xfrm>
+            <a:off x="5241000" y="1786047"/>
+            <a:ext cx="6065892" cy="1462953"/>
+          </a:xfrm>
+        </p:spPr>
+        <p:txBody>
+          <a:bodyPr/>
+          <a:lstStyle/>
+          <a:p>
+            <a:r>
+              <a:rPr lang="en-US" sz="6000" b="1" dirty="0"/>
+              <a:t>Movies &amp; TV</a:t>
+            </a:r>
+            <a:endParaRPr lang="bg-BG" sz="6000" dirty="0"/>
+          </a:p>
+        </p:txBody>
+      </p:sp>
+      <p:sp>
+        <p:nvSpPr>
+          <p:cNvPr id="2" name="Slide Number Placeholder 1">
+            <a:extLst>
+              <a:ext uri="{FF2B5EF4-FFF2-40B4-BE49-F238E27FC236}">
+                <a16:creationId xmlns:a16="http://schemas.microsoft.com/office/drawing/2014/main" id="{1583C823-3714-C5CF-ED69-AE14E8AA150C}"/>
+              </a:ext>
+            </a:extLst>
+          </p:cNvPr>
+          <p:cNvSpPr>
+            <a:spLocks noGrp="1"/>
+          </p:cNvSpPr>
+          <p:nvPr>
+            <p:ph type="sldNum" sz="quarter" idx="4294967295"/>
+          </p:nvPr>
+        </p:nvSpPr>
+        <p:spPr>
+          <a:xfrm>
+            <a:off x="11823700" y="6507163"/>
+            <a:ext cx="368300" cy="296862"/>
+          </a:xfrm>
+          <a:prstGeom prst="rect">
+            <a:avLst/>
+          </a:prstGeom>
+        </p:spPr>
+        <p:txBody>
+          <a:bodyPr/>
+          <a:lstStyle/>
+          <a:p>
+            <a:fld id="{2BF067CD-8E6B-4360-9AA8-C5DF2A48A6D1}" type="slidenum">
+              <a:rPr lang="en-US" noProof="0" smtClean="0"/>
+              <a:pPr/>
+              <a:t>15</a:t>
+            </a:fld>
+            <a:endParaRPr lang="en-US" noProof="0" dirty="0"/>
+          </a:p>
+        </p:txBody>
+      </p:sp>
+      <p:pic>
+        <p:nvPicPr>
+          <p:cNvPr id="3" name="Picture 2">
+            <a:extLst>
+              <a:ext uri="{FF2B5EF4-FFF2-40B4-BE49-F238E27FC236}">
+                <a16:creationId xmlns:a16="http://schemas.microsoft.com/office/drawing/2014/main" id="{85155A85-DC86-52B5-4D76-D9E9618F089D}"/>
+              </a:ext>
+            </a:extLst>
+          </p:cNvPr>
+          <p:cNvPicPr>
+            <a:picLocks noChangeAspect="1"/>
+          </p:cNvPicPr>
+          <p:nvPr/>
+        </p:nvPicPr>
+        <p:blipFill>
+          <a:blip r:embed="rId2">
+            <a:extLst>
+              <a:ext uri="{28A0092B-C50C-407E-A947-70E740481C1C}">
+                <a14:useLocalDpi xmlns:a14="http://schemas.microsoft.com/office/drawing/2010/main" val="0"/>
+              </a:ext>
+            </a:extLst>
+          </a:blip>
+          <a:stretch>
+            <a:fillRect/>
+          </a:stretch>
+        </p:blipFill>
+        <p:spPr>
+          <a:xfrm>
+            <a:off x="1596000" y="1801193"/>
+            <a:ext cx="2115000" cy="2076545"/>
+          </a:xfrm>
+          <a:prstGeom prst="rect">
+            <a:avLst/>
+          </a:prstGeom>
+        </p:spPr>
+      </p:pic>
+    </p:spTree>
+    <p:extLst>
+      <p:ext uri="{BB962C8B-B14F-4D97-AF65-F5344CB8AC3E}">
+        <p14:creationId xmlns:p14="http://schemas.microsoft.com/office/powerpoint/2010/main" val="181792884"/>
+      </p:ext>
+    </p:extLst>
+  </p:cSld>
+  <p:clrMapOvr>
+    <a:masterClrMapping/>
+  </p:clrMapOvr>
+  <mc:AlternateContent xmlns:mc="http://schemas.openxmlformats.org/markup-compatibility/2006" xmlns:p14="http://schemas.microsoft.com/office/powerpoint/2010/main">
+    <mc:Choice Requires="p14">
+      <p:transition spd="slow" p14:dur="2000" advClick="0" advTm="5000"/>
+    </mc:Choice>
+    <mc:Fallback xmlns="">
+      <p:transition spd="slow" advClick="0" advTm="5000"/>
+    </mc:Fallback>
+  </mc:AlternateContent>
+</p:sld>
+</file>
+
+<file path=ppt/slides/slide16.xml><?xml version="1.0" encoding="utf-8"?>
 <p:sld xmlns:a="http://schemas.openxmlformats.org/drawingml/2006/main" xmlns:r="http://schemas.openxmlformats.org/officeDocument/2006/relationships" xmlns:p="http://schemas.openxmlformats.org/presentationml/2006/main">
   <p:cSld>
     <p:spTree>
@@ -9528,7 +9931,7 @@
             <a:fld id="{2BF067CD-8E6B-4360-9AA8-C5DF2A48A6D1}" type="slidenum">
               <a:rPr lang="en-US" noProof="0" smtClean="0"/>
               <a:pPr/>
-              <a:t>14</a:t>
+              <a:t>16</a:t>
             </a:fld>
             <a:endParaRPr lang="en-US" noProof="0" dirty="0"/>
           </a:p>
@@ -9550,10 +9953,9 @@
           <a:lstStyle/>
           <a:p>
             <a:r>
-              <a:rPr lang="en-US" dirty="0" smtClean="0"/>
+              <a:rPr lang="en-US" dirty="0"/>
               <a:t>Movies &amp; TV</a:t>
             </a:r>
-            <a:endParaRPr lang="en-US" dirty="0"/>
           </a:p>
         </p:txBody>
       </p:sp>
@@ -9654,7 +10056,7 @@
           <a:p>
             <a:pPr algn="ctr"/>
             <a:r>
-              <a:rPr lang="bg-BG" sz="2800" b="1" dirty="0" smtClean="0">
+              <a:rPr lang="bg-BG" sz="2800" b="1" dirty="0">
                 <a:solidFill>
                   <a:srgbClr val="FFFFFF"/>
                 </a:solidFill>
@@ -9669,7 +10071,7 @@
               <a:t>Тук се визуализират всички видео файлове в папката </a:t>
             </a:r>
             <a:r>
-              <a:rPr lang="en-US" sz="2800" b="1" dirty="0" smtClean="0">
+              <a:rPr lang="en-US" sz="2800" b="1" dirty="0">
                 <a:solidFill>
                   <a:srgbClr val="FFFFFF"/>
                 </a:solidFill>
@@ -9683,18 +10085,6 @@
               </a:rPr>
               <a:t>Videos</a:t>
             </a:r>
-            <a:endParaRPr lang="en-US" sz="2800" b="1" dirty="0">
-              <a:solidFill>
-                <a:srgbClr val="FFFFFF"/>
-              </a:solidFill>
-              <a:effectLst>
-                <a:outerShdw blurRad="38100" dist="38100" dir="2700000" algn="tl">
-                  <a:srgbClr val="000000">
-                    <a:alpha val="43137"/>
-                  </a:srgbClr>
-                </a:outerShdw>
-              </a:effectLst>
-            </a:endParaRPr>
           </a:p>
         </p:txBody>
       </p:sp>
@@ -9797,7 +10187,7 @@
 </p:sld>
 </file>
 
-<file path=ppt/slides/slide15.xml><?xml version="1.0" encoding="utf-8"?>
+<file path=ppt/slides/slide17.xml><?xml version="1.0" encoding="utf-8"?>
 <p:sld xmlns:a="http://schemas.openxmlformats.org/drawingml/2006/main" xmlns:r="http://schemas.openxmlformats.org/officeDocument/2006/relationships" xmlns:p="http://schemas.openxmlformats.org/presentationml/2006/main">
   <p:cSld>
     <p:spTree>
@@ -9832,7 +10222,7 @@
             <a:fld id="{2BF067CD-8E6B-4360-9AA8-C5DF2A48A6D1}" type="slidenum">
               <a:rPr lang="en-US" noProof="0" smtClean="0"/>
               <a:pPr/>
-              <a:t>15</a:t>
+              <a:t>17</a:t>
             </a:fld>
             <a:endParaRPr lang="en-US" noProof="0" dirty="0"/>
           </a:p>
@@ -9854,10 +10244,9 @@
           <a:lstStyle/>
           <a:p>
             <a:r>
-              <a:rPr lang="en-US" dirty="0" smtClean="0"/>
+              <a:rPr lang="en-US" dirty="0"/>
               <a:t>Movies &amp; TV</a:t>
             </a:r>
-            <a:endParaRPr lang="en-US" dirty="0"/>
           </a:p>
         </p:txBody>
       </p:sp>
@@ -9958,7 +10347,7 @@
           <a:p>
             <a:pPr algn="ctr"/>
             <a:r>
-              <a:rPr lang="bg-BG" sz="2800" b="1" dirty="0" smtClean="0">
+              <a:rPr lang="bg-BG" sz="2800" b="1" dirty="0">
                 <a:solidFill>
                   <a:srgbClr val="FFFFFF"/>
                 </a:solidFill>
@@ -10307,7 +10696,7 @@
           <a:p>
             <a:pPr algn="ctr"/>
             <a:r>
-              <a:rPr lang="bg-BG" sz="2800" b="1" dirty="0" smtClean="0">
+              <a:rPr lang="bg-BG" sz="2800" b="1" dirty="0">
                 <a:solidFill>
                   <a:srgbClr val="FFFFFF"/>
                 </a:solidFill>
@@ -10396,7 +10785,7 @@
           <a:p>
             <a:pPr algn="ctr"/>
             <a:r>
-              <a:rPr lang="bg-BG" sz="2800" b="1" dirty="0" smtClean="0">
+              <a:rPr lang="bg-BG" sz="2800" b="1" dirty="0">
                 <a:solidFill>
                   <a:srgbClr val="FFFFFF"/>
                 </a:solidFill>
@@ -10485,21 +10874,6 @@
           <a:p>
             <a:pPr algn="ctr"/>
             <a:r>
-              <a:rPr lang="bg-BG" sz="2800" b="1" dirty="0" smtClean="0">
-                <a:solidFill>
-                  <a:srgbClr val="FFFFFF"/>
-                </a:solidFill>
-                <a:effectLst>
-                  <a:outerShdw blurRad="38100" dist="38100" dir="2700000" algn="tl">
-                    <a:srgbClr val="000000">
-                      <a:alpha val="43137"/>
-                    </a:srgbClr>
-                  </a:outerShdw>
-                </a:effectLst>
-              </a:rPr>
-              <a:t>Превъртане </a:t>
-            </a:r>
-            <a:r>
               <a:rPr lang="bg-BG" sz="2800" b="1" dirty="0">
                 <a:solidFill>
                   <a:srgbClr val="FFFFFF"/>
@@ -10512,22 +10886,7 @@
                   </a:outerShdw>
                 </a:effectLst>
               </a:rPr>
-              <a:t>на записа напред </a:t>
-            </a:r>
-            <a:r>
-              <a:rPr lang="bg-BG" sz="2800" b="1" dirty="0" smtClean="0">
-                <a:solidFill>
-                  <a:srgbClr val="FFFFFF"/>
-                </a:solidFill>
-                <a:effectLst>
-                  <a:outerShdw blurRad="38100" dist="38100" dir="2700000" algn="tl">
-                    <a:srgbClr val="000000">
-                      <a:alpha val="43137"/>
-                    </a:srgbClr>
-                  </a:outerShdw>
-                </a:effectLst>
-              </a:rPr>
-              <a:t>с 30 сек. </a:t>
+              <a:t>Превъртане на записа напред с 30 сек. </a:t>
             </a:r>
             <a:endParaRPr lang="en-US" sz="2800" b="1" dirty="0">
               <a:solidFill>
@@ -10965,7 +11324,7 @@
 </p:sld>
 </file>
 
-<file path=ppt/slides/slide16.xml><?xml version="1.0" encoding="utf-8"?>
+<file path=ppt/slides/slide18.xml><?xml version="1.0" encoding="utf-8"?>
 <p:sld xmlns:a="http://schemas.openxmlformats.org/drawingml/2006/main" xmlns:r="http://schemas.openxmlformats.org/officeDocument/2006/relationships" xmlns:p="http://schemas.openxmlformats.org/presentationml/2006/main">
   <p:cSld>
     <p:spTree>
@@ -11000,7 +11359,7 @@
             <a:fld id="{2BF067CD-8E6B-4360-9AA8-C5DF2A48A6D1}" type="slidenum">
               <a:rPr lang="en-US" noProof="0" smtClean="0"/>
               <a:pPr/>
-              <a:t>16</a:t>
+              <a:t>18</a:t>
             </a:fld>
             <a:endParaRPr lang="en-US" noProof="0" dirty="0"/>
           </a:p>
@@ -11026,7 +11385,7 @@
               <a:t>Отворете файла </a:t>
             </a:r>
             <a:r>
-              <a:rPr lang="bg-BG" b="1" dirty="0" smtClean="0">
+              <a:rPr lang="bg-BG" b="1" dirty="0">
                 <a:solidFill>
                   <a:schemeClr val="bg1"/>
                 </a:solidFill>
@@ -11034,7 +11393,7 @@
               <a:t>Шипченската_епопея.</a:t>
             </a:r>
             <a:r>
-              <a:rPr lang="en-US" b="1" dirty="0" smtClean="0">
+              <a:rPr lang="en-US" b="1" dirty="0">
                 <a:solidFill>
                   <a:schemeClr val="bg1"/>
                 </a:solidFill>
@@ -11042,11 +11401,11 @@
               <a:t>mp4 </a:t>
             </a:r>
             <a:r>
-              <a:rPr lang="bg-BG" dirty="0" smtClean="0"/>
+              <a:rPr lang="bg-BG" dirty="0"/>
               <a:t>и изгледайте видеото на </a:t>
             </a:r>
             <a:r>
-              <a:rPr lang="bg-BG" b="1" dirty="0" smtClean="0">
+              <a:rPr lang="bg-BG" b="1" dirty="0">
                 <a:solidFill>
                   <a:schemeClr val="bg1"/>
                 </a:solidFill>
@@ -11054,7 +11413,7 @@
               <a:t>Българска история</a:t>
             </a:r>
             <a:r>
-              <a:rPr lang="bg-BG" dirty="0" smtClean="0"/>
+              <a:rPr lang="bg-BG" dirty="0"/>
               <a:t>. </a:t>
             </a:r>
             <a:endParaRPr lang="en-US" dirty="0">
@@ -11081,7 +11440,7 @@
           <a:lstStyle/>
           <a:p>
             <a:r>
-              <a:rPr lang="bg-BG" dirty="0" smtClean="0"/>
+              <a:rPr lang="bg-BG" dirty="0"/>
               <a:t>Задача: Гледане на видео</a:t>
             </a:r>
             <a:endParaRPr lang="en-US" dirty="0"/>
@@ -11143,17 +11502,10 @@
       <p:transition spd="slow" advClick="0" advTm="5000"/>
     </mc:Fallback>
   </mc:AlternateContent>
-  <p:timing>
-    <p:tnLst>
-      <p:par>
-        <p:cTn id="1" dur="indefinite" restart="never" nodeType="tmRoot"/>
-      </p:par>
-    </p:tnLst>
-  </p:timing>
 </p:sld>
 </file>
 
-<file path=ppt/slides/slide17.xml><?xml version="1.0" encoding="utf-8"?>
+<file path=ppt/slides/slide19.xml><?xml version="1.0" encoding="utf-8"?>
 <p:sld xmlns:a="http://schemas.openxmlformats.org/drawingml/2006/main" xmlns:r="http://schemas.openxmlformats.org/officeDocument/2006/relationships" xmlns:p="http://schemas.openxmlformats.org/presentationml/2006/main">
   <p:cSld>
     <p:spTree>
@@ -11415,7 +11767,7 @@
             <a:fld id="{C014DD1E-5D91-48A3-AD6D-45FBA980D106}" type="slidenum">
               <a:rPr lang="en-US" smtClean="0"/>
               <a:pPr/>
-              <a:t>17</a:t>
+              <a:t>19</a:t>
             </a:fld>
             <a:endParaRPr lang="en-US" dirty="0"/>
           </a:p>
@@ -11812,6 +12164,144 @@
             </a:lvl9pPr>
           </a:lstStyle>
           <a:p>
+            <a:pPr marL="432000">
+              <a:spcAft>
+                <a:spcPts val="1200"/>
+              </a:spcAft>
+              <a:buClr>
+                <a:schemeClr val="bg2"/>
+              </a:buClr>
+            </a:pPr>
+            <a:r>
+              <a:rPr lang="bg-BG" sz="2800" b="1" dirty="0">
+                <a:solidFill>
+                  <a:schemeClr val="bg1">
+                    <a:lumMod val="60000"/>
+                    <a:lumOff val="40000"/>
+                  </a:schemeClr>
+                </a:solidFill>
+              </a:rPr>
+              <a:t>Звукова карта </a:t>
+            </a:r>
+            <a:r>
+              <a:rPr lang="bg-BG" sz="2800" dirty="0">
+                <a:solidFill>
+                  <a:schemeClr val="bg2"/>
+                </a:solidFill>
+              </a:rPr>
+              <a:t>– част от компютърната система, която </a:t>
+            </a:r>
+            <a:r>
+              <a:rPr lang="bg-BG" sz="2800" b="1" dirty="0">
+                <a:solidFill>
+                  <a:schemeClr val="bg2"/>
+                </a:solidFill>
+              </a:rPr>
+              <a:t>създава</a:t>
+            </a:r>
+            <a:r>
+              <a:rPr lang="bg-BG" sz="2800" dirty="0">
+                <a:solidFill>
+                  <a:schemeClr val="bg2"/>
+                </a:solidFill>
+              </a:rPr>
+              <a:t>, </a:t>
+            </a:r>
+            <a:r>
+              <a:rPr lang="bg-BG" sz="2800" b="1" dirty="0">
+                <a:solidFill>
+                  <a:schemeClr val="bg2"/>
+                </a:solidFill>
+              </a:rPr>
+              <a:t>обработва</a:t>
+            </a:r>
+            <a:r>
+              <a:rPr lang="bg-BG" sz="2800" dirty="0">
+                <a:solidFill>
+                  <a:schemeClr val="bg2"/>
+                </a:solidFill>
+              </a:rPr>
+              <a:t> и </a:t>
+            </a:r>
+            <a:r>
+              <a:rPr lang="bg-BG" sz="2800" b="1" dirty="0">
+                <a:solidFill>
+                  <a:schemeClr val="bg2"/>
+                </a:solidFill>
+              </a:rPr>
+              <a:t>записва звук</a:t>
+            </a:r>
+          </a:p>
+          <a:p>
+            <a:pPr marL="450000">
+              <a:spcAft>
+                <a:spcPts val="1200"/>
+              </a:spcAft>
+              <a:buClr>
+                <a:schemeClr val="bg2"/>
+              </a:buClr>
+            </a:pPr>
+            <a:r>
+              <a:rPr lang="bg-BG" sz="2800" b="1" dirty="0">
+                <a:solidFill>
+                  <a:schemeClr val="bg1">
+                    <a:lumMod val="60000"/>
+                    <a:lumOff val="40000"/>
+                  </a:schemeClr>
+                </a:solidFill>
+              </a:rPr>
+              <a:t>Видеокарта</a:t>
+            </a:r>
+            <a:r>
+              <a:rPr lang="bg-BG" sz="2800" dirty="0">
+                <a:solidFill>
+                  <a:schemeClr val="bg2"/>
+                </a:solidFill>
+              </a:rPr>
+              <a:t> – част от компютърната система, чрез която се </a:t>
+            </a:r>
+            <a:r>
+              <a:rPr lang="bg-BG" sz="2800" b="1" dirty="0">
+                <a:solidFill>
+                  <a:schemeClr val="bg2"/>
+                </a:solidFill>
+              </a:rPr>
+              <a:t>получава  </a:t>
+            </a:r>
+            <a:r>
+              <a:rPr lang="bg-BG" sz="2800" dirty="0">
+                <a:solidFill>
+                  <a:schemeClr val="bg2"/>
+                </a:solidFill>
+              </a:rPr>
+              <a:t>и </a:t>
+            </a:r>
+            <a:r>
+              <a:rPr lang="bg-BG" sz="2800" b="1" dirty="0">
+                <a:solidFill>
+                  <a:schemeClr val="bg2"/>
+                </a:solidFill>
+              </a:rPr>
+              <a:t>възпроизвежда</a:t>
+            </a:r>
+            <a:r>
+              <a:rPr lang="bg-BG" sz="2800" dirty="0">
+                <a:solidFill>
+                  <a:schemeClr val="bg2"/>
+                </a:solidFill>
+              </a:rPr>
+              <a:t> </a:t>
+            </a:r>
+            <a:r>
+              <a:rPr lang="bg-BG" sz="2800" b="1" dirty="0">
+                <a:solidFill>
+                  <a:schemeClr val="bg2"/>
+                </a:solidFill>
+              </a:rPr>
+              <a:t>видеоизображение</a:t>
+            </a:r>
+          </a:p>
+          <a:p>
             <a:pPr marL="381049">
               <a:spcAft>
                 <a:spcPts val="1200"/>
@@ -11821,50 +12311,31 @@
               </a:buClr>
             </a:pPr>
             <a:r>
-              <a:rPr lang="bg-BG" sz="2800" b="1" dirty="0" smtClean="0">
-                <a:solidFill>
-                  <a:schemeClr val="bg1">
-                    <a:lumMod val="60000"/>
-                    <a:lumOff val="40000"/>
-                  </a:schemeClr>
-                </a:solidFill>
-              </a:rPr>
-              <a:t>Звукова карта </a:t>
-            </a:r>
-            <a:r>
-              <a:rPr lang="bg-BG" sz="2800" dirty="0" smtClean="0">
+              <a:rPr lang="bg-BG" sz="2800" b="1" dirty="0">
                 <a:solidFill>
                   <a:schemeClr val="bg2"/>
                 </a:solidFill>
               </a:rPr>
-              <a:t>– част от компютърната система, която </a:t>
-            </a:r>
-            <a:r>
-              <a:rPr lang="bg-BG" sz="2800" b="1" dirty="0" smtClean="0">
+              <a:t>Програми</a:t>
+            </a:r>
+            <a:r>
+              <a:rPr lang="bg-BG" sz="2800" dirty="0">
                 <a:solidFill>
                   <a:schemeClr val="bg2"/>
                 </a:solidFill>
               </a:rPr>
-              <a:t>създава</a:t>
-            </a:r>
-            <a:r>
-              <a:rPr lang="bg-BG" sz="2800" dirty="0" smtClean="0">
+              <a:t> за възпроизвеждане на </a:t>
+            </a:r>
+            <a:r>
+              <a:rPr lang="bg-BG" sz="2800" b="1" dirty="0">
                 <a:solidFill>
                   <a:schemeClr val="bg2"/>
                 </a:solidFill>
               </a:rPr>
-              <a:t>, </a:t>
-            </a:r>
-            <a:r>
-              <a:rPr lang="bg-BG" sz="2800" b="1" dirty="0" smtClean="0">
-                <a:solidFill>
-                  <a:schemeClr val="bg2"/>
-                </a:solidFill>
-              </a:rPr>
-              <a:t>обработва</a:t>
-            </a:r>
-            <a:r>
-              <a:rPr lang="bg-BG" sz="2800" dirty="0" smtClean="0">
+              <a:t>звукова</a:t>
+            </a:r>
+            <a:r>
+              <a:rPr lang="bg-BG" sz="2800" dirty="0">
                 <a:solidFill>
                   <a:schemeClr val="bg2"/>
                 </a:solidFill>
@@ -11872,142 +12343,7 @@
               <a:t> и </a:t>
             </a:r>
             <a:r>
-              <a:rPr lang="bg-BG" sz="2800" b="1" dirty="0" smtClean="0">
-                <a:solidFill>
-                  <a:schemeClr val="bg2"/>
-                </a:solidFill>
-              </a:rPr>
-              <a:t>записва звук</a:t>
-            </a:r>
-          </a:p>
-          <a:p>
-            <a:pPr marL="381049">
-              <a:spcAft>
-                <a:spcPts val="1200"/>
-              </a:spcAft>
-              <a:buClr>
-                <a:schemeClr val="bg2"/>
-              </a:buClr>
-            </a:pPr>
-            <a:r>
-              <a:rPr lang="bg-BG" sz="2800" b="1" dirty="0" smtClean="0">
-                <a:solidFill>
-                  <a:schemeClr val="bg1">
-                    <a:lumMod val="60000"/>
-                    <a:lumOff val="40000"/>
-                  </a:schemeClr>
-                </a:solidFill>
-              </a:rPr>
-              <a:t>Видеокарта</a:t>
-            </a:r>
-            <a:r>
-              <a:rPr lang="bg-BG" sz="2800" dirty="0" smtClean="0">
-                <a:solidFill>
-                  <a:schemeClr val="bg2"/>
-                </a:solidFill>
-              </a:rPr>
-              <a:t> </a:t>
-            </a:r>
-            <a:r>
-              <a:rPr lang="bg-BG" sz="2800" dirty="0">
-                <a:solidFill>
-                  <a:schemeClr val="bg2"/>
-                </a:solidFill>
-              </a:rPr>
-              <a:t>– част от компютърната система, </a:t>
-            </a:r>
-            <a:r>
-              <a:rPr lang="bg-BG" sz="2800" dirty="0" smtClean="0">
-                <a:solidFill>
-                  <a:schemeClr val="bg2"/>
-                </a:solidFill>
-              </a:rPr>
-              <a:t>чрез която се </a:t>
-            </a:r>
-            <a:r>
-              <a:rPr lang="bg-BG" sz="2800" b="1" dirty="0" smtClean="0">
-                <a:solidFill>
-                  <a:schemeClr val="bg2"/>
-                </a:solidFill>
-              </a:rPr>
-              <a:t>получава</a:t>
-            </a:r>
-            <a:r>
-              <a:rPr lang="bg-BG" sz="2800" dirty="0" smtClean="0">
-                <a:solidFill>
-                  <a:schemeClr val="bg2"/>
-                </a:solidFill>
-              </a:rPr>
-              <a:t> и </a:t>
-            </a:r>
-            <a:r>
-              <a:rPr lang="bg-BG" sz="2800" b="1" dirty="0" smtClean="0">
-                <a:solidFill>
-                  <a:schemeClr val="bg2"/>
-                </a:solidFill>
-              </a:rPr>
-              <a:t>възпроизвежда</a:t>
-            </a:r>
-            <a:r>
-              <a:rPr lang="bg-BG" sz="2800" dirty="0" smtClean="0">
-                <a:solidFill>
-                  <a:schemeClr val="bg2"/>
-                </a:solidFill>
-              </a:rPr>
-              <a:t> </a:t>
-            </a:r>
-            <a:r>
-              <a:rPr lang="bg-BG" sz="2800" b="1" dirty="0" smtClean="0">
-                <a:solidFill>
-                  <a:schemeClr val="bg2"/>
-                </a:solidFill>
-              </a:rPr>
-              <a:t>видеоизображение</a:t>
-            </a:r>
-          </a:p>
-          <a:p>
-            <a:pPr marL="381049">
-              <a:spcAft>
-                <a:spcPts val="1200"/>
-              </a:spcAft>
-              <a:buClr>
-                <a:schemeClr val="bg2"/>
-              </a:buClr>
-            </a:pPr>
-            <a:r>
-              <a:rPr lang="bg-BG" sz="2800" b="1" dirty="0" smtClean="0">
-                <a:solidFill>
-                  <a:schemeClr val="bg2"/>
-                </a:solidFill>
-              </a:rPr>
-              <a:t>Програми</a:t>
-            </a:r>
-            <a:r>
-              <a:rPr lang="bg-BG" sz="2800" dirty="0" smtClean="0">
-                <a:solidFill>
-                  <a:schemeClr val="bg2"/>
-                </a:solidFill>
-              </a:rPr>
-              <a:t> за възпроизвеждане на </a:t>
-            </a:r>
-            <a:r>
-              <a:rPr lang="bg-BG" sz="2800" b="1" dirty="0" smtClean="0">
-                <a:solidFill>
-                  <a:schemeClr val="bg2"/>
-                </a:solidFill>
-              </a:rPr>
-              <a:t>звукова</a:t>
-            </a:r>
-            <a:r>
-              <a:rPr lang="bg-BG" sz="2800" dirty="0" smtClean="0">
-                <a:solidFill>
-                  <a:schemeClr val="bg2"/>
-                </a:solidFill>
-              </a:rPr>
-              <a:t> и </a:t>
-            </a:r>
-            <a:r>
-              <a:rPr lang="bg-BG" sz="2800" b="1" dirty="0" smtClean="0">
+              <a:rPr lang="bg-BG" sz="2800" b="1" dirty="0">
                 <a:solidFill>
                   <a:schemeClr val="bg2"/>
                 </a:solidFill>
@@ -12015,7 +12351,7 @@
               <a:t>видеоинформация</a:t>
             </a:r>
             <a:r>
-              <a:rPr lang="bg-BG" sz="2800" dirty="0" smtClean="0">
+              <a:rPr lang="bg-BG" sz="2800" dirty="0">
                 <a:solidFill>
                   <a:schemeClr val="bg2"/>
                 </a:solidFill>
@@ -12033,7 +12369,7 @@
               </a:buClr>
             </a:pPr>
             <a:r>
-              <a:rPr lang="en-US" sz="2600" b="1" dirty="0" smtClean="0">
+              <a:rPr lang="en-US" sz="2600" b="1" dirty="0">
                 <a:solidFill>
                   <a:schemeClr val="bg2"/>
                 </a:solidFill>
@@ -12051,7 +12387,7 @@
               </a:buClr>
             </a:pPr>
             <a:r>
-              <a:rPr lang="en-US" sz="2600" b="1" dirty="0" smtClean="0">
+              <a:rPr lang="en-US" sz="2600" b="1" dirty="0">
                 <a:solidFill>
                   <a:schemeClr val="bg2"/>
                 </a:solidFill>
@@ -12069,18 +12405,13 @@
               </a:buClr>
             </a:pPr>
             <a:r>
-              <a:rPr lang="en-US" sz="2600" b="1" dirty="0" smtClean="0">
+              <a:rPr lang="en-US" sz="2600" b="1" dirty="0">
                 <a:solidFill>
                   <a:schemeClr val="bg2"/>
                 </a:solidFill>
               </a:rPr>
               <a:t>Windows Media Player</a:t>
             </a:r>
-            <a:endParaRPr lang="en-US" sz="2600" b="1" dirty="0">
-              <a:solidFill>
-                <a:schemeClr val="bg2"/>
-              </a:solidFill>
-            </a:endParaRPr>
           </a:p>
           <a:p>
             <a:pPr marL="381049">
@@ -12395,593 +12726,6 @@
 </p:sld>
 </file>
 
-<file path=ppt/slides/slide18.xml><?xml version="1.0" encoding="utf-8"?>
-<p:sld xmlns:a="http://schemas.openxmlformats.org/drawingml/2006/main" xmlns:r="http://schemas.openxmlformats.org/officeDocument/2006/relationships" xmlns:p="http://schemas.openxmlformats.org/presentationml/2006/main">
-  <p:cSld>
-    <p:spTree>
-      <p:nvGrpSpPr>
-        <p:cNvPr id="1" name=""/>
-        <p:cNvGrpSpPr/>
-        <p:nvPr/>
-      </p:nvGrpSpPr>
-      <p:grpSpPr>
-        <a:xfrm>
-          <a:off x="0" y="0"/>
-          <a:ext cx="0" cy="0"/>
-          <a:chOff x="0" y="0"/>
-          <a:chExt cx="0" cy="0"/>
-        </a:xfrm>
-      </p:grpSpPr>
-      <p:sp>
-        <p:nvSpPr>
-          <p:cNvPr id="5" name="Slide Title">
-            <a:extLst>
-              <a:ext uri="{FF2B5EF4-FFF2-40B4-BE49-F238E27FC236}">
-                <a16:creationId xmlns:a16="http://schemas.microsoft.com/office/drawing/2014/main" id="{FA0703FC-0F8F-4C80-A615-E4B381EC0E0C}"/>
-              </a:ext>
-            </a:extLst>
-          </p:cNvPr>
-          <p:cNvSpPr>
-            <a:spLocks noGrp="1"/>
-          </p:cNvSpPr>
-          <p:nvPr>
-            <p:ph type="title"/>
-          </p:nvPr>
-        </p:nvSpPr>
-        <p:spPr/>
-        <p:txBody>
-          <a:bodyPr/>
-          <a:lstStyle/>
-          <a:p>
-            <a:r>
-              <a:rPr lang="bg-BG" dirty="0"/>
-              <a:t>Въпроси</a:t>
-            </a:r>
-            <a:r>
-              <a:rPr lang="en-US" dirty="0"/>
-              <a:t>?</a:t>
-            </a:r>
-          </a:p>
-        </p:txBody>
-      </p:sp>
-      <p:sp>
-        <p:nvSpPr>
-          <p:cNvPr id="2" name="Rectangle Bottom Copyright">
-            <a:extLst>
-              <a:ext uri="{FF2B5EF4-FFF2-40B4-BE49-F238E27FC236}">
-                <a16:creationId xmlns:a16="http://schemas.microsoft.com/office/drawing/2014/main" id="{664812A4-2991-44D1-BFE9-32E55AADF8A5}"/>
-              </a:ext>
-            </a:extLst>
-          </p:cNvPr>
-          <p:cNvSpPr/>
-          <p:nvPr/>
-        </p:nvSpPr>
-        <p:spPr>
-          <a:xfrm>
-            <a:off x="111000" y="6454758"/>
-            <a:ext cx="11970000" cy="304242"/>
-          </a:xfrm>
-          <a:prstGeom prst="rect">
-            <a:avLst/>
-          </a:prstGeom>
-        </p:spPr>
-        <p:txBody>
-          <a:bodyPr wrap="square">
-            <a:noAutofit/>
-          </a:bodyPr>
-          <a:lstStyle/>
-          <a:p>
-            <a:pPr algn="ctr">
-              <a:lnSpc>
-                <a:spcPct val="100000"/>
-              </a:lnSpc>
-              <a:spcBef>
-                <a:spcPts val="0"/>
-              </a:spcBef>
-              <a:spcAft>
-                <a:spcPts val="0"/>
-              </a:spcAft>
-            </a:pPr>
-            <a:r>
-              <a:rPr lang="bg-BG" sz="1600" dirty="0">
-                <a:solidFill>
-                  <a:schemeClr val="bg2"/>
-                </a:solidFill>
-                <a:effectLst/>
-                <a:latin typeface="Calibri" panose="020F0502020204030204" pitchFamily="34" charset="0"/>
-                <a:ea typeface="Calibri" panose="020F0502020204030204" pitchFamily="34" charset="0"/>
-                <a:cs typeface="Arial" panose="020B0604020202020204" pitchFamily="34" charset="0"/>
-              </a:rPr>
-              <a:t>Проект "</a:t>
-            </a:r>
-            <a:r>
-              <a:rPr lang="bg-BG" sz="1600" dirty="0">
-                <a:solidFill>
-                  <a:schemeClr val="bg1">
-                    <a:lumMod val="20000"/>
-                    <a:lumOff val="80000"/>
-                  </a:schemeClr>
-                </a:solidFill>
-                <a:effectLst/>
-                <a:latin typeface="Calibri" panose="020F0502020204030204" pitchFamily="34" charset="0"/>
-                <a:ea typeface="Calibri" panose="020F0502020204030204" pitchFamily="34" charset="0"/>
-                <a:cs typeface="Arial" panose="020B0604020202020204" pitchFamily="34" charset="0"/>
-                <a:hlinkClick r:id="rId3">
-                  <a:extLst>
-                    <a:ext uri="{A12FA001-AC4F-418D-AE19-62706E023703}">
-                      <ahyp:hlinkClr xmlns:ahyp="http://schemas.microsoft.com/office/drawing/2018/hyperlinkcolor" xmlns="" val="tx"/>
-                    </a:ext>
-                  </a:extLst>
-                </a:hlinkClick>
-              </a:rPr>
-              <a:t>Отворено учебно съдържание по програмиране и ИТ</a:t>
-            </a:r>
-            <a:r>
-              <a:rPr lang="bg-BG" sz="1600" dirty="0">
-                <a:solidFill>
-                  <a:schemeClr val="bg2"/>
-                </a:solidFill>
-                <a:effectLst/>
-                <a:latin typeface="Calibri" panose="020F0502020204030204" pitchFamily="34" charset="0"/>
-                <a:ea typeface="Calibri" panose="020F0502020204030204" pitchFamily="34" charset="0"/>
-                <a:cs typeface="Arial" panose="020B0604020202020204" pitchFamily="34" charset="0"/>
-              </a:rPr>
-              <a:t>", СофтУни Фондация (лиценз </a:t>
-            </a:r>
-            <a:r>
-              <a:rPr lang="en-US" sz="1600" dirty="0">
-                <a:solidFill>
-                  <a:schemeClr val="bg2"/>
-                </a:solidFill>
-                <a:effectLst/>
-                <a:latin typeface="Calibri" panose="020F0502020204030204" pitchFamily="34" charset="0"/>
-                <a:ea typeface="Calibri" panose="020F0502020204030204" pitchFamily="34" charset="0"/>
-                <a:cs typeface="Arial" panose="020B0604020202020204" pitchFamily="34" charset="0"/>
-              </a:rPr>
-              <a:t>CC-BY-NC-SA</a:t>
-            </a:r>
-            <a:r>
-              <a:rPr lang="bg-BG" sz="1600" dirty="0">
-                <a:solidFill>
-                  <a:schemeClr val="bg2"/>
-                </a:solidFill>
-                <a:effectLst/>
-                <a:latin typeface="Calibri" panose="020F0502020204030204" pitchFamily="34" charset="0"/>
-                <a:ea typeface="Calibri" panose="020F0502020204030204" pitchFamily="34" charset="0"/>
-                <a:cs typeface="Arial" panose="020B0604020202020204" pitchFamily="34" charset="0"/>
-              </a:rPr>
-              <a:t>)</a:t>
-            </a:r>
-            <a:endParaRPr lang="bg-BG" sz="2400" dirty="0">
-              <a:solidFill>
-                <a:schemeClr val="bg2"/>
-              </a:solidFill>
-              <a:effectLst/>
-              <a:latin typeface="Calibri" panose="020F0502020204030204" pitchFamily="34" charset="0"/>
-              <a:ea typeface="Calibri" panose="020F0502020204030204" pitchFamily="34" charset="0"/>
-              <a:cs typeface="Arial" panose="020B0604020202020204" pitchFamily="34" charset="0"/>
-            </a:endParaRPr>
-          </a:p>
-        </p:txBody>
-      </p:sp>
-    </p:spTree>
-    <p:extLst>
-      <p:ext uri="{BB962C8B-B14F-4D97-AF65-F5344CB8AC3E}">
-        <p14:creationId xmlns:p14="http://schemas.microsoft.com/office/powerpoint/2010/main" val="1472534970"/>
-      </p:ext>
-    </p:extLst>
-  </p:cSld>
-  <p:clrMapOvr>
-    <a:masterClrMapping/>
-  </p:clrMapOvr>
-  <mc:AlternateContent xmlns:mc="http://schemas.openxmlformats.org/markup-compatibility/2006" xmlns:p14="http://schemas.microsoft.com/office/powerpoint/2010/main">
-    <mc:Choice Requires="p14">
-      <p:transition spd="slow" p14:dur="2000" advClick="0" advTm="5000"/>
-    </mc:Choice>
-    <mc:Fallback xmlns="">
-      <p:transition spd="slow" advClick="0" advTm="5000"/>
-    </mc:Fallback>
-  </mc:AlternateContent>
-  <p:timing>
-    <p:tnLst>
-      <p:par>
-        <p:cTn id="1" dur="indefinite" restart="never" nodeType="tmRoot"/>
-      </p:par>
-    </p:tnLst>
-  </p:timing>
-</p:sld>
-</file>
-
-<file path=ppt/slides/slide19.xml><?xml version="1.0" encoding="utf-8"?>
-<p:sld xmlns:a="http://schemas.openxmlformats.org/drawingml/2006/main" xmlns:r="http://schemas.openxmlformats.org/officeDocument/2006/relationships" xmlns:p="http://schemas.openxmlformats.org/presentationml/2006/main">
-  <p:cSld>
-    <p:spTree>
-      <p:nvGrpSpPr>
-        <p:cNvPr id="1" name=""/>
-        <p:cNvGrpSpPr/>
-        <p:nvPr/>
-      </p:nvGrpSpPr>
-      <p:grpSpPr>
-        <a:xfrm>
-          <a:off x="0" y="0"/>
-          <a:ext cx="0" cy="0"/>
-          <a:chOff x="0" y="0"/>
-          <a:chExt cx="0" cy="0"/>
-        </a:xfrm>
-      </p:grpSpPr>
-      <p:sp>
-        <p:nvSpPr>
-          <p:cNvPr id="5" name="Slide Number">
-            <a:extLst>
-              <a:ext uri="{FF2B5EF4-FFF2-40B4-BE49-F238E27FC236}">
-                <a16:creationId xmlns:a16="http://schemas.microsoft.com/office/drawing/2014/main" id="{F48C3C93-90A1-4D31-BEA6-B54D1106CE31}"/>
-              </a:ext>
-            </a:extLst>
-          </p:cNvPr>
-          <p:cNvSpPr>
-            <a:spLocks noGrp="1"/>
-          </p:cNvSpPr>
-          <p:nvPr>
-            <p:ph type="sldNum" sz="quarter" idx="5"/>
-          </p:nvPr>
-        </p:nvSpPr>
-        <p:spPr>
-          <a:xfrm>
-            <a:off x="11753030" y="6507000"/>
-            <a:ext cx="367414" cy="297000"/>
-          </a:xfrm>
-          <a:prstGeom prst="rect">
-            <a:avLst/>
-          </a:prstGeom>
-        </p:spPr>
-        <p:txBody>
-          <a:bodyPr vert="horz" lIns="91440" tIns="45720" rIns="91440" bIns="45720" rtlCol="0" anchor="b"/>
-          <a:lstStyle>
-            <a:lvl1pPr algn="r">
-              <a:defRPr sz="1000"/>
-            </a:lvl1pPr>
-          </a:lstStyle>
-          <a:p>
-            <a:fld id="{2BF067CD-8E6B-4360-9AA8-C5DF2A48A6D1}" type="slidenum">
-              <a:rPr lang="en-US" smtClean="0"/>
-              <a:pPr/>
-              <a:t>19</a:t>
-            </a:fld>
-            <a:endParaRPr lang="en-US" dirty="0"/>
-          </a:p>
-        </p:txBody>
-      </p:sp>
-      <p:sp>
-        <p:nvSpPr>
-          <p:cNvPr id="2" name="Slide Body">
-            <a:extLst>
-              <a:ext uri="{FF2B5EF4-FFF2-40B4-BE49-F238E27FC236}">
-                <a16:creationId xmlns:a16="http://schemas.microsoft.com/office/drawing/2014/main" id="{980F49B1-E4BE-4389-A747-7AB9B71AD920}"/>
-              </a:ext>
-            </a:extLst>
-          </p:cNvPr>
-          <p:cNvSpPr>
-            <a:spLocks noGrp="1"/>
-          </p:cNvSpPr>
-          <p:nvPr>
-            <p:ph type="body" sz="quarter" idx="10"/>
-          </p:nvPr>
-        </p:nvSpPr>
-        <p:spPr>
-          <a:xfrm>
-            <a:off x="190402" y="1269001"/>
-            <a:ext cx="9865598" cy="2474999"/>
-          </a:xfrm>
-        </p:spPr>
-        <p:txBody>
-          <a:bodyPr>
-            <a:normAutofit/>
-          </a:bodyPr>
-          <a:lstStyle/>
-          <a:p>
-            <a:pPr>
-              <a:lnSpc>
-                <a:spcPct val="120000"/>
-              </a:lnSpc>
-            </a:pPr>
-            <a:r>
-              <a:rPr lang="bg-BG" sz="3200" dirty="0"/>
-              <a:t>Този курс</a:t>
-            </a:r>
-            <a:r>
-              <a:rPr lang="en-US" sz="3200" dirty="0"/>
-              <a:t> (</a:t>
-            </a:r>
-            <a:r>
-              <a:rPr lang="bg-BG" sz="3200" dirty="0"/>
-              <a:t>презентации, примери, демонстрационен код, упражнения, домашни, видео и други активи</a:t>
-            </a:r>
-            <a:r>
-              <a:rPr lang="en-US" sz="3200" dirty="0"/>
-              <a:t>) </a:t>
-            </a:r>
-            <a:r>
-              <a:rPr lang="bg-BG" sz="3200" dirty="0"/>
-              <a:t>представлява</a:t>
-            </a:r>
-            <a:r>
-              <a:rPr lang="en-US" sz="3200" dirty="0"/>
-              <a:t> </a:t>
-            </a:r>
-            <a:r>
-              <a:rPr lang="bg-BG" sz="3200" b="1" dirty="0"/>
-              <a:t>свободно учебно съдържание </a:t>
-            </a:r>
-            <a:r>
-              <a:rPr lang="bg-BG" sz="3200" dirty="0"/>
-              <a:t>и се разпространява под свободен лиценз </a:t>
-            </a:r>
-            <a:r>
-              <a:rPr lang="en-US" sz="3200" b="1" dirty="0"/>
-              <a:t>CC-BY-NC-SA</a:t>
-            </a:r>
-            <a:endParaRPr lang="bg-BG" sz="3200" dirty="0"/>
-          </a:p>
-        </p:txBody>
-      </p:sp>
-      <p:pic>
-        <p:nvPicPr>
-          <p:cNvPr id="6" name="Picture License" descr="License">
-            <a:extLst>
-              <a:ext uri="{FF2B5EF4-FFF2-40B4-BE49-F238E27FC236}">
-                <a16:creationId xmlns:a16="http://schemas.microsoft.com/office/drawing/2014/main" id="{82BA520F-A037-4E01-AA18-27D9F1E930A6}"/>
-              </a:ext>
-            </a:extLst>
-          </p:cNvPr>
-          <p:cNvPicPr>
-            <a:picLocks noChangeAspect="1"/>
-          </p:cNvPicPr>
-          <p:nvPr/>
-        </p:nvPicPr>
-        <p:blipFill>
-          <a:blip r:embed="rId3">
-            <a:clrChange>
-              <a:clrFrom>
-                <a:srgbClr val="FFFFFF"/>
-              </a:clrFrom>
-              <a:clrTo>
-                <a:srgbClr val="FFFFFF">
-                  <a:alpha val="0"/>
-                </a:srgbClr>
-              </a:clrTo>
-            </a:clrChange>
-          </a:blip>
-          <a:stretch>
-            <a:fillRect/>
-          </a:stretch>
-        </p:blipFill>
-        <p:spPr>
-          <a:xfrm>
-            <a:off x="10226175" y="1440120"/>
-            <a:ext cx="1198986" cy="1268880"/>
-          </a:xfrm>
-          <a:prstGeom prst="rect">
-            <a:avLst/>
-          </a:prstGeom>
-        </p:spPr>
-      </p:pic>
-      <p:sp>
-        <p:nvSpPr>
-          <p:cNvPr id="3" name="Slide Title">
-            <a:extLst>
-              <a:ext uri="{FF2B5EF4-FFF2-40B4-BE49-F238E27FC236}">
-                <a16:creationId xmlns:a16="http://schemas.microsoft.com/office/drawing/2014/main" id="{E5F1FB41-80C3-4816-BC47-CCC50632E6E8}"/>
-              </a:ext>
-            </a:extLst>
-          </p:cNvPr>
-          <p:cNvSpPr>
-            <a:spLocks noGrp="1"/>
-          </p:cNvSpPr>
-          <p:nvPr>
-            <p:ph type="title"/>
-          </p:nvPr>
-        </p:nvSpPr>
-        <p:spPr/>
-        <p:txBody>
-          <a:bodyPr/>
-          <a:lstStyle/>
-          <a:p>
-            <a:r>
-              <a:rPr lang="bg-BG" dirty="0"/>
-              <a:t>Лиценз</a:t>
-            </a:r>
-          </a:p>
-        </p:txBody>
-      </p:sp>
-      <p:sp>
-        <p:nvSpPr>
-          <p:cNvPr id="11" name="TextBox 10">
-            <a:extLst>
-              <a:ext uri="{FF2B5EF4-FFF2-40B4-BE49-F238E27FC236}">
-                <a16:creationId xmlns:a16="http://schemas.microsoft.com/office/drawing/2014/main" id="{0C18DF19-B750-4C88-975B-661A6BF61F5E}"/>
-              </a:ext>
-            </a:extLst>
-          </p:cNvPr>
-          <p:cNvSpPr txBox="1"/>
-          <p:nvPr/>
-        </p:nvSpPr>
-        <p:spPr>
-          <a:xfrm>
-            <a:off x="190401" y="3927519"/>
-            <a:ext cx="11710599" cy="1979644"/>
-          </a:xfrm>
-          <a:prstGeom prst="rect">
-            <a:avLst/>
-          </a:prstGeom>
-          <a:noFill/>
-          <a:ln w="12700">
-            <a:noFill/>
-          </a:ln>
-        </p:spPr>
-        <p:txBody>
-          <a:bodyPr wrap="square">
-            <a:spAutoFit/>
-          </a:bodyPr>
-          <a:lstStyle/>
-          <a:p>
-            <a:pPr marL="360363" indent="-360363" defTabSz="1218438">
-              <a:lnSpc>
-                <a:spcPct val="120000"/>
-              </a:lnSpc>
-              <a:spcBef>
-                <a:spcPts val="600"/>
-              </a:spcBef>
-              <a:spcAft>
-                <a:spcPts val="600"/>
-              </a:spcAft>
-              <a:buFont typeface="Wingdings" panose="05000000000000000000" pitchFamily="2" charset="2"/>
-              <a:buChar char="§"/>
-              <a:defRPr/>
-            </a:pPr>
-            <a:r>
-              <a:rPr lang="bg-BG" sz="3200" dirty="0"/>
-              <a:t>Проект "</a:t>
-            </a:r>
-            <a:r>
-              <a:rPr lang="bg-BG" sz="3200" b="1" dirty="0"/>
-              <a:t>Отворено учебно съдържание по програмиране и ИТ</a:t>
-            </a:r>
-            <a:r>
-              <a:rPr lang="bg-BG" sz="3200" dirty="0"/>
-              <a:t>" към Фондация "Софтуерен университет"</a:t>
-            </a:r>
-            <a:r>
-              <a:rPr lang="en-US" sz="3200" dirty="0"/>
-              <a:t>:</a:t>
-            </a:r>
-            <a:endParaRPr lang="bg-BG" sz="3200" dirty="0"/>
-          </a:p>
-          <a:p>
-            <a:pPr marL="817563" lvl="1" indent="-360363" defTabSz="1218438">
-              <a:lnSpc>
-                <a:spcPct val="120000"/>
-              </a:lnSpc>
-              <a:spcBef>
-                <a:spcPts val="600"/>
-              </a:spcBef>
-              <a:spcAft>
-                <a:spcPts val="600"/>
-              </a:spcAft>
-              <a:buFont typeface="Wingdings" panose="05000000000000000000" pitchFamily="2" charset="2"/>
-              <a:buChar char="§"/>
-              <a:defRPr/>
-            </a:pPr>
-            <a:r>
-              <a:rPr kumimoji="0" lang="en-US" sz="3200" b="0" i="0" u="none" strike="noStrike" kern="1200" cap="none" spc="0" normalizeH="0" baseline="0" noProof="0" dirty="0">
-                <a:ln>
-                  <a:noFill/>
-                </a:ln>
-                <a:solidFill>
-                  <a:srgbClr val="234465"/>
-                </a:solidFill>
-                <a:effectLst/>
-                <a:uLnTx/>
-                <a:uFillTx/>
-                <a:latin typeface="Calibri"/>
-                <a:ea typeface="+mn-ea"/>
-                <a:cs typeface="+mn-cs"/>
-                <a:hlinkClick r:id="rId4"/>
-              </a:rPr>
-              <a:t>https://github.com/BG-IT-Edu</a:t>
-            </a:r>
-            <a:endParaRPr kumimoji="0" lang="bg-BG" sz="3200" b="0" i="0" u="none" strike="noStrike" kern="1200" cap="none" spc="0" normalizeH="0" baseline="0" noProof="0" dirty="0">
-              <a:ln>
-                <a:noFill/>
-              </a:ln>
-              <a:solidFill>
-                <a:srgbClr val="234465"/>
-              </a:solidFill>
-              <a:effectLst/>
-              <a:uLnTx/>
-              <a:uFillTx/>
-              <a:latin typeface="Calibri"/>
-              <a:ea typeface="+mn-ea"/>
-              <a:cs typeface="+mn-cs"/>
-            </a:endParaRPr>
-          </a:p>
-        </p:txBody>
-      </p:sp>
-      <p:pic>
-        <p:nvPicPr>
-          <p:cNvPr id="7" name="Picture 6" title="CC-BY-NC-SA License">
-            <a:hlinkClick r:id="rId5" tooltip="This work is licensed under the &quot;Creative Commons Attribution-NonCommercial-ShareAlike 4.0 International&quot; license"/>
-            <a:extLst>
-              <a:ext uri="{FF2B5EF4-FFF2-40B4-BE49-F238E27FC236}">
-                <a16:creationId xmlns:a16="http://schemas.microsoft.com/office/drawing/2014/main" id="{F6C77C47-F7D8-A176-5C69-7FDE5C7E8003}"/>
-              </a:ext>
-            </a:extLst>
-          </p:cNvPr>
-          <p:cNvPicPr>
-            <a:picLocks noChangeAspect="1" noChangeArrowheads="1"/>
-          </p:cNvPicPr>
-          <p:nvPr/>
-        </p:nvPicPr>
-        <p:blipFill>
-          <a:blip r:embed="rId6">
-            <a:extLst>
-              <a:ext uri="{28A0092B-C50C-407E-A947-70E740481C1C}">
-                <a14:useLocalDpi xmlns:a14="http://schemas.microsoft.com/office/drawing/2010/main"/>
-              </a:ext>
-            </a:extLst>
-          </a:blip>
-          <a:srcRect/>
-          <a:stretch>
-            <a:fillRect/>
-          </a:stretch>
-        </p:blipFill>
-        <p:spPr bwMode="auto">
-          <a:xfrm>
-            <a:off x="9831000" y="2908593"/>
-            <a:ext cx="1989336" cy="696022"/>
-          </a:xfrm>
-          <a:prstGeom prst="roundRect">
-            <a:avLst>
-              <a:gd name="adj" fmla="val 3940"/>
-            </a:avLst>
-          </a:prstGeom>
-          <a:solidFill>
-            <a:srgbClr val="231F20">
-              <a:alpha val="50000"/>
-            </a:srgbClr>
-          </a:solidFill>
-          <a:ln>
-            <a:noFill/>
-          </a:ln>
-        </p:spPr>
-      </p:pic>
-    </p:spTree>
-    <p:extLst>
-      <p:ext uri="{BB962C8B-B14F-4D97-AF65-F5344CB8AC3E}">
-        <p14:creationId xmlns:p14="http://schemas.microsoft.com/office/powerpoint/2010/main" val="3879276042"/>
-      </p:ext>
-    </p:extLst>
-  </p:cSld>
-  <p:clrMapOvr>
-    <a:masterClrMapping/>
-  </p:clrMapOvr>
-  <mc:AlternateContent xmlns:mc="http://schemas.openxmlformats.org/markup-compatibility/2006" xmlns:p14="http://schemas.microsoft.com/office/powerpoint/2010/main">
-    <mc:Choice Requires="p14">
-      <p:transition spd="slow" p14:dur="2000" advClick="0" advTm="5000"/>
-    </mc:Choice>
-    <mc:Fallback xmlns="">
-      <p:transition spd="slow" advClick="0" advTm="5000"/>
-    </mc:Fallback>
-  </mc:AlternateContent>
-  <p:timing>
-    <p:tnLst>
-      <p:par>
-        <p:cTn id="1" dur="indefinite" restart="never" nodeType="tmRoot"/>
-      </p:par>
-    </p:tnLst>
-  </p:timing>
-</p:sld>
-</file>
-
 <file path=ppt/slides/slide2.xml><?xml version="1.0" encoding="utf-8"?>
 <p:sld xmlns:a="http://schemas.openxmlformats.org/drawingml/2006/main" xmlns:r="http://schemas.openxmlformats.org/officeDocument/2006/relationships" xmlns:p="http://schemas.openxmlformats.org/presentationml/2006/main">
   <p:cSld>
@@ -13150,15 +12894,15 @@
           <a:lstStyle/>
           <a:p>
             <a:r>
-              <a:rPr lang="bg-BG" dirty="0" smtClean="0"/>
+              <a:rPr lang="bg-BG" dirty="0"/>
               <a:t>͏</a:t>
             </a:r>
             <a:r>
-              <a:rPr lang="bg-BG" b="1" dirty="0" smtClean="0"/>
+              <a:rPr lang="bg-BG" b="1" dirty="0"/>
               <a:t>Основни компоненти </a:t>
             </a:r>
             <a:r>
-              <a:rPr lang="bg-BG" dirty="0" smtClean="0"/>
+              <a:rPr lang="bg-BG" dirty="0"/>
               <a:t>на компютърната</a:t>
             </a:r>
           </a:p>
@@ -13167,33 +12911,30 @@
               <a:buNone/>
             </a:pPr>
             <a:r>
-              <a:rPr lang="bg-BG" dirty="0" smtClean="0"/>
+              <a:rPr lang="bg-BG" dirty="0"/>
               <a:t> система за:</a:t>
             </a:r>
           </a:p>
           <a:p>
-            <a:pPr marL="571500" indent="-571500">
-              <a:buFont typeface="Arial" panose="020B0604020202020204" pitchFamily="34" charset="0"/>
-              <a:buChar char="•"/>
-            </a:pPr>
-            <a:r>
-              <a:rPr lang="bg-BG" b="1" dirty="0" smtClean="0"/>
+            <a:pPr marL="860733" lvl="1" indent="-571500"/>
+            <a:r>
+              <a:rPr lang="bg-BG" b="1" dirty="0"/>
               <a:t>Възпроизвеждане</a:t>
             </a:r>
             <a:r>
-              <a:rPr lang="bg-BG" dirty="0" smtClean="0"/>
+              <a:rPr lang="bg-BG" dirty="0"/>
               <a:t> и </a:t>
             </a:r>
             <a:r>
-              <a:rPr lang="bg-BG" b="1" dirty="0" smtClean="0"/>
+              <a:rPr lang="bg-BG" b="1" dirty="0"/>
               <a:t>запис</a:t>
             </a:r>
             <a:r>
-              <a:rPr lang="bg-BG" dirty="0" smtClean="0"/>
+              <a:rPr lang="bg-BG" dirty="0"/>
               <a:t> на </a:t>
             </a:r>
             <a:r>
-              <a:rPr lang="bg-BG" b="1" dirty="0" smtClean="0">
+              <a:rPr lang="bg-BG" b="1" dirty="0">
                 <a:solidFill>
                   <a:schemeClr val="bg1"/>
                 </a:solidFill>
@@ -13202,20 +12943,17 @@
             </a:r>
           </a:p>
           <a:p>
-            <a:pPr marL="571500" indent="-571500">
-              <a:buFont typeface="Arial" panose="020B0604020202020204" pitchFamily="34" charset="0"/>
-              <a:buChar char="•"/>
-            </a:pPr>
-            <a:r>
-              <a:rPr lang="bg-BG" b="1" dirty="0" smtClean="0"/>
+            <a:pPr marL="860733" lvl="1" indent="-571500"/>
+            <a:r>
+              <a:rPr lang="bg-BG" b="1" dirty="0"/>
               <a:t>Възпроизвеждане</a:t>
             </a:r>
             <a:r>
-              <a:rPr lang="bg-BG" dirty="0" smtClean="0"/>
+              <a:rPr lang="bg-BG" dirty="0"/>
               <a:t> на </a:t>
             </a:r>
             <a:r>
-              <a:rPr lang="bg-BG" b="1" dirty="0" smtClean="0">
+              <a:rPr lang="bg-BG" b="1" dirty="0">
                 <a:solidFill>
                   <a:schemeClr val="bg1"/>
                 </a:solidFill>
@@ -13246,14 +12984,10 @@
             </a:r>
             <a:r>
               <a:rPr lang="bg-BG" dirty="0"/>
-              <a:t> </a:t>
-            </a:r>
-            <a:r>
-              <a:rPr lang="bg-BG" dirty="0" smtClean="0"/>
-              <a:t>и </a:t>
-            </a:r>
-            <a:r>
-              <a:rPr lang="bg-BG" b="1" dirty="0" smtClean="0"/>
+              <a:t> и </a:t>
+            </a:r>
+            <a:r>
+              <a:rPr lang="bg-BG" b="1" dirty="0"/>
               <a:t>видеоинформация</a:t>
             </a:r>
             <a:endParaRPr lang="en-US" b="1" dirty="0"/>
@@ -13461,6 +13195,55 @@
                       </p:childTnLst>
                     </p:cTn>
                   </p:par>
+                  <p:par>
+                    <p:cTn id="11" fill="hold">
+                      <p:stCondLst>
+                        <p:cond delay="indefinite"/>
+                      </p:stCondLst>
+                      <p:childTnLst>
+                        <p:par>
+                          <p:cTn id="12" fill="hold">
+                            <p:stCondLst>
+                              <p:cond delay="0"/>
+                            </p:stCondLst>
+                            <p:childTnLst>
+                              <p:par>
+                                <p:cTn id="13" presetID="1" presetClass="entr" presetSubtype="0" fill="hold" nodeType="clickEffect">
+                                  <p:stCondLst>
+                                    <p:cond delay="0"/>
+                                  </p:stCondLst>
+                                  <p:childTnLst>
+                                    <p:set>
+                                      <p:cBhvr>
+                                        <p:cTn id="14" dur="1" fill="hold">
+                                          <p:stCondLst>
+                                            <p:cond delay="0"/>
+                                          </p:stCondLst>
+                                        </p:cTn>
+                                        <p:tgtEl>
+                                          <p:spTgt spid="444419">
+                                            <p:txEl>
+                                              <p:pRg st="4" end="4"/>
+                                            </p:txEl>
+                                          </p:spTgt>
+                                        </p:tgtEl>
+                                        <p:attrNameLst>
+                                          <p:attrName>style.visibility</p:attrName>
+                                        </p:attrNameLst>
+                                      </p:cBhvr>
+                                      <p:to>
+                                        <p:strVal val="visible"/>
+                                      </p:to>
+                                    </p:set>
+                                  </p:childTnLst>
+                                </p:cTn>
+                              </p:par>
+                            </p:childTnLst>
+                          </p:cTn>
+                        </p:par>
+                      </p:childTnLst>
+                    </p:cTn>
+                  </p:par>
                 </p:childTnLst>
               </p:cTn>
               <p:prevCondLst>
@@ -13483,6 +13266,579 @@
       </p:par>
     </p:tnLst>
   </p:timing>
+</p:sld>
+</file>
+
+<file path=ppt/slides/slide20.xml><?xml version="1.0" encoding="utf-8"?>
+<p:sld xmlns:a="http://schemas.openxmlformats.org/drawingml/2006/main" xmlns:r="http://schemas.openxmlformats.org/officeDocument/2006/relationships" xmlns:p="http://schemas.openxmlformats.org/presentationml/2006/main">
+  <p:cSld>
+    <p:spTree>
+      <p:nvGrpSpPr>
+        <p:cNvPr id="1" name=""/>
+        <p:cNvGrpSpPr/>
+        <p:nvPr/>
+      </p:nvGrpSpPr>
+      <p:grpSpPr>
+        <a:xfrm>
+          <a:off x="0" y="0"/>
+          <a:ext cx="0" cy="0"/>
+          <a:chOff x="0" y="0"/>
+          <a:chExt cx="0" cy="0"/>
+        </a:xfrm>
+      </p:grpSpPr>
+      <p:sp>
+        <p:nvSpPr>
+          <p:cNvPr id="5" name="Slide Title">
+            <a:extLst>
+              <a:ext uri="{FF2B5EF4-FFF2-40B4-BE49-F238E27FC236}">
+                <a16:creationId xmlns:a16="http://schemas.microsoft.com/office/drawing/2014/main" id="{FA0703FC-0F8F-4C80-A615-E4B381EC0E0C}"/>
+              </a:ext>
+            </a:extLst>
+          </p:cNvPr>
+          <p:cNvSpPr>
+            <a:spLocks noGrp="1"/>
+          </p:cNvSpPr>
+          <p:nvPr>
+            <p:ph type="title"/>
+          </p:nvPr>
+        </p:nvSpPr>
+        <p:spPr/>
+        <p:txBody>
+          <a:bodyPr/>
+          <a:lstStyle/>
+          <a:p>
+            <a:r>
+              <a:rPr lang="bg-BG" dirty="0"/>
+              <a:t>Въпроси</a:t>
+            </a:r>
+            <a:r>
+              <a:rPr lang="en-US" dirty="0"/>
+              <a:t>?</a:t>
+            </a:r>
+          </a:p>
+        </p:txBody>
+      </p:sp>
+      <p:sp>
+        <p:nvSpPr>
+          <p:cNvPr id="2" name="Rectangle Bottom Copyright">
+            <a:extLst>
+              <a:ext uri="{FF2B5EF4-FFF2-40B4-BE49-F238E27FC236}">
+                <a16:creationId xmlns:a16="http://schemas.microsoft.com/office/drawing/2014/main" id="{664812A4-2991-44D1-BFE9-32E55AADF8A5}"/>
+              </a:ext>
+            </a:extLst>
+          </p:cNvPr>
+          <p:cNvSpPr/>
+          <p:nvPr/>
+        </p:nvSpPr>
+        <p:spPr>
+          <a:xfrm>
+            <a:off x="111000" y="6454758"/>
+            <a:ext cx="11970000" cy="304242"/>
+          </a:xfrm>
+          <a:prstGeom prst="rect">
+            <a:avLst/>
+          </a:prstGeom>
+        </p:spPr>
+        <p:txBody>
+          <a:bodyPr wrap="square">
+            <a:noAutofit/>
+          </a:bodyPr>
+          <a:lstStyle/>
+          <a:p>
+            <a:pPr algn="ctr">
+              <a:lnSpc>
+                <a:spcPct val="100000"/>
+              </a:lnSpc>
+              <a:spcBef>
+                <a:spcPts val="0"/>
+              </a:spcBef>
+              <a:spcAft>
+                <a:spcPts val="0"/>
+              </a:spcAft>
+            </a:pPr>
+            <a:r>
+              <a:rPr lang="bg-BG" sz="1600" dirty="0">
+                <a:solidFill>
+                  <a:schemeClr val="bg2"/>
+                </a:solidFill>
+                <a:effectLst/>
+                <a:latin typeface="Calibri" panose="020F0502020204030204" pitchFamily="34" charset="0"/>
+                <a:ea typeface="Calibri" panose="020F0502020204030204" pitchFamily="34" charset="0"/>
+                <a:cs typeface="Arial" panose="020B0604020202020204" pitchFamily="34" charset="0"/>
+              </a:rPr>
+              <a:t>Проект "</a:t>
+            </a:r>
+            <a:r>
+              <a:rPr lang="bg-BG" sz="1600" dirty="0">
+                <a:solidFill>
+                  <a:schemeClr val="bg1">
+                    <a:lumMod val="20000"/>
+                    <a:lumOff val="80000"/>
+                  </a:schemeClr>
+                </a:solidFill>
+                <a:effectLst/>
+                <a:latin typeface="Calibri" panose="020F0502020204030204" pitchFamily="34" charset="0"/>
+                <a:ea typeface="Calibri" panose="020F0502020204030204" pitchFamily="34" charset="0"/>
+                <a:cs typeface="Arial" panose="020B0604020202020204" pitchFamily="34" charset="0"/>
+                <a:hlinkClick r:id="rId3">
+                  <a:extLst>
+                    <a:ext uri="{A12FA001-AC4F-418D-AE19-62706E023703}">
+                      <ahyp:hlinkClr xmlns:ahyp="http://schemas.microsoft.com/office/drawing/2018/hyperlinkcolor" val="tx"/>
+                    </a:ext>
+                  </a:extLst>
+                </a:hlinkClick>
+              </a:rPr>
+              <a:t>Отворено учебно съдържание по програмиране и ИТ</a:t>
+            </a:r>
+            <a:r>
+              <a:rPr lang="bg-BG" sz="1600" dirty="0">
+                <a:solidFill>
+                  <a:schemeClr val="bg2"/>
+                </a:solidFill>
+                <a:effectLst/>
+                <a:latin typeface="Calibri" panose="020F0502020204030204" pitchFamily="34" charset="0"/>
+                <a:ea typeface="Calibri" panose="020F0502020204030204" pitchFamily="34" charset="0"/>
+                <a:cs typeface="Arial" panose="020B0604020202020204" pitchFamily="34" charset="0"/>
+              </a:rPr>
+              <a:t>", СофтУни Фондация (лиценз </a:t>
+            </a:r>
+            <a:r>
+              <a:rPr lang="en-US" sz="1600" dirty="0">
+                <a:solidFill>
+                  <a:schemeClr val="bg2"/>
+                </a:solidFill>
+                <a:effectLst/>
+                <a:latin typeface="Calibri" panose="020F0502020204030204" pitchFamily="34" charset="0"/>
+                <a:ea typeface="Calibri" panose="020F0502020204030204" pitchFamily="34" charset="0"/>
+                <a:cs typeface="Arial" panose="020B0604020202020204" pitchFamily="34" charset="0"/>
+              </a:rPr>
+              <a:t>CC-BY-NC-SA</a:t>
+            </a:r>
+            <a:r>
+              <a:rPr lang="bg-BG" sz="1600" dirty="0">
+                <a:solidFill>
+                  <a:schemeClr val="bg2"/>
+                </a:solidFill>
+                <a:effectLst/>
+                <a:latin typeface="Calibri" panose="020F0502020204030204" pitchFamily="34" charset="0"/>
+                <a:ea typeface="Calibri" panose="020F0502020204030204" pitchFamily="34" charset="0"/>
+                <a:cs typeface="Arial" panose="020B0604020202020204" pitchFamily="34" charset="0"/>
+              </a:rPr>
+              <a:t>)</a:t>
+            </a:r>
+            <a:endParaRPr lang="bg-BG" sz="2400" dirty="0">
+              <a:solidFill>
+                <a:schemeClr val="bg2"/>
+              </a:solidFill>
+              <a:effectLst/>
+              <a:latin typeface="Calibri" panose="020F0502020204030204" pitchFamily="34" charset="0"/>
+              <a:ea typeface="Calibri" panose="020F0502020204030204" pitchFamily="34" charset="0"/>
+              <a:cs typeface="Arial" panose="020B0604020202020204" pitchFamily="34" charset="0"/>
+            </a:endParaRPr>
+          </a:p>
+        </p:txBody>
+      </p:sp>
+    </p:spTree>
+    <p:extLst>
+      <p:ext uri="{BB962C8B-B14F-4D97-AF65-F5344CB8AC3E}">
+        <p14:creationId xmlns:p14="http://schemas.microsoft.com/office/powerpoint/2010/main" val="1472534970"/>
+      </p:ext>
+    </p:extLst>
+  </p:cSld>
+  <p:clrMapOvr>
+    <a:masterClrMapping/>
+  </p:clrMapOvr>
+  <mc:AlternateContent xmlns:mc="http://schemas.openxmlformats.org/markup-compatibility/2006" xmlns:p14="http://schemas.microsoft.com/office/powerpoint/2010/main">
+    <mc:Choice Requires="p14">
+      <p:transition spd="slow" p14:dur="2000" advClick="0" advTm="5000"/>
+    </mc:Choice>
+    <mc:Fallback xmlns="">
+      <p:transition spd="slow" advClick="0" advTm="5000"/>
+    </mc:Fallback>
+  </mc:AlternateContent>
+</p:sld>
+</file>
+
+<file path=ppt/slides/slide21.xml><?xml version="1.0" encoding="utf-8"?>
+<p:sld xmlns:a="http://schemas.openxmlformats.org/drawingml/2006/main" xmlns:r="http://schemas.openxmlformats.org/officeDocument/2006/relationships" xmlns:p="http://schemas.openxmlformats.org/presentationml/2006/main">
+  <p:cSld>
+    <p:spTree>
+      <p:nvGrpSpPr>
+        <p:cNvPr id="1" name=""/>
+        <p:cNvGrpSpPr/>
+        <p:nvPr/>
+      </p:nvGrpSpPr>
+      <p:grpSpPr>
+        <a:xfrm>
+          <a:off x="0" y="0"/>
+          <a:ext cx="0" cy="0"/>
+          <a:chOff x="0" y="0"/>
+          <a:chExt cx="0" cy="0"/>
+        </a:xfrm>
+      </p:grpSpPr>
+      <p:sp>
+        <p:nvSpPr>
+          <p:cNvPr id="5" name="Slide Number">
+            <a:extLst>
+              <a:ext uri="{FF2B5EF4-FFF2-40B4-BE49-F238E27FC236}">
+                <a16:creationId xmlns:a16="http://schemas.microsoft.com/office/drawing/2014/main" id="{F48C3C93-90A1-4D31-BEA6-B54D1106CE31}"/>
+              </a:ext>
+            </a:extLst>
+          </p:cNvPr>
+          <p:cNvSpPr>
+            <a:spLocks noGrp="1"/>
+          </p:cNvSpPr>
+          <p:nvPr>
+            <p:ph type="sldNum" sz="quarter" idx="5"/>
+          </p:nvPr>
+        </p:nvSpPr>
+        <p:spPr>
+          <a:xfrm>
+            <a:off x="11753030" y="6507000"/>
+            <a:ext cx="367414" cy="297000"/>
+          </a:xfrm>
+          <a:prstGeom prst="rect">
+            <a:avLst/>
+          </a:prstGeom>
+        </p:spPr>
+        <p:txBody>
+          <a:bodyPr vert="horz" lIns="91440" tIns="45720" rIns="91440" bIns="45720" rtlCol="0" anchor="b"/>
+          <a:lstStyle>
+            <a:lvl1pPr algn="r">
+              <a:defRPr sz="1000"/>
+            </a:lvl1pPr>
+          </a:lstStyle>
+          <a:p>
+            <a:fld id="{2BF067CD-8E6B-4360-9AA8-C5DF2A48A6D1}" type="slidenum">
+              <a:rPr lang="en-US" smtClean="0"/>
+              <a:pPr/>
+              <a:t>21</a:t>
+            </a:fld>
+            <a:endParaRPr lang="en-US" dirty="0"/>
+          </a:p>
+        </p:txBody>
+      </p:sp>
+      <p:sp>
+        <p:nvSpPr>
+          <p:cNvPr id="2" name="Slide Body">
+            <a:extLst>
+              <a:ext uri="{FF2B5EF4-FFF2-40B4-BE49-F238E27FC236}">
+                <a16:creationId xmlns:a16="http://schemas.microsoft.com/office/drawing/2014/main" id="{980F49B1-E4BE-4389-A747-7AB9B71AD920}"/>
+              </a:ext>
+            </a:extLst>
+          </p:cNvPr>
+          <p:cNvSpPr>
+            <a:spLocks noGrp="1"/>
+          </p:cNvSpPr>
+          <p:nvPr>
+            <p:ph type="body" sz="quarter" idx="10"/>
+          </p:nvPr>
+        </p:nvSpPr>
+        <p:spPr>
+          <a:xfrm>
+            <a:off x="190402" y="1269001"/>
+            <a:ext cx="9865598" cy="2474999"/>
+          </a:xfrm>
+        </p:spPr>
+        <p:txBody>
+          <a:bodyPr>
+            <a:normAutofit/>
+          </a:bodyPr>
+          <a:lstStyle/>
+          <a:p>
+            <a:pPr>
+              <a:lnSpc>
+                <a:spcPct val="120000"/>
+              </a:lnSpc>
+            </a:pPr>
+            <a:r>
+              <a:rPr lang="bg-BG" sz="3200" dirty="0"/>
+              <a:t>Този курс</a:t>
+            </a:r>
+            <a:r>
+              <a:rPr lang="en-US" sz="3200" dirty="0"/>
+              <a:t> (</a:t>
+            </a:r>
+            <a:r>
+              <a:rPr lang="bg-BG" sz="3200" dirty="0"/>
+              <a:t>презентации, примери, демонстрационен код, упражнения, домашни, видео и други активи</a:t>
+            </a:r>
+            <a:r>
+              <a:rPr lang="en-US" sz="3200" dirty="0"/>
+              <a:t>) </a:t>
+            </a:r>
+            <a:r>
+              <a:rPr lang="bg-BG" sz="3200" dirty="0"/>
+              <a:t>представлява</a:t>
+            </a:r>
+            <a:r>
+              <a:rPr lang="en-US" sz="3200" dirty="0"/>
+              <a:t> </a:t>
+            </a:r>
+            <a:r>
+              <a:rPr lang="bg-BG" sz="3200" b="1" dirty="0"/>
+              <a:t>свободно учебно съдържание </a:t>
+            </a:r>
+            <a:r>
+              <a:rPr lang="bg-BG" sz="3200" dirty="0"/>
+              <a:t>и се разпространява под свободен лиценз </a:t>
+            </a:r>
+            <a:r>
+              <a:rPr lang="en-US" sz="3200" b="1" dirty="0"/>
+              <a:t>CC-BY-NC-SA</a:t>
+            </a:r>
+            <a:endParaRPr lang="bg-BG" sz="3200" dirty="0"/>
+          </a:p>
+        </p:txBody>
+      </p:sp>
+      <p:pic>
+        <p:nvPicPr>
+          <p:cNvPr id="6" name="Picture License" descr="License">
+            <a:extLst>
+              <a:ext uri="{FF2B5EF4-FFF2-40B4-BE49-F238E27FC236}">
+                <a16:creationId xmlns:a16="http://schemas.microsoft.com/office/drawing/2014/main" id="{82BA520F-A037-4E01-AA18-27D9F1E930A6}"/>
+              </a:ext>
+            </a:extLst>
+          </p:cNvPr>
+          <p:cNvPicPr>
+            <a:picLocks noChangeAspect="1"/>
+          </p:cNvPicPr>
+          <p:nvPr/>
+        </p:nvPicPr>
+        <p:blipFill>
+          <a:blip r:embed="rId3">
+            <a:clrChange>
+              <a:clrFrom>
+                <a:srgbClr val="FFFFFF"/>
+              </a:clrFrom>
+              <a:clrTo>
+                <a:srgbClr val="FFFFFF">
+                  <a:alpha val="0"/>
+                </a:srgbClr>
+              </a:clrTo>
+            </a:clrChange>
+          </a:blip>
+          <a:stretch>
+            <a:fillRect/>
+          </a:stretch>
+        </p:blipFill>
+        <p:spPr>
+          <a:xfrm>
+            <a:off x="10226175" y="1440120"/>
+            <a:ext cx="1198986" cy="1268880"/>
+          </a:xfrm>
+          <a:prstGeom prst="rect">
+            <a:avLst/>
+          </a:prstGeom>
+        </p:spPr>
+      </p:pic>
+      <p:sp>
+        <p:nvSpPr>
+          <p:cNvPr id="3" name="Slide Title">
+            <a:extLst>
+              <a:ext uri="{FF2B5EF4-FFF2-40B4-BE49-F238E27FC236}">
+                <a16:creationId xmlns:a16="http://schemas.microsoft.com/office/drawing/2014/main" id="{E5F1FB41-80C3-4816-BC47-CCC50632E6E8}"/>
+              </a:ext>
+            </a:extLst>
+          </p:cNvPr>
+          <p:cNvSpPr>
+            <a:spLocks noGrp="1"/>
+          </p:cNvSpPr>
+          <p:nvPr>
+            <p:ph type="title"/>
+          </p:nvPr>
+        </p:nvSpPr>
+        <p:spPr/>
+        <p:txBody>
+          <a:bodyPr/>
+          <a:lstStyle/>
+          <a:p>
+            <a:r>
+              <a:rPr lang="bg-BG" dirty="0"/>
+              <a:t>Лиценз</a:t>
+            </a:r>
+          </a:p>
+        </p:txBody>
+      </p:sp>
+      <p:sp>
+        <p:nvSpPr>
+          <p:cNvPr id="11" name="TextBox 10">
+            <a:extLst>
+              <a:ext uri="{FF2B5EF4-FFF2-40B4-BE49-F238E27FC236}">
+                <a16:creationId xmlns:a16="http://schemas.microsoft.com/office/drawing/2014/main" id="{0C18DF19-B750-4C88-975B-661A6BF61F5E}"/>
+              </a:ext>
+            </a:extLst>
+          </p:cNvPr>
+          <p:cNvSpPr txBox="1"/>
+          <p:nvPr/>
+        </p:nvSpPr>
+        <p:spPr>
+          <a:xfrm>
+            <a:off x="190401" y="3927519"/>
+            <a:ext cx="11710599" cy="1979644"/>
+          </a:xfrm>
+          <a:prstGeom prst="rect">
+            <a:avLst/>
+          </a:prstGeom>
+          <a:noFill/>
+          <a:ln w="12700">
+            <a:noFill/>
+          </a:ln>
+        </p:spPr>
+        <p:txBody>
+          <a:bodyPr wrap="square">
+            <a:spAutoFit/>
+          </a:bodyPr>
+          <a:lstStyle/>
+          <a:p>
+            <a:pPr marL="360363" indent="-360363" defTabSz="1218438">
+              <a:lnSpc>
+                <a:spcPct val="120000"/>
+              </a:lnSpc>
+              <a:spcBef>
+                <a:spcPts val="600"/>
+              </a:spcBef>
+              <a:spcAft>
+                <a:spcPts val="600"/>
+              </a:spcAft>
+              <a:buFont typeface="Wingdings" panose="05000000000000000000" pitchFamily="2" charset="2"/>
+              <a:buChar char="§"/>
+              <a:defRPr/>
+            </a:pPr>
+            <a:r>
+              <a:rPr lang="bg-BG" sz="3200" dirty="0"/>
+              <a:t>Проект "</a:t>
+            </a:r>
+            <a:r>
+              <a:rPr lang="bg-BG" sz="3200" b="1" dirty="0"/>
+              <a:t>Отворено учебно съдържание по програмиране и ИТ</a:t>
+            </a:r>
+            <a:r>
+              <a:rPr lang="bg-BG" sz="3200" dirty="0"/>
+              <a:t>" към Фондация "Софтуерен университет"</a:t>
+            </a:r>
+            <a:r>
+              <a:rPr lang="en-US" sz="3200" dirty="0"/>
+              <a:t>:</a:t>
+            </a:r>
+            <a:endParaRPr lang="bg-BG" sz="3200" dirty="0"/>
+          </a:p>
+          <a:p>
+            <a:pPr marL="817563" lvl="1" indent="-360363" defTabSz="1218438">
+              <a:lnSpc>
+                <a:spcPct val="120000"/>
+              </a:lnSpc>
+              <a:spcBef>
+                <a:spcPts val="600"/>
+              </a:spcBef>
+              <a:spcAft>
+                <a:spcPts val="600"/>
+              </a:spcAft>
+              <a:buFont typeface="Wingdings" panose="05000000000000000000" pitchFamily="2" charset="2"/>
+              <a:buChar char="§"/>
+              <a:defRPr/>
+            </a:pPr>
+            <a:r>
+              <a:rPr kumimoji="0" lang="en-US" sz="3200" b="0" i="0" u="none" strike="noStrike" kern="1200" cap="none" spc="0" normalizeH="0" baseline="0" noProof="0" dirty="0">
+                <a:ln>
+                  <a:noFill/>
+                </a:ln>
+                <a:solidFill>
+                  <a:srgbClr val="234465"/>
+                </a:solidFill>
+                <a:effectLst/>
+                <a:uLnTx/>
+                <a:uFillTx/>
+                <a:latin typeface="Calibri"/>
+                <a:ea typeface="+mn-ea"/>
+                <a:cs typeface="+mn-cs"/>
+                <a:hlinkClick r:id="rId4"/>
+              </a:rPr>
+              <a:t>https://github.com/BG-IT-Edu</a:t>
+            </a:r>
+            <a:endParaRPr kumimoji="0" lang="bg-BG" sz="3200" b="0" i="0" u="none" strike="noStrike" kern="1200" cap="none" spc="0" normalizeH="0" baseline="0" noProof="0" dirty="0">
+              <a:ln>
+                <a:noFill/>
+              </a:ln>
+              <a:solidFill>
+                <a:srgbClr val="234465"/>
+              </a:solidFill>
+              <a:effectLst/>
+              <a:uLnTx/>
+              <a:uFillTx/>
+              <a:latin typeface="Calibri"/>
+              <a:ea typeface="+mn-ea"/>
+              <a:cs typeface="+mn-cs"/>
+            </a:endParaRPr>
+          </a:p>
+        </p:txBody>
+      </p:sp>
+      <p:pic>
+        <p:nvPicPr>
+          <p:cNvPr id="7" name="Picture 6" title="CC-BY-NC-SA License">
+            <a:hlinkClick r:id="rId5" tooltip="This work is licensed under the &quot;Creative Commons Attribution-NonCommercial-ShareAlike 4.0 International&quot; license"/>
+            <a:extLst>
+              <a:ext uri="{FF2B5EF4-FFF2-40B4-BE49-F238E27FC236}">
+                <a16:creationId xmlns:a16="http://schemas.microsoft.com/office/drawing/2014/main" id="{F6C77C47-F7D8-A176-5C69-7FDE5C7E8003}"/>
+              </a:ext>
+            </a:extLst>
+          </p:cNvPr>
+          <p:cNvPicPr>
+            <a:picLocks noChangeAspect="1" noChangeArrowheads="1"/>
+          </p:cNvPicPr>
+          <p:nvPr/>
+        </p:nvPicPr>
+        <p:blipFill>
+          <a:blip r:embed="rId6">
+            <a:extLst>
+              <a:ext uri="{28A0092B-C50C-407E-A947-70E740481C1C}">
+                <a14:useLocalDpi xmlns:a14="http://schemas.microsoft.com/office/drawing/2010/main"/>
+              </a:ext>
+            </a:extLst>
+          </a:blip>
+          <a:srcRect/>
+          <a:stretch>
+            <a:fillRect/>
+          </a:stretch>
+        </p:blipFill>
+        <p:spPr bwMode="auto">
+          <a:xfrm>
+            <a:off x="9831000" y="2908593"/>
+            <a:ext cx="1989336" cy="696022"/>
+          </a:xfrm>
+          <a:prstGeom prst="roundRect">
+            <a:avLst>
+              <a:gd name="adj" fmla="val 3940"/>
+            </a:avLst>
+          </a:prstGeom>
+          <a:solidFill>
+            <a:srgbClr val="231F20">
+              <a:alpha val="50000"/>
+            </a:srgbClr>
+          </a:solidFill>
+          <a:ln>
+            <a:noFill/>
+          </a:ln>
+        </p:spPr>
+      </p:pic>
+    </p:spTree>
+    <p:extLst>
+      <p:ext uri="{BB962C8B-B14F-4D97-AF65-F5344CB8AC3E}">
+        <p14:creationId xmlns:p14="http://schemas.microsoft.com/office/powerpoint/2010/main" val="3879276042"/>
+      </p:ext>
+    </p:extLst>
+  </p:cSld>
+  <p:clrMapOvr>
+    <a:masterClrMapping/>
+  </p:clrMapOvr>
+  <mc:AlternateContent xmlns:mc="http://schemas.openxmlformats.org/markup-compatibility/2006" xmlns:p14="http://schemas.microsoft.com/office/powerpoint/2010/main">
+    <mc:Choice Requires="p14">
+      <p:transition spd="slow" p14:dur="2000" advClick="0" advTm="5000"/>
+    </mc:Choice>
+    <mc:Fallback xmlns="">
+      <p:transition spd="slow" advClick="0" advTm="5000"/>
+    </mc:Fallback>
+  </mc:AlternateContent>
 </p:sld>
 </file>
 
@@ -13525,15 +13881,7 @@
           <a:p>
             <a:r>
               <a:rPr lang="ru-RU" sz="4400" dirty="0"/>
-              <a:t>Основни компоненти на компютърната система за в</a:t>
-            </a:r>
-            <a:r>
-              <a:rPr lang="ru-RU" sz="4400" dirty="0" smtClean="0"/>
-              <a:t>ъзпроизвеждане </a:t>
-            </a:r>
-            <a:r>
-              <a:rPr lang="ru-RU" sz="4400" dirty="0"/>
-              <a:t>и запис на звук</a:t>
+              <a:t>Основни компоненти на компютърната система за възпроизвеждане и запис на звук</a:t>
             </a:r>
             <a:endParaRPr lang="en-US" sz="4400" dirty="0"/>
           </a:p>
@@ -13619,13 +13967,6 @@
       <p:transition spd="slow" advClick="0" advTm="5000"/>
     </mc:Fallback>
   </mc:AlternateContent>
-  <p:timing>
-    <p:tnLst>
-      <p:par>
-        <p:cTn id="1" dur="indefinite" restart="never" nodeType="tmRoot"/>
-      </p:par>
-    </p:tnLst>
-  </p:timing>
 </p:sld>
 </file>
 
@@ -13669,53 +14010,53 @@
           <a:lstStyle/>
           <a:p>
             <a:r>
-              <a:rPr lang="bg-BG" dirty="0" smtClean="0"/>
+              <a:rPr lang="bg-BG" dirty="0"/>
               <a:t>За да </a:t>
             </a:r>
             <a:r>
-              <a:rPr lang="bg-BG" b="1" dirty="0" smtClean="0"/>
+              <a:rPr lang="bg-BG" b="1" dirty="0"/>
               <a:t>създаваме</a:t>
             </a:r>
             <a:r>
-              <a:rPr lang="bg-BG" dirty="0" smtClean="0"/>
+              <a:rPr lang="bg-BG" dirty="0"/>
               <a:t>, </a:t>
             </a:r>
             <a:r>
-              <a:rPr lang="bg-BG" b="1" dirty="0" smtClean="0"/>
+              <a:rPr lang="bg-BG" b="1" dirty="0"/>
               <a:t>обработваме</a:t>
             </a:r>
             <a:r>
-              <a:rPr lang="bg-BG" dirty="0" smtClean="0"/>
+              <a:rPr lang="bg-BG" dirty="0"/>
               <a:t> и </a:t>
             </a:r>
             <a:r>
-              <a:rPr lang="bg-BG" b="1" dirty="0" smtClean="0"/>
+              <a:rPr lang="bg-BG" b="1" dirty="0"/>
               <a:t>записваме</a:t>
             </a:r>
             <a:r>
-              <a:rPr lang="bg-BG" dirty="0" smtClean="0"/>
+              <a:rPr lang="bg-BG" dirty="0"/>
               <a:t> </a:t>
             </a:r>
             <a:r>
-              <a:rPr lang="bg-BG" b="1" dirty="0" smtClean="0"/>
+              <a:rPr lang="bg-BG" b="1" dirty="0"/>
               <a:t>звук</a:t>
             </a:r>
             <a:r>
-              <a:rPr lang="bg-BG" dirty="0" smtClean="0"/>
+              <a:rPr lang="bg-BG" dirty="0"/>
               <a:t> от компютър, ни е нужна </a:t>
             </a:r>
             <a:r>
-              <a:rPr lang="bg-BG" b="1" dirty="0" smtClean="0"/>
+              <a:rPr lang="bg-BG" b="1" dirty="0"/>
               <a:t>звукова карта</a:t>
             </a:r>
           </a:p>
           <a:p>
             <a:r>
-              <a:rPr lang="bg-BG" dirty="0" smtClean="0"/>
+              <a:rPr lang="bg-BG" dirty="0"/>
               <a:t>͏</a:t>
             </a:r>
             <a:r>
-              <a:rPr lang="bg-BG" b="1" dirty="0" smtClean="0">
+              <a:rPr lang="bg-BG" b="1" dirty="0">
                 <a:solidFill>
                   <a:schemeClr val="bg1"/>
                 </a:solidFill>
@@ -13723,106 +14064,106 @@
               <a:t>Звукова карта </a:t>
             </a:r>
             <a:r>
-              <a:rPr lang="bg-BG" dirty="0" smtClean="0"/>
+              <a:rPr lang="bg-BG" dirty="0"/>
               <a:t>– </a:t>
             </a:r>
             <a:r>
-              <a:rPr lang="bg-BG" b="1" dirty="0" smtClean="0"/>
+              <a:rPr lang="bg-BG" b="1" dirty="0"/>
               <a:t>преобразува</a:t>
             </a:r>
             <a:r>
-              <a:rPr lang="bg-BG" dirty="0" smtClean="0"/>
+              <a:rPr lang="bg-BG" dirty="0"/>
               <a:t> цифровите данни в </a:t>
             </a:r>
             <a:r>
-              <a:rPr lang="bg-BG" b="1" dirty="0" smtClean="0"/>
+              <a:rPr lang="bg-BG" b="1" dirty="0"/>
               <a:t>аналогов звук</a:t>
             </a:r>
           </a:p>
           <a:p>
             <a:r>
-              <a:rPr lang="bg-BG" dirty="0" smtClean="0"/>
+              <a:rPr lang="bg-BG" dirty="0"/>
               <a:t>Използва се за:</a:t>
             </a:r>
+            <a:endParaRPr lang="en-US" dirty="0"/>
           </a:p>
           <a:p>
             <a:pPr lvl="1"/>
             <a:r>
-              <a:rPr lang="bg-BG" b="1" dirty="0" smtClean="0"/>
+              <a:rPr lang="bg-BG" b="1" dirty="0"/>
+              <a:t>Записване</a:t>
+            </a:r>
+            <a:r>
+              <a:rPr lang="bg-BG" dirty="0"/>
+              <a:t> </a:t>
+            </a:r>
+            <a:r>
+              <a:rPr lang="bg-BG" b="1" dirty="0"/>
+              <a:t>на звуци </a:t>
+            </a:r>
+            <a:r>
+              <a:rPr lang="bg-BG" dirty="0"/>
+              <a:t>чрез свързани към компютъра </a:t>
+            </a:r>
+            <a:r>
+              <a:rPr lang="bg-BG" b="1" dirty="0"/>
+              <a:t>входни звукови устройства </a:t>
+            </a:r>
+            <a:r>
+              <a:rPr lang="bg-BG" dirty="0"/>
+              <a:t>(</a:t>
+            </a:r>
+            <a:r>
+              <a:rPr lang="bg-BG" b="1" dirty="0"/>
+              <a:t>микрофон</a:t>
+            </a:r>
+            <a:r>
+              <a:rPr lang="bg-BG" dirty="0"/>
+              <a:t>, ...)</a:t>
+            </a:r>
+          </a:p>
+          <a:p>
+            <a:pPr lvl="1"/>
+            <a:r>
+              <a:rPr lang="bg-BG" b="1" dirty="0"/>
               <a:t>͏Възпроизвеждане</a:t>
             </a:r>
             <a:r>
-              <a:rPr lang="bg-BG" dirty="0" smtClean="0"/>
+              <a:rPr lang="bg-BG" dirty="0"/>
               <a:t> на вече </a:t>
             </a:r>
             <a:r>
-              <a:rPr lang="bg-BG" b="1" dirty="0" smtClean="0"/>
+              <a:rPr lang="bg-BG" b="1" dirty="0"/>
               <a:t>записани звуци </a:t>
             </a:r>
             <a:r>
-              <a:rPr lang="bg-BG" dirty="0" smtClean="0"/>
+              <a:rPr lang="bg-BG" dirty="0"/>
               <a:t>през свързаните към нея </a:t>
             </a:r>
             <a:r>
-              <a:rPr lang="bg-BG" b="1" dirty="0" smtClean="0"/>
+              <a:rPr lang="bg-BG" b="1" dirty="0"/>
               <a:t>изходни звукови устройства </a:t>
             </a:r>
             <a:r>
-              <a:rPr lang="bg-BG" dirty="0" smtClean="0"/>
+              <a:rPr lang="bg-BG" dirty="0"/>
               <a:t>(</a:t>
             </a:r>
             <a:r>
-              <a:rPr lang="bg-BG" b="1" dirty="0" smtClean="0"/>
+              <a:rPr lang="bg-BG" b="1" dirty="0"/>
               <a:t>тонколони</a:t>
             </a:r>
             <a:r>
-              <a:rPr lang="bg-BG" dirty="0" smtClean="0"/>
+              <a:rPr lang="bg-BG" dirty="0"/>
               <a:t>, </a:t>
             </a:r>
             <a:r>
-              <a:rPr lang="bg-BG" b="1" dirty="0" smtClean="0"/>
+              <a:rPr lang="bg-BG" b="1" dirty="0"/>
               <a:t>слушалки</a:t>
             </a:r>
             <a:r>
-              <a:rPr lang="bg-BG" dirty="0" smtClean="0"/>
+              <a:rPr lang="bg-BG" dirty="0"/>
               <a:t>, ...)</a:t>
             </a:r>
-          </a:p>
-          <a:p>
-            <a:pPr lvl="1"/>
-            <a:r>
-              <a:rPr lang="bg-BG" b="1" dirty="0" smtClean="0"/>
-              <a:t>Записване</a:t>
-            </a:r>
-            <a:r>
-              <a:rPr lang="bg-BG" dirty="0" smtClean="0"/>
-              <a:t> </a:t>
-            </a:r>
-            <a:r>
-              <a:rPr lang="bg-BG" b="1" dirty="0" smtClean="0"/>
-              <a:t>на звуци </a:t>
-            </a:r>
-            <a:r>
-              <a:rPr lang="bg-BG" dirty="0" smtClean="0"/>
-              <a:t>чрез свързани към компютъра </a:t>
-            </a:r>
-            <a:r>
-              <a:rPr lang="bg-BG" b="1" dirty="0" smtClean="0"/>
-              <a:t>входни звукови устройства </a:t>
-            </a:r>
-            <a:r>
-              <a:rPr lang="bg-BG" dirty="0" smtClean="0"/>
-              <a:t>(</a:t>
-            </a:r>
-            <a:r>
-              <a:rPr lang="bg-BG" b="1" dirty="0" smtClean="0"/>
-              <a:t>микрофон</a:t>
-            </a:r>
-            <a:r>
-              <a:rPr lang="bg-BG" dirty="0" smtClean="0"/>
-              <a:t>, ...)</a:t>
-            </a:r>
-            <a:endParaRPr lang="en-US" dirty="0"/>
           </a:p>
         </p:txBody>
       </p:sp>
@@ -13842,7 +14183,7 @@
           <a:lstStyle/>
           <a:p>
             <a:r>
-              <a:rPr lang="bg-BG" dirty="0" smtClean="0"/>
+              <a:rPr lang="bg-BG" dirty="0"/>
               <a:t>Звукова карта</a:t>
             </a:r>
             <a:endParaRPr lang="en-US" dirty="0"/>
@@ -14182,46 +14523,46 @@
           <a:lstStyle/>
           <a:p>
             <a:r>
-              <a:rPr lang="bg-BG" b="1" dirty="0" smtClean="0"/>
+              <a:rPr lang="bg-BG" b="1" dirty="0"/>
               <a:t>Устройства</a:t>
             </a:r>
             <a:r>
-              <a:rPr lang="bg-BG" dirty="0" smtClean="0"/>
+              <a:rPr lang="bg-BG" dirty="0"/>
               <a:t>, които се използват за </a:t>
             </a:r>
             <a:r>
-              <a:rPr lang="bg-BG" b="1" dirty="0" smtClean="0"/>
+              <a:rPr lang="bg-BG" b="1" dirty="0"/>
               <a:t>вход</a:t>
             </a:r>
             <a:r>
-              <a:rPr lang="bg-BG" dirty="0" smtClean="0"/>
+              <a:rPr lang="bg-BG" dirty="0"/>
               <a:t> и </a:t>
             </a:r>
             <a:r>
-              <a:rPr lang="bg-BG" b="1" dirty="0" smtClean="0"/>
+              <a:rPr lang="bg-BG" b="1" dirty="0"/>
               <a:t>изход</a:t>
             </a:r>
             <a:r>
-              <a:rPr lang="bg-BG" dirty="0" smtClean="0"/>
+              <a:rPr lang="bg-BG" dirty="0"/>
               <a:t> на </a:t>
             </a:r>
             <a:r>
-              <a:rPr lang="bg-BG" b="1" dirty="0" smtClean="0"/>
+              <a:rPr lang="bg-BG" b="1" dirty="0"/>
               <a:t>звукова информация</a:t>
             </a:r>
             <a:r>
-              <a:rPr lang="bg-BG" dirty="0" smtClean="0"/>
+              <a:rPr lang="bg-BG" dirty="0"/>
               <a:t>:</a:t>
             </a:r>
           </a:p>
           <a:p>
             <a:pPr lvl="1"/>
             <a:r>
-              <a:rPr lang="bg-BG" dirty="0" smtClean="0"/>
+              <a:rPr lang="bg-BG" dirty="0"/>
               <a:t>͏</a:t>
             </a:r>
             <a:r>
-              <a:rPr lang="bg-BG" b="1" dirty="0" smtClean="0">
+              <a:rPr lang="bg-BG" b="1" dirty="0">
                 <a:solidFill>
                   <a:schemeClr val="bg1"/>
                 </a:solidFill>
@@ -14229,18 +14570,18 @@
               <a:t>Слушалки</a:t>
             </a:r>
             <a:r>
-              <a:rPr lang="bg-BG" dirty="0" smtClean="0"/>
+              <a:rPr lang="bg-BG" dirty="0"/>
               <a:t> – устройство за индивидуално слушане на запис</a:t>
             </a:r>
           </a:p>
           <a:p>
             <a:pPr lvl="1"/>
             <a:r>
-              <a:rPr lang="bg-BG" dirty="0" smtClean="0"/>
+              <a:rPr lang="bg-BG" dirty="0"/>
               <a:t>͏</a:t>
             </a:r>
             <a:r>
-              <a:rPr lang="bg-BG" b="1" dirty="0" smtClean="0">
+              <a:rPr lang="bg-BG" b="1" dirty="0">
                 <a:solidFill>
                   <a:schemeClr val="bg1"/>
                 </a:solidFill>
@@ -14248,19 +14589,19 @@
               <a:t>Тонколони</a:t>
             </a:r>
             <a:r>
-              <a:rPr lang="bg-BG" dirty="0" smtClean="0"/>
+              <a:rPr lang="bg-BG" dirty="0"/>
               <a:t> – изходни периферни, които възпроизвеждат звук</a:t>
             </a:r>
-            <a:endParaRPr lang="en-US" dirty="0" smtClean="0"/>
+            <a:endParaRPr lang="en-US" dirty="0"/>
           </a:p>
           <a:p>
             <a:pPr lvl="1"/>
             <a:r>
-              <a:rPr lang="bg-BG" dirty="0" smtClean="0"/>
+              <a:rPr lang="bg-BG" dirty="0"/>
               <a:t>͏</a:t>
             </a:r>
             <a:r>
-              <a:rPr lang="bg-BG" b="1" dirty="0" smtClean="0">
+              <a:rPr lang="bg-BG" b="1" dirty="0">
                 <a:solidFill>
                   <a:schemeClr val="bg1"/>
                 </a:solidFill>
@@ -14268,7 +14609,7 @@
               <a:t>Микрофон</a:t>
             </a:r>
             <a:r>
-              <a:rPr lang="bg-BG" dirty="0" smtClean="0"/>
+              <a:rPr lang="bg-BG" dirty="0"/>
               <a:t> – устройство за въвеждане на звукова информация в компютъра</a:t>
             </a:r>
           </a:p>
@@ -14292,8 +14633,8 @@
           <a:lstStyle/>
           <a:p>
             <a:r>
-              <a:rPr lang="bg-BG" dirty="0" smtClean="0"/>
-              <a:t>Изходни и входни устройства</a:t>
+              <a:rPr lang="bg-BG" dirty="0"/>
+              <a:t>Входни и изходни устройства</a:t>
             </a:r>
             <a:endParaRPr lang="en-US" dirty="0"/>
           </a:p>
@@ -14695,98 +15036,98 @@
           <a:lstStyle/>
           <a:p>
             <a:r>
-              <a:rPr lang="bg-BG" b="1" dirty="0" smtClean="0"/>
+              <a:rPr lang="bg-BG" b="1" dirty="0"/>
               <a:t>Звуковата информация </a:t>
             </a:r>
             <a:r>
-              <a:rPr lang="bg-BG" dirty="0" smtClean="0"/>
+              <a:rPr lang="bg-BG" dirty="0"/>
               <a:t>се </a:t>
             </a:r>
             <a:r>
-              <a:rPr lang="bg-BG" b="1" dirty="0" smtClean="0"/>
+              <a:rPr lang="bg-BG" b="1" dirty="0"/>
               <a:t>съхранява </a:t>
             </a:r>
             <a:r>
-              <a:rPr lang="bg-BG" dirty="0" smtClean="0"/>
+              <a:rPr lang="bg-BG" dirty="0"/>
               <a:t>в</a:t>
             </a:r>
             <a:r>
-              <a:rPr lang="bg-BG" b="1" dirty="0" smtClean="0"/>
+              <a:rPr lang="bg-BG" b="1" dirty="0"/>
               <a:t> компютъра </a:t>
             </a:r>
             <a:r>
-              <a:rPr lang="bg-BG" dirty="0" smtClean="0"/>
+              <a:rPr lang="bg-BG" dirty="0"/>
               <a:t>под формата на </a:t>
             </a:r>
             <a:r>
-              <a:rPr lang="bg-BG" b="1" dirty="0" smtClean="0"/>
+              <a:rPr lang="bg-BG" b="1" dirty="0"/>
               <a:t>файлове</a:t>
             </a:r>
           </a:p>
           <a:p>
             <a:r>
-              <a:rPr lang="bg-BG" dirty="0" smtClean="0"/>
+              <a:rPr lang="bg-BG" dirty="0"/>
               <a:t>При </a:t>
             </a:r>
             <a:r>
-              <a:rPr lang="bg-BG" b="1" dirty="0" smtClean="0"/>
+              <a:rPr lang="bg-BG" b="1" dirty="0"/>
               <a:t>звуковите файлове </a:t>
             </a:r>
             <a:r>
-              <a:rPr lang="bg-BG" dirty="0" smtClean="0"/>
+              <a:rPr lang="bg-BG" dirty="0"/>
               <a:t>имаме </a:t>
             </a:r>
             <a:r>
-              <a:rPr lang="bg-BG" b="1" dirty="0" smtClean="0"/>
+              <a:rPr lang="bg-BG" b="1" dirty="0"/>
               <a:t>различни разширения</a:t>
             </a:r>
             <a:r>
-              <a:rPr lang="en-US" dirty="0" smtClean="0"/>
+              <a:rPr lang="en-US" dirty="0"/>
               <a:t>:</a:t>
             </a:r>
-            <a:endParaRPr lang="bg-BG" dirty="0" smtClean="0"/>
+            <a:endParaRPr lang="bg-BG" dirty="0"/>
           </a:p>
           <a:p>
             <a:pPr lvl="1"/>
             <a:r>
-              <a:rPr lang="en-US" dirty="0" smtClean="0"/>
+              <a:rPr lang="en-US" dirty="0"/>
               <a:t>͏</a:t>
             </a:r>
             <a:r>
-              <a:rPr lang="en-US" b="1" dirty="0" smtClean="0"/>
+              <a:rPr lang="en-US" b="1" dirty="0"/>
               <a:t>mp3</a:t>
             </a:r>
           </a:p>
           <a:p>
             <a:pPr lvl="1"/>
             <a:r>
-              <a:rPr lang="en-US" dirty="0" smtClean="0"/>
+              <a:rPr lang="en-US" dirty="0"/>
               <a:t>͏</a:t>
             </a:r>
             <a:r>
-              <a:rPr lang="en-US" b="1" dirty="0" smtClean="0"/>
+              <a:rPr lang="en-US" b="1" dirty="0"/>
               <a:t>wma</a:t>
             </a:r>
           </a:p>
           <a:p>
             <a:pPr lvl="1"/>
             <a:r>
-              <a:rPr lang="en-US" dirty="0" smtClean="0"/>
+              <a:rPr lang="en-US" dirty="0"/>
               <a:t>͏</a:t>
             </a:r>
             <a:r>
-              <a:rPr lang="en-US" b="1" dirty="0" smtClean="0"/>
+              <a:rPr lang="en-US" b="1" dirty="0"/>
               <a:t>wav</a:t>
             </a:r>
           </a:p>
           <a:p>
             <a:pPr lvl="1"/>
             <a:r>
-              <a:rPr lang="en-US" dirty="0" smtClean="0"/>
+              <a:rPr lang="en-US" dirty="0"/>
               <a:t>͏</a:t>
             </a:r>
             <a:r>
-              <a:rPr lang="en-US" b="1" smtClean="0"/>
+              <a:rPr lang="en-US" b="1"/>
               <a:t>flac</a:t>
             </a:r>
           </a:p>
@@ -14808,7 +15149,7 @@
           <a:lstStyle/>
           <a:p>
             <a:r>
-              <a:rPr lang="bg-BG" dirty="0" smtClean="0"/>
+              <a:rPr lang="bg-BG" dirty="0"/>
               <a:t>Звукова информация</a:t>
             </a:r>
             <a:endParaRPr lang="en-US" dirty="0"/>
@@ -15181,51 +15522,6 @@
                       </p:childTnLst>
                     </p:cTn>
                   </p:par>
-                  <p:par>
-                    <p:cTn id="23" fill="hold">
-                      <p:stCondLst>
-                        <p:cond delay="indefinite"/>
-                      </p:stCondLst>
-                      <p:childTnLst>
-                        <p:par>
-                          <p:cTn id="24" fill="hold">
-                            <p:stCondLst>
-                              <p:cond delay="0"/>
-                            </p:stCondLst>
-                            <p:childTnLst>
-                              <p:par>
-                                <p:cTn id="25" presetID="1" presetClass="entr" presetSubtype="0" fill="hold" nodeType="clickEffect">
-                                  <p:stCondLst>
-                                    <p:cond delay="0"/>
-                                  </p:stCondLst>
-                                  <p:childTnLst>
-                                    <p:set>
-                                      <p:cBhvr>
-                                        <p:cTn id="26" dur="1" fill="hold">
-                                          <p:stCondLst>
-                                            <p:cond delay="0"/>
-                                          </p:stCondLst>
-                                        </p:cTn>
-                                        <p:tgtEl>
-                                          <p:spTgt spid="7"/>
-                                        </p:tgtEl>
-                                        <p:attrNameLst>
-                                          <p:attrName>style.visibility</p:attrName>
-                                        </p:attrNameLst>
-                                      </p:cBhvr>
-                                      <p:to>
-                                        <p:strVal val="visible"/>
-                                      </p:to>
-                                    </p:set>
-                                  </p:childTnLst>
-                                </p:cTn>
-                              </p:par>
-                            </p:childTnLst>
-                          </p:cTn>
-                        </p:par>
-                      </p:childTnLst>
-                    </p:cTn>
-                  </p:par>
                 </p:childTnLst>
               </p:cTn>
               <p:prevCondLst>
@@ -15290,15 +15586,7 @@
           <a:p>
             <a:r>
               <a:rPr lang="ru-RU" sz="4800" dirty="0"/>
-              <a:t>Основни компоненти на компютърната система за </a:t>
-            </a:r>
-            <a:r>
-              <a:rPr lang="ru-RU" sz="4800" dirty="0" smtClean="0"/>
-              <a:t>възпроизвеждане </a:t>
-            </a:r>
-            <a:r>
-              <a:rPr lang="ru-RU" sz="4800" dirty="0"/>
-              <a:t>на видео</a:t>
+              <a:t>Основни компоненти на компютърната система за възпроизвеждане на видео</a:t>
             </a:r>
             <a:endParaRPr lang="en-US" sz="4800" dirty="0"/>
           </a:p>
@@ -15384,13 +15672,6 @@
       <p:transition spd="slow" advClick="0" advTm="5000"/>
     </mc:Fallback>
   </mc:AlternateContent>
-  <p:timing>
-    <p:tnLst>
-      <p:par>
-        <p:cTn id="1" dur="indefinite" restart="never" nodeType="tmRoot"/>
-      </p:par>
-    </p:tnLst>
-  </p:timing>
 </p:sld>
 </file>
 
@@ -15434,45 +15715,45 @@
           <a:lstStyle/>
           <a:p>
             <a:r>
-              <a:rPr lang="bg-BG" dirty="0" smtClean="0"/>
+              <a:rPr lang="bg-BG" dirty="0"/>
               <a:t>За </a:t>
             </a:r>
             <a:r>
-              <a:rPr lang="bg-BG" b="1" dirty="0" smtClean="0"/>
+              <a:rPr lang="bg-BG" b="1" dirty="0"/>
               <a:t>получаването</a:t>
             </a:r>
             <a:r>
-              <a:rPr lang="bg-BG" dirty="0" smtClean="0"/>
+              <a:rPr lang="bg-BG" dirty="0"/>
               <a:t> и </a:t>
             </a:r>
             <a:r>
-              <a:rPr lang="bg-BG" b="1" dirty="0" smtClean="0"/>
+              <a:rPr lang="bg-BG" b="1" dirty="0"/>
               <a:t>възпроизвеждането</a:t>
             </a:r>
             <a:r>
-              <a:rPr lang="bg-BG" dirty="0" smtClean="0"/>
+              <a:rPr lang="bg-BG" dirty="0"/>
               <a:t> на </a:t>
             </a:r>
             <a:r>
-              <a:rPr lang="bg-BG" b="1" dirty="0" smtClean="0"/>
+              <a:rPr lang="bg-BG" b="1" dirty="0"/>
               <a:t>видеообраз</a:t>
             </a:r>
             <a:r>
-              <a:rPr lang="bg-BG" dirty="0" smtClean="0"/>
+              <a:rPr lang="bg-BG" dirty="0"/>
               <a:t> на екана на компютъра се нуждаем от </a:t>
             </a:r>
             <a:r>
-              <a:rPr lang="bg-BG" b="1" dirty="0" smtClean="0"/>
+              <a:rPr lang="bg-BG" b="1" dirty="0"/>
               <a:t>видеокарта</a:t>
             </a:r>
           </a:p>
           <a:p>
             <a:r>
-              <a:rPr lang="bg-BG" dirty="0" smtClean="0"/>
+              <a:rPr lang="bg-BG" dirty="0"/>
               <a:t>͏</a:t>
             </a:r>
             <a:r>
-              <a:rPr lang="bg-BG" b="1" dirty="0" smtClean="0">
+              <a:rPr lang="bg-BG" b="1" dirty="0">
                 <a:solidFill>
                   <a:schemeClr val="bg1"/>
                 </a:solidFill>
@@ -15480,68 +15761,68 @@
               <a:t>Видеокарта</a:t>
             </a:r>
             <a:r>
-              <a:rPr lang="bg-BG" dirty="0" smtClean="0"/>
+              <a:rPr lang="bg-BG" dirty="0"/>
               <a:t> – </a:t>
             </a:r>
             <a:r>
-              <a:rPr lang="bg-BG" b="1" dirty="0" smtClean="0"/>
+              <a:rPr lang="bg-BG" b="1" dirty="0"/>
               <a:t>хардуерно устройство</a:t>
             </a:r>
             <a:r>
-              <a:rPr lang="bg-BG" dirty="0" smtClean="0"/>
+              <a:rPr lang="bg-BG" dirty="0"/>
               <a:t>, чрез което компютърът </a:t>
             </a:r>
             <a:r>
-              <a:rPr lang="bg-BG" b="1" dirty="0" smtClean="0"/>
+              <a:rPr lang="bg-BG" b="1" dirty="0"/>
               <a:t>преобразува данните </a:t>
             </a:r>
             <a:r>
-              <a:rPr lang="bg-BG" dirty="0" smtClean="0"/>
+              <a:rPr lang="bg-BG" dirty="0"/>
               <a:t>за </a:t>
             </a:r>
             <a:r>
-              <a:rPr lang="bg-BG" b="1" dirty="0" smtClean="0"/>
+              <a:rPr lang="bg-BG" b="1" dirty="0"/>
               <a:t>графичен образ</a:t>
             </a:r>
-            <a:endParaRPr lang="en-US" b="1" dirty="0" smtClean="0"/>
-          </a:p>
-          <a:p>
-            <a:r>
-              <a:rPr lang="bg-BG" b="1" dirty="0" smtClean="0"/>
+            <a:endParaRPr lang="en-US" b="1" dirty="0"/>
+          </a:p>
+          <a:p>
+            <a:r>
+              <a:rPr lang="bg-BG" b="1" dirty="0"/>
               <a:t>Качеството</a:t>
             </a:r>
             <a:r>
-              <a:rPr lang="bg-BG" dirty="0" smtClean="0"/>
+              <a:rPr lang="bg-BG" dirty="0"/>
               <a:t> на изображението </a:t>
             </a:r>
             <a:r>
-              <a:rPr lang="bg-BG" b="1" dirty="0" smtClean="0"/>
+              <a:rPr lang="bg-BG" b="1" dirty="0"/>
               <a:t>зависи от видеокартата</a:t>
             </a:r>
           </a:p>
           <a:p>
             <a:r>
-              <a:rPr lang="bg-BG" dirty="0" smtClean="0"/>
+              <a:rPr lang="bg-BG" dirty="0"/>
               <a:t>Може да бъде </a:t>
             </a:r>
             <a:r>
-              <a:rPr lang="bg-BG" b="1" dirty="0" smtClean="0"/>
+              <a:rPr lang="bg-BG" b="1" dirty="0"/>
               <a:t>вградена в дънната платка</a:t>
             </a:r>
             <a:r>
-              <a:rPr lang="bg-BG" dirty="0" smtClean="0"/>
+              <a:rPr lang="bg-BG" dirty="0"/>
               <a:t> на компютъра или да се </a:t>
             </a:r>
             <a:r>
-              <a:rPr lang="bg-BG" b="1" dirty="0" smtClean="0"/>
+              <a:rPr lang="bg-BG" b="1" dirty="0"/>
               <a:t>монтира</a:t>
             </a:r>
             <a:r>
-              <a:rPr lang="bg-BG" dirty="0" smtClean="0"/>
+              <a:rPr lang="bg-BG" dirty="0"/>
               <a:t> като </a:t>
             </a:r>
             <a:r>
-              <a:rPr lang="bg-BG" b="1" dirty="0" smtClean="0"/>
+              <a:rPr lang="bg-BG" b="1" dirty="0"/>
               <a:t>отделно устройство</a:t>
             </a:r>
           </a:p>
@@ -15567,7 +15848,7 @@
           <a:lstStyle/>
           <a:p>
             <a:r>
-              <a:rPr lang="bg-BG" dirty="0" smtClean="0"/>
+              <a:rPr lang="bg-BG" dirty="0"/>
               <a:t>Видеокарта</a:t>
             </a:r>
             <a:endParaRPr lang="en-US" dirty="0"/>
@@ -15961,23 +16242,23 @@
           <a:lstStyle/>
           <a:p>
             <a:r>
-              <a:rPr lang="bg-BG" dirty="0" smtClean="0"/>
+              <a:rPr lang="bg-BG" dirty="0"/>
               <a:t>Както и при </a:t>
             </a:r>
             <a:r>
-              <a:rPr lang="bg-BG" b="1" dirty="0" smtClean="0"/>
+              <a:rPr lang="bg-BG" b="1" dirty="0"/>
               <a:t>звуковата информация</a:t>
             </a:r>
             <a:r>
-              <a:rPr lang="bg-BG" dirty="0" smtClean="0"/>
+              <a:rPr lang="bg-BG" dirty="0"/>
               <a:t>, </a:t>
             </a:r>
             <a:r>
-              <a:rPr lang="bg-BG" b="1" dirty="0" smtClean="0"/>
+              <a:rPr lang="bg-BG" b="1" dirty="0"/>
               <a:t>видеоинформация</a:t>
             </a:r>
             <a:r>
-              <a:rPr lang="bg-BG" dirty="0" smtClean="0"/>
+              <a:rPr lang="bg-BG" dirty="0"/>
               <a:t> се </a:t>
             </a:r>
             <a:r>
@@ -15997,13 +16278,13 @@
               <a:t>под формата на </a:t>
             </a:r>
             <a:r>
-              <a:rPr lang="bg-BG" b="1" dirty="0" smtClean="0"/>
+              <a:rPr lang="bg-BG" b="1" dirty="0"/>
               <a:t>файлове</a:t>
             </a:r>
           </a:p>
           <a:p>
             <a:r>
-              <a:rPr lang="bg-BG" dirty="0" smtClean="0"/>
+              <a:rPr lang="bg-BG" dirty="0"/>
               <a:t>Най-популярните видеоформати са:</a:t>
             </a:r>
           </a:p>
@@ -16011,17 +16292,13 @@
             <a:pPr lvl="1"/>
             <a:r>
               <a:rPr lang="en-US" dirty="0"/>
-              <a:t>a</a:t>
-            </a:r>
-            <a:r>
-              <a:rPr lang="en-US" dirty="0" smtClean="0"/>
-              <a:t>vi</a:t>
+              <a:t>avi</a:t>
             </a:r>
           </a:p>
           <a:p>
             <a:pPr lvl="1"/>
             <a:r>
-              <a:rPr lang="en-US" dirty="0" smtClean="0"/>
+              <a:rPr lang="en-US" dirty="0"/>
               <a:t>wmv</a:t>
             </a:r>
           </a:p>
@@ -16029,17 +16306,13 @@
             <a:pPr lvl="1"/>
             <a:r>
               <a:rPr lang="en-US" dirty="0"/>
-              <a:t>m</a:t>
-            </a:r>
-            <a:r>
-              <a:rPr lang="en-US" dirty="0" smtClean="0"/>
-              <a:t>p4</a:t>
+              <a:t>mp4</a:t>
             </a:r>
           </a:p>
           <a:p>
             <a:pPr lvl="1"/>
             <a:r>
-              <a:rPr lang="en-US" dirty="0" smtClean="0"/>
+              <a:rPr lang="en-US" dirty="0"/>
               <a:t>mov</a:t>
             </a:r>
             <a:endParaRPr lang="bg-BG" dirty="0"/>
@@ -16065,7 +16338,7 @@
           <a:lstStyle/>
           <a:p>
             <a:r>
-              <a:rPr lang="bg-BG" dirty="0" smtClean="0"/>
+              <a:rPr lang="bg-BG" dirty="0"/>
               <a:t>Видеоинформация</a:t>
             </a:r>
             <a:endParaRPr lang="en-US" dirty="0"/>
@@ -16130,7 +16403,275 @@
   <p:timing>
     <p:tnLst>
       <p:par>
-        <p:cTn id="1" dur="indefinite" restart="never" nodeType="tmRoot"/>
+        <p:cTn id="1" dur="indefinite" restart="never" nodeType="tmRoot">
+          <p:childTnLst>
+            <p:seq concurrent="1" nextAc="seek">
+              <p:cTn id="2" dur="indefinite" nodeType="mainSeq">
+                <p:childTnLst>
+                  <p:par>
+                    <p:cTn id="3" fill="hold">
+                      <p:stCondLst>
+                        <p:cond delay="indefinite"/>
+                      </p:stCondLst>
+                      <p:childTnLst>
+                        <p:par>
+                          <p:cTn id="4" fill="hold">
+                            <p:stCondLst>
+                              <p:cond delay="0"/>
+                            </p:stCondLst>
+                            <p:childTnLst>
+                              <p:par>
+                                <p:cTn id="5" presetID="1" presetClass="entr" presetSubtype="0" fill="hold" nodeType="clickEffect">
+                                  <p:stCondLst>
+                                    <p:cond delay="0"/>
+                                  </p:stCondLst>
+                                  <p:childTnLst>
+                                    <p:set>
+                                      <p:cBhvr>
+                                        <p:cTn id="6" dur="1" fill="hold">
+                                          <p:stCondLst>
+                                            <p:cond delay="0"/>
+                                          </p:stCondLst>
+                                        </p:cTn>
+                                        <p:tgtEl>
+                                          <p:spTgt spid="6">
+                                            <p:txEl>
+                                              <p:pRg st="1" end="1"/>
+                                            </p:txEl>
+                                          </p:spTgt>
+                                        </p:tgtEl>
+                                        <p:attrNameLst>
+                                          <p:attrName>style.visibility</p:attrName>
+                                        </p:attrNameLst>
+                                      </p:cBhvr>
+                                      <p:to>
+                                        <p:strVal val="visible"/>
+                                      </p:to>
+                                    </p:set>
+                                  </p:childTnLst>
+                                </p:cTn>
+                              </p:par>
+                            </p:childTnLst>
+                          </p:cTn>
+                        </p:par>
+                      </p:childTnLst>
+                    </p:cTn>
+                  </p:par>
+                  <p:par>
+                    <p:cTn id="7" fill="hold">
+                      <p:stCondLst>
+                        <p:cond delay="indefinite"/>
+                      </p:stCondLst>
+                      <p:childTnLst>
+                        <p:par>
+                          <p:cTn id="8" fill="hold">
+                            <p:stCondLst>
+                              <p:cond delay="0"/>
+                            </p:stCondLst>
+                            <p:childTnLst>
+                              <p:par>
+                                <p:cTn id="9" presetID="1" presetClass="entr" presetSubtype="0" fill="hold" nodeType="clickEffect">
+                                  <p:stCondLst>
+                                    <p:cond delay="0"/>
+                                  </p:stCondLst>
+                                  <p:childTnLst>
+                                    <p:set>
+                                      <p:cBhvr>
+                                        <p:cTn id="10" dur="1" fill="hold">
+                                          <p:stCondLst>
+                                            <p:cond delay="0"/>
+                                          </p:stCondLst>
+                                        </p:cTn>
+                                        <p:tgtEl>
+                                          <p:spTgt spid="6">
+                                            <p:txEl>
+                                              <p:pRg st="2" end="2"/>
+                                            </p:txEl>
+                                          </p:spTgt>
+                                        </p:tgtEl>
+                                        <p:attrNameLst>
+                                          <p:attrName>style.visibility</p:attrName>
+                                        </p:attrNameLst>
+                                      </p:cBhvr>
+                                      <p:to>
+                                        <p:strVal val="visible"/>
+                                      </p:to>
+                                    </p:set>
+                                  </p:childTnLst>
+                                </p:cTn>
+                              </p:par>
+                            </p:childTnLst>
+                          </p:cTn>
+                        </p:par>
+                      </p:childTnLst>
+                    </p:cTn>
+                  </p:par>
+                  <p:par>
+                    <p:cTn id="11" fill="hold">
+                      <p:stCondLst>
+                        <p:cond delay="indefinite"/>
+                      </p:stCondLst>
+                      <p:childTnLst>
+                        <p:par>
+                          <p:cTn id="12" fill="hold">
+                            <p:stCondLst>
+                              <p:cond delay="0"/>
+                            </p:stCondLst>
+                            <p:childTnLst>
+                              <p:par>
+                                <p:cTn id="13" presetID="1" presetClass="entr" presetSubtype="0" fill="hold" nodeType="clickEffect">
+                                  <p:stCondLst>
+                                    <p:cond delay="0"/>
+                                  </p:stCondLst>
+                                  <p:childTnLst>
+                                    <p:set>
+                                      <p:cBhvr>
+                                        <p:cTn id="14" dur="1" fill="hold">
+                                          <p:stCondLst>
+                                            <p:cond delay="0"/>
+                                          </p:stCondLst>
+                                        </p:cTn>
+                                        <p:tgtEl>
+                                          <p:spTgt spid="6">
+                                            <p:txEl>
+                                              <p:pRg st="3" end="3"/>
+                                            </p:txEl>
+                                          </p:spTgt>
+                                        </p:tgtEl>
+                                        <p:attrNameLst>
+                                          <p:attrName>style.visibility</p:attrName>
+                                        </p:attrNameLst>
+                                      </p:cBhvr>
+                                      <p:to>
+                                        <p:strVal val="visible"/>
+                                      </p:to>
+                                    </p:set>
+                                  </p:childTnLst>
+                                </p:cTn>
+                              </p:par>
+                            </p:childTnLst>
+                          </p:cTn>
+                        </p:par>
+                      </p:childTnLst>
+                    </p:cTn>
+                  </p:par>
+                  <p:par>
+                    <p:cTn id="15" fill="hold">
+                      <p:stCondLst>
+                        <p:cond delay="indefinite"/>
+                      </p:stCondLst>
+                      <p:childTnLst>
+                        <p:par>
+                          <p:cTn id="16" fill="hold">
+                            <p:stCondLst>
+                              <p:cond delay="0"/>
+                            </p:stCondLst>
+                            <p:childTnLst>
+                              <p:par>
+                                <p:cTn id="17" presetID="1" presetClass="entr" presetSubtype="0" fill="hold" nodeType="clickEffect">
+                                  <p:stCondLst>
+                                    <p:cond delay="0"/>
+                                  </p:stCondLst>
+                                  <p:childTnLst>
+                                    <p:set>
+                                      <p:cBhvr>
+                                        <p:cTn id="18" dur="1" fill="hold">
+                                          <p:stCondLst>
+                                            <p:cond delay="0"/>
+                                          </p:stCondLst>
+                                        </p:cTn>
+                                        <p:tgtEl>
+                                          <p:spTgt spid="6">
+                                            <p:txEl>
+                                              <p:pRg st="4" end="4"/>
+                                            </p:txEl>
+                                          </p:spTgt>
+                                        </p:tgtEl>
+                                        <p:attrNameLst>
+                                          <p:attrName>style.visibility</p:attrName>
+                                        </p:attrNameLst>
+                                      </p:cBhvr>
+                                      <p:to>
+                                        <p:strVal val="visible"/>
+                                      </p:to>
+                                    </p:set>
+                                  </p:childTnLst>
+                                </p:cTn>
+                              </p:par>
+                            </p:childTnLst>
+                          </p:cTn>
+                        </p:par>
+                      </p:childTnLst>
+                    </p:cTn>
+                  </p:par>
+                  <p:par>
+                    <p:cTn id="19" fill="hold">
+                      <p:stCondLst>
+                        <p:cond delay="indefinite"/>
+                      </p:stCondLst>
+                      <p:childTnLst>
+                        <p:par>
+                          <p:cTn id="20" fill="hold">
+                            <p:stCondLst>
+                              <p:cond delay="0"/>
+                            </p:stCondLst>
+                            <p:childTnLst>
+                              <p:par>
+                                <p:cTn id="21" presetID="1" presetClass="entr" presetSubtype="0" fill="hold" nodeType="clickEffect">
+                                  <p:stCondLst>
+                                    <p:cond delay="0"/>
+                                  </p:stCondLst>
+                                  <p:childTnLst>
+                                    <p:set>
+                                      <p:cBhvr>
+                                        <p:cTn id="22" dur="1" fill="hold">
+                                          <p:stCondLst>
+                                            <p:cond delay="0"/>
+                                          </p:stCondLst>
+                                        </p:cTn>
+                                        <p:tgtEl>
+                                          <p:spTgt spid="6">
+                                            <p:txEl>
+                                              <p:pRg st="5" end="5"/>
+                                            </p:txEl>
+                                          </p:spTgt>
+                                        </p:tgtEl>
+                                        <p:attrNameLst>
+                                          <p:attrName>style.visibility</p:attrName>
+                                        </p:attrNameLst>
+                                      </p:cBhvr>
+                                      <p:to>
+                                        <p:strVal val="visible"/>
+                                      </p:to>
+                                    </p:set>
+                                  </p:childTnLst>
+                                </p:cTn>
+                              </p:par>
+                            </p:childTnLst>
+                          </p:cTn>
+                        </p:par>
+                      </p:childTnLst>
+                    </p:cTn>
+                  </p:par>
+                </p:childTnLst>
+              </p:cTn>
+              <p:prevCondLst>
+                <p:cond evt="onPrev" delay="0">
+                  <p:tgtEl>
+                    <p:sldTgt/>
+                  </p:tgtEl>
+                </p:cond>
+              </p:prevCondLst>
+              <p:nextCondLst>
+                <p:cond evt="onNext" delay="0">
+                  <p:tgtEl>
+                    <p:sldTgt/>
+                  </p:tgtEl>
+                </p:cond>
+              </p:nextCondLst>
+            </p:seq>
+          </p:childTnLst>
+        </p:cTn>
       </p:par>
     </p:tnLst>
   </p:timing>

</xml_diff>